<commit_message>
Updated CRC after discussion
</commit_message>
<xml_diff>
--- a/IsaiahCRC.pptx
+++ b/IsaiahCRC.pptx
@@ -16,14 +16,19 @@
     <p:sldId id="269" r:id="rId10"/>
     <p:sldId id="270" r:id="rId11"/>
     <p:sldId id="271" r:id="rId12"/>
-    <p:sldId id="260" r:id="rId13"/>
-    <p:sldId id="265" r:id="rId14"/>
-    <p:sldId id="261" r:id="rId15"/>
-    <p:sldId id="266" r:id="rId16"/>
-    <p:sldId id="259" r:id="rId17"/>
-    <p:sldId id="262" r:id="rId18"/>
-    <p:sldId id="278" r:id="rId19"/>
-    <p:sldId id="280" r:id="rId20"/>
+    <p:sldId id="284" r:id="rId13"/>
+    <p:sldId id="282" r:id="rId14"/>
+    <p:sldId id="285" r:id="rId15"/>
+    <p:sldId id="260" r:id="rId16"/>
+    <p:sldId id="265" r:id="rId17"/>
+    <p:sldId id="259" r:id="rId18"/>
+    <p:sldId id="261" r:id="rId19"/>
+    <p:sldId id="266" r:id="rId20"/>
+    <p:sldId id="262" r:id="rId21"/>
+    <p:sldId id="278" r:id="rId22"/>
+    <p:sldId id="281" r:id="rId23"/>
+    <p:sldId id="283" r:id="rId24"/>
+    <p:sldId id="280" r:id="rId25"/>
   </p:sldIdLst>
   <p:sldSz cx="12192000" cy="6858000"/>
   <p:notesSz cx="6858000" cy="9144000"/>
@@ -122,6 +127,11 @@
       </a:defRPr>
     </a:lvl9pPr>
   </p:defaultTextStyle>
+  <p:extLst>
+    <p:ext uri="{EFAFB233-063F-42B5-8137-9DF3F51BA10A}">
+      <p15:sldGuideLst xmlns:p15="http://schemas.microsoft.com/office/powerpoint/2012/main"/>
+    </p:ext>
+  </p:extLst>
 </p:presentation>
 </file>
 
@@ -3677,7 +3687,14 @@
           <a:p>
             <a:r>
               <a:rPr lang="en-US" dirty="0" err="1"/>
-              <a:t>InputOutputParser</a:t>
+              <a:t>InputParser</a:t>
+            </a:r>
+            <a:endParaRPr lang="en-US" dirty="0"/>
+          </a:p>
+          <a:p>
+            <a:r>
+              <a:rPr lang="en-US" dirty="0" err="1"/>
+              <a:t>OutputParser</a:t>
             </a:r>
             <a:endParaRPr lang="en-US" dirty="0"/>
           </a:p>
@@ -4466,9 +4483,10 @@
           <a:lstStyle/>
           <a:p>
             <a:r>
-              <a:rPr lang="en-US" dirty="0"/>
-              <a:t>Team (Abstract)</a:t>
-            </a:r>
+              <a:rPr lang="en-US" dirty="0" err="1"/>
+              <a:t>LoginManager</a:t>
+            </a:r>
+            <a:endParaRPr lang="en-US" dirty="0"/>
           </a:p>
         </p:txBody>
       </p:sp>
@@ -4500,13 +4518,7 @@
           <a:p>
             <a:r>
               <a:rPr lang="en-US" dirty="0"/>
-              <a:t>Store a team’s name, home city, players, and Games they played or are playing in</a:t>
-            </a:r>
-          </a:p>
-          <a:p>
-            <a:r>
-              <a:rPr lang="en-US" dirty="0"/>
-              <a:t>Getters and Setters for above </a:t>
+              <a:t>Verify a given username and password and log the user in if they are valid</a:t>
             </a:r>
           </a:p>
         </p:txBody>
@@ -4566,18 +4578,13 @@
           <a:p>
             <a:r>
               <a:rPr lang="en-US" sz="3000" dirty="0"/>
-              <a:t>Subclasses: </a:t>
-            </a:r>
-            <a:r>
-              <a:rPr lang="en-US" sz="3000" dirty="0" err="1"/>
-              <a:t>HockeyTeam</a:t>
-            </a:r>
-            <a:endParaRPr lang="en-US" sz="3000" dirty="0"/>
+              <a:t>Subclasses: None</a:t>
+            </a:r>
           </a:p>
           <a:p>
             <a:r>
               <a:rPr lang="en-US" sz="3000" dirty="0"/>
-              <a:t>Layer: Entity</a:t>
+              <a:t>Layer: Use Case</a:t>
             </a:r>
           </a:p>
         </p:txBody>
@@ -4775,8 +4782,15 @@
           </a:lstStyle>
           <a:p>
             <a:r>
+              <a:rPr lang="en-US" dirty="0" err="1"/>
+              <a:t>UserList</a:t>
+            </a:r>
+            <a:endParaRPr lang="en-US" dirty="0"/>
+          </a:p>
+          <a:p>
+            <a:r>
               <a:rPr lang="en-US" dirty="0"/>
-              <a:t>None</a:t>
+              <a:t>Main</a:t>
             </a:r>
           </a:p>
         </p:txBody>
@@ -4784,7 +4798,7 @@
     </p:spTree>
     <p:extLst>
       <p:ext uri="{BB962C8B-B14F-4D97-AF65-F5344CB8AC3E}">
-        <p14:creationId xmlns:p14="http://schemas.microsoft.com/office/powerpoint/2010/main" val="307806504"/>
+        <p14:creationId xmlns:p14="http://schemas.microsoft.com/office/powerpoint/2010/main" val="446567233"/>
       </p:ext>
     </p:extLst>
   </p:cSld>
@@ -4829,8 +4843,8 @@
         </p:nvSpPr>
         <p:spPr>
           <a:xfrm>
-            <a:off x="441593" y="365125"/>
-            <a:ext cx="5257800" cy="1325563"/>
+            <a:off x="441592" y="365125"/>
+            <a:ext cx="5535461" cy="1325563"/>
           </a:xfrm>
         </p:spPr>
         <p:txBody>
@@ -4839,7 +4853,7 @@
           <a:p>
             <a:r>
               <a:rPr lang="en-US" dirty="0" err="1"/>
-              <a:t>HockeyTeam</a:t>
+              <a:t>UserPredictionManager</a:t>
             </a:r>
             <a:endParaRPr lang="en-US" dirty="0"/>
           </a:p>
@@ -4873,13 +4887,19 @@
           <a:p>
             <a:r>
               <a:rPr lang="en-US" dirty="0"/>
-              <a:t>Store a team’s total number of games, wins, losses, and ties</a:t>
+              <a:t>Create and record the ongoing Games</a:t>
             </a:r>
           </a:p>
           <a:p>
             <a:r>
               <a:rPr lang="en-US" dirty="0"/>
-              <a:t>Getters and Setters for above </a:t>
+              <a:t>Record the player predictions on each Game</a:t>
+            </a:r>
+          </a:p>
+          <a:p>
+            <a:r>
+              <a:rPr lang="en-US" dirty="0"/>
+              <a:t>Resolve the outcome of a Game, recording which players predicted correctly and which predicted incorrectly</a:t>
             </a:r>
           </a:p>
         </p:txBody>
@@ -4933,7 +4953,7 @@
           <a:p>
             <a:r>
               <a:rPr lang="en-US" sz="3000" dirty="0"/>
-              <a:t>Parent: Team</a:t>
+              <a:t>Parent: None</a:t>
             </a:r>
           </a:p>
           <a:p>
@@ -4945,7 +4965,7 @@
           <a:p>
             <a:r>
               <a:rPr lang="en-US" sz="3000" dirty="0"/>
-              <a:t>Layer: Entity</a:t>
+              <a:t>Layer: Use Case</a:t>
             </a:r>
           </a:p>
         </p:txBody>
@@ -5143,32 +5163,22 @@
           </a:lstStyle>
           <a:p>
             <a:r>
-              <a:rPr lang="en-US" dirty="0" err="1"/>
-              <a:t>TeamList</a:t>
-            </a:r>
-            <a:endParaRPr lang="en-US" dirty="0"/>
-          </a:p>
-          <a:p>
-            <a:r>
-              <a:rPr lang="en-US" dirty="0" err="1"/>
-              <a:t>CompletedGame</a:t>
-            </a:r>
-            <a:r>
               <a:rPr lang="en-US" dirty="0"/>
-              <a:t>, </a:t>
-            </a:r>
-            <a:r>
-              <a:rPr lang="en-US" dirty="0" err="1"/>
-              <a:t>OngoingGame</a:t>
-            </a:r>
-            <a:endParaRPr lang="en-US" dirty="0"/>
+              <a:t>User</a:t>
+            </a:r>
+          </a:p>
+          <a:p>
+            <a:r>
+              <a:rPr lang="en-US" dirty="0"/>
+              <a:t>Game</a:t>
+            </a:r>
           </a:p>
         </p:txBody>
       </p:sp>
     </p:spTree>
     <p:extLst>
       <p:ext uri="{BB962C8B-B14F-4D97-AF65-F5344CB8AC3E}">
-        <p14:creationId xmlns:p14="http://schemas.microsoft.com/office/powerpoint/2010/main" val="510888793"/>
+        <p14:creationId xmlns:p14="http://schemas.microsoft.com/office/powerpoint/2010/main" val="3028449555"/>
       </p:ext>
     </p:extLst>
   </p:cSld>
@@ -5213,8 +5223,8 @@
         </p:nvSpPr>
         <p:spPr>
           <a:xfrm>
-            <a:off x="441593" y="365125"/>
-            <a:ext cx="5257800" cy="1325563"/>
+            <a:off x="441592" y="365125"/>
+            <a:ext cx="5535461" cy="1325563"/>
           </a:xfrm>
         </p:spPr>
         <p:txBody>
@@ -5223,15 +5233,7 @@
           <a:p>
             <a:r>
               <a:rPr lang="en-US" dirty="0"/>
-              <a:t>Player (</a:t>
-            </a:r>
-            <a:r>
-              <a:rPr lang="en-US" dirty="0" err="1"/>
-              <a:t>Abstact</a:t>
-            </a:r>
-            <a:r>
-              <a:rPr lang="en-US" dirty="0"/>
-              <a:t>)</a:t>
+              <a:t>Game</a:t>
             </a:r>
           </a:p>
         </p:txBody>
@@ -5264,13 +5266,7 @@
           <a:p>
             <a:r>
               <a:rPr lang="en-US" dirty="0"/>
-              <a:t>Store player name, age, Team, and role on team</a:t>
-            </a:r>
-          </a:p>
-          <a:p>
-            <a:r>
-              <a:rPr lang="en-US" dirty="0"/>
-              <a:t>Getters and setters for above</a:t>
+              <a:t>Store the game’s location, time, and the two teams competing</a:t>
             </a:r>
           </a:p>
         </p:txBody>
@@ -5330,18 +5326,13 @@
           <a:p>
             <a:r>
               <a:rPr lang="en-US" sz="3000" dirty="0"/>
-              <a:t>Subclasses: </a:t>
-            </a:r>
-            <a:r>
-              <a:rPr lang="en-US" sz="3000" dirty="0" err="1"/>
-              <a:t>HockeyPlayer</a:t>
-            </a:r>
-            <a:endParaRPr lang="en-US" sz="3000" dirty="0"/>
+              <a:t>Subclasses: None</a:t>
+            </a:r>
           </a:p>
           <a:p>
             <a:r>
               <a:rPr lang="en-US" sz="3000" dirty="0"/>
-              <a:t>Layer: Entity</a:t>
+              <a:t>Layer: Use Case</a:t>
             </a:r>
           </a:p>
         </p:txBody>
@@ -5539,16 +5530,17 @@
           </a:lstStyle>
           <a:p>
             <a:r>
-              <a:rPr lang="en-US" dirty="0"/>
-              <a:t>None</a:t>
-            </a:r>
+              <a:rPr lang="en-US" dirty="0" err="1"/>
+              <a:t>UserPredictionManager</a:t>
+            </a:r>
+            <a:endParaRPr lang="en-US" dirty="0"/>
           </a:p>
         </p:txBody>
       </p:sp>
     </p:spTree>
     <p:extLst>
       <p:ext uri="{BB962C8B-B14F-4D97-AF65-F5344CB8AC3E}">
-        <p14:creationId xmlns:p14="http://schemas.microsoft.com/office/powerpoint/2010/main" val="1735516745"/>
+        <p14:creationId xmlns:p14="http://schemas.microsoft.com/office/powerpoint/2010/main" val="816090190"/>
       </p:ext>
     </p:extLst>
   </p:cSld>
@@ -5602,10 +5594,9 @@
           <a:lstStyle/>
           <a:p>
             <a:r>
-              <a:rPr lang="en-US" dirty="0" err="1"/>
-              <a:t>HockeyPlayer</a:t>
-            </a:r>
-            <a:endParaRPr lang="en-US" dirty="0"/>
+              <a:rPr lang="en-US" dirty="0"/>
+              <a:t>Team (Abstract)</a:t>
+            </a:r>
           </a:p>
         </p:txBody>
       </p:sp>
@@ -5637,13 +5628,13 @@
           <a:p>
             <a:r>
               <a:rPr lang="en-US" dirty="0"/>
-              <a:t>Store player role on Hockey team</a:t>
+              <a:t>Store a team’s name, home city, and players</a:t>
             </a:r>
           </a:p>
           <a:p>
             <a:r>
               <a:rPr lang="en-US" dirty="0"/>
-              <a:t>Getters and setters for above</a:t>
+              <a:t>Getters and Setters for above </a:t>
             </a:r>
           </a:p>
         </p:txBody>
@@ -5697,19 +5688,19 @@
           <a:p>
             <a:r>
               <a:rPr lang="en-US" sz="3000" dirty="0"/>
-              <a:t>Parent: </a:t>
+              <a:t>Parent: None</a:t>
+            </a:r>
+          </a:p>
+          <a:p>
+            <a:r>
+              <a:rPr lang="en-US" sz="3000" dirty="0"/>
+              <a:t>Subclasses: </a:t>
             </a:r>
             <a:r>
               <a:rPr lang="en-US" sz="3000" dirty="0" err="1"/>
-              <a:t>HockeyPlayer</a:t>
+              <a:t>HockeyTeam</a:t>
             </a:r>
             <a:endParaRPr lang="en-US" sz="3000" dirty="0"/>
-          </a:p>
-          <a:p>
-            <a:r>
-              <a:rPr lang="en-US" sz="3000" dirty="0"/>
-              <a:t>Subclasses: None</a:t>
-            </a:r>
           </a:p>
           <a:p>
             <a:r>
@@ -5912,17 +5903,16 @@
           </a:lstStyle>
           <a:p>
             <a:r>
-              <a:rPr lang="en-US" dirty="0" err="1"/>
-              <a:t>PlayerList</a:t>
-            </a:r>
-            <a:endParaRPr lang="en-US" dirty="0"/>
+              <a:rPr lang="en-US" dirty="0"/>
+              <a:t>None</a:t>
+            </a:r>
           </a:p>
         </p:txBody>
       </p:sp>
     </p:spTree>
     <p:extLst>
       <p:ext uri="{BB962C8B-B14F-4D97-AF65-F5344CB8AC3E}">
-        <p14:creationId xmlns:p14="http://schemas.microsoft.com/office/powerpoint/2010/main" val="678215517"/>
+        <p14:creationId xmlns:p14="http://schemas.microsoft.com/office/powerpoint/2010/main" val="307806504"/>
       </p:ext>
     </p:extLst>
   </p:cSld>
@@ -5977,7 +5967,7 @@
           <a:p>
             <a:r>
               <a:rPr lang="en-US" dirty="0" err="1"/>
-              <a:t>TeamManager</a:t>
+              <a:t>HockeyTeam</a:t>
             </a:r>
             <a:endParaRPr lang="en-US" dirty="0"/>
           </a:p>
@@ -6011,13 +6001,13 @@
           <a:p>
             <a:r>
               <a:rPr lang="en-US" dirty="0"/>
-              <a:t>Store Teams, with getter</a:t>
+              <a:t>Store a team’s total number of games, wins, losses, and ties</a:t>
             </a:r>
           </a:p>
           <a:p>
             <a:r>
               <a:rPr lang="en-US" dirty="0"/>
-              <a:t>Create and record new Teams</a:t>
+              <a:t>Getters and Setters for above </a:t>
             </a:r>
           </a:p>
         </p:txBody>
@@ -6071,7 +6061,7 @@
           <a:p>
             <a:r>
               <a:rPr lang="en-US" sz="3000" dirty="0"/>
-              <a:t>Parent: None</a:t>
+              <a:t>Parent: Team</a:t>
             </a:r>
           </a:p>
           <a:p>
@@ -6281,16 +6271,17 @@
           </a:lstStyle>
           <a:p>
             <a:r>
-              <a:rPr lang="en-US" dirty="0"/>
-              <a:t>None</a:t>
-            </a:r>
+              <a:rPr lang="en-US" dirty="0" err="1"/>
+              <a:t>TeamManager</a:t>
+            </a:r>
+            <a:endParaRPr lang="en-US" dirty="0"/>
           </a:p>
         </p:txBody>
       </p:sp>
     </p:spTree>
     <p:extLst>
       <p:ext uri="{BB962C8B-B14F-4D97-AF65-F5344CB8AC3E}">
-        <p14:creationId xmlns:p14="http://schemas.microsoft.com/office/powerpoint/2010/main" val="4075474463"/>
+        <p14:creationId xmlns:p14="http://schemas.microsoft.com/office/powerpoint/2010/main" val="510888793"/>
       </p:ext>
     </p:extLst>
   </p:cSld>
@@ -6345,7 +6336,7 @@
           <a:p>
             <a:r>
               <a:rPr lang="en-US" dirty="0" err="1"/>
-              <a:t>PlayerManager</a:t>
+              <a:t>TeamManager</a:t>
             </a:r>
             <a:endParaRPr lang="en-US" dirty="0"/>
           </a:p>
@@ -6379,13 +6370,13 @@
           <a:p>
             <a:r>
               <a:rPr lang="en-US" dirty="0"/>
-              <a:t>Store Players, with getter</a:t>
+              <a:t>Store Teams, with getter (for Use Cases to resolve argument name into Team object)</a:t>
             </a:r>
           </a:p>
           <a:p>
             <a:r>
               <a:rPr lang="en-US" dirty="0"/>
-              <a:t>Create and record new Players</a:t>
+              <a:t>Create and record new Teams</a:t>
             </a:r>
           </a:p>
         </p:txBody>
@@ -6650,7 +6641,7 @@
           <a:p>
             <a:r>
               <a:rPr lang="en-US" dirty="0"/>
-              <a:t>None</a:t>
+              <a:t>Team</a:t>
             </a:r>
           </a:p>
         </p:txBody>
@@ -6658,7 +6649,7 @@
     </p:spTree>
     <p:extLst>
       <p:ext uri="{BB962C8B-B14F-4D97-AF65-F5344CB8AC3E}">
-        <p14:creationId xmlns:p14="http://schemas.microsoft.com/office/powerpoint/2010/main" val="1682596430"/>
+        <p14:creationId xmlns:p14="http://schemas.microsoft.com/office/powerpoint/2010/main" val="4075474463"/>
       </p:ext>
     </p:extLst>
   </p:cSld>
@@ -6713,7 +6704,15 @@
           <a:p>
             <a:r>
               <a:rPr lang="en-US" dirty="0"/>
-              <a:t>Class Name</a:t>
+              <a:t>Player (</a:t>
+            </a:r>
+            <a:r>
+              <a:rPr lang="en-US" dirty="0" err="1"/>
+              <a:t>Abstact</a:t>
+            </a:r>
+            <a:r>
+              <a:rPr lang="en-US" dirty="0"/>
+              <a:t>)</a:t>
             </a:r>
           </a:p>
         </p:txBody>
@@ -6746,7 +6745,13 @@
           <a:p>
             <a:r>
               <a:rPr lang="en-US" dirty="0"/>
-              <a:t>Responsibilities</a:t>
+              <a:t>Store player name, age, Team, and role on team</a:t>
+            </a:r>
+          </a:p>
+          <a:p>
+            <a:r>
+              <a:rPr lang="en-US" dirty="0"/>
+              <a:t>Getters and setters for above</a:t>
             </a:r>
           </a:p>
         </p:txBody>
@@ -6800,19 +6805,24 @@
           <a:p>
             <a:r>
               <a:rPr lang="en-US" sz="3000" dirty="0"/>
-              <a:t>Parent:</a:t>
+              <a:t>Parent: None</a:t>
             </a:r>
           </a:p>
           <a:p>
             <a:r>
               <a:rPr lang="en-US" sz="3000" dirty="0"/>
-              <a:t>Subclasses:</a:t>
-            </a:r>
+              <a:t>Subclasses: </a:t>
+            </a:r>
+            <a:r>
+              <a:rPr lang="en-US" sz="3000" dirty="0" err="1"/>
+              <a:t>HockeyPlayer</a:t>
+            </a:r>
+            <a:endParaRPr lang="en-US" sz="3000" dirty="0"/>
           </a:p>
           <a:p>
             <a:r>
               <a:rPr lang="en-US" sz="3000" dirty="0"/>
-              <a:t>Layer:</a:t>
+              <a:t>Layer: Entity</a:t>
             </a:r>
           </a:p>
         </p:txBody>
@@ -7011,7 +7021,7 @@
           <a:p>
             <a:r>
               <a:rPr lang="en-US" dirty="0"/>
-              <a:t>Collaborators</a:t>
+              <a:t>None</a:t>
             </a:r>
           </a:p>
         </p:txBody>
@@ -7019,7 +7029,7 @@
     </p:spTree>
     <p:extLst>
       <p:ext uri="{BB962C8B-B14F-4D97-AF65-F5344CB8AC3E}">
-        <p14:creationId xmlns:p14="http://schemas.microsoft.com/office/powerpoint/2010/main" val="2553747706"/>
+        <p14:creationId xmlns:p14="http://schemas.microsoft.com/office/powerpoint/2010/main" val="1735516745"/>
       </p:ext>
     </p:extLst>
   </p:cSld>
@@ -7048,583 +7058,339 @@
       </p:grpSpPr>
       <p:sp>
         <p:nvSpPr>
-          <p:cNvPr id="4" name="TextBox 3">
-            <a:extLst>
-              <a:ext uri="{FF2B5EF4-FFF2-40B4-BE49-F238E27FC236}">
-                <a16:creationId xmlns:a16="http://schemas.microsoft.com/office/drawing/2014/main" id="{49D23066-0188-1F4D-AB8C-1B2C53DC9783}"/>
-              </a:ext>
-            </a:extLst>
-          </p:cNvPr>
-          <p:cNvSpPr txBox="1"/>
+          <p:cNvPr id="2" name="Title 1">
+            <a:extLst>
+              <a:ext uri="{FF2B5EF4-FFF2-40B4-BE49-F238E27FC236}">
+                <a16:creationId xmlns:a16="http://schemas.microsoft.com/office/drawing/2014/main" id="{2EBAA245-5362-5D4F-90E0-C47F441ED271}"/>
+              </a:ext>
+            </a:extLst>
+          </p:cNvPr>
+          <p:cNvSpPr>
+            <a:spLocks noGrp="1"/>
+          </p:cNvSpPr>
+          <p:nvPr>
+            <p:ph type="title"/>
+          </p:nvPr>
+        </p:nvSpPr>
+        <p:spPr>
+          <a:xfrm>
+            <a:off x="441593" y="365125"/>
+            <a:ext cx="5257800" cy="1325563"/>
+          </a:xfrm>
+        </p:spPr>
+        <p:txBody>
+          <a:bodyPr/>
+          <a:lstStyle/>
+          <a:p>
+            <a:r>
+              <a:rPr lang="en-US" dirty="0" err="1"/>
+              <a:t>HockeyPlayer</a:t>
+            </a:r>
+            <a:endParaRPr lang="en-US" dirty="0"/>
+          </a:p>
+        </p:txBody>
+      </p:sp>
+      <p:sp>
+        <p:nvSpPr>
+          <p:cNvPr id="3" name="Content Placeholder 2">
+            <a:extLst>
+              <a:ext uri="{FF2B5EF4-FFF2-40B4-BE49-F238E27FC236}">
+                <a16:creationId xmlns:a16="http://schemas.microsoft.com/office/drawing/2014/main" id="{F876DD7D-2457-D840-8CB0-3144388C4EC5}"/>
+              </a:ext>
+            </a:extLst>
+          </p:cNvPr>
+          <p:cNvSpPr>
+            <a:spLocks noGrp="1"/>
+          </p:cNvSpPr>
+          <p:nvPr>
+            <p:ph idx="1"/>
+          </p:nvPr>
+        </p:nvSpPr>
+        <p:spPr>
+          <a:xfrm>
+            <a:off x="441593" y="1891727"/>
+            <a:ext cx="5257800" cy="4351338"/>
+          </a:xfrm>
+        </p:spPr>
+        <p:txBody>
+          <a:bodyPr/>
+          <a:lstStyle/>
+          <a:p>
+            <a:r>
+              <a:rPr lang="en-US" dirty="0"/>
+              <a:t>Store player role on Hockey team</a:t>
+            </a:r>
+          </a:p>
+          <a:p>
+            <a:r>
+              <a:rPr lang="en-US" dirty="0"/>
+              <a:t>Getters and setters for above</a:t>
+            </a:r>
+          </a:p>
+        </p:txBody>
+      </p:sp>
+      <p:sp>
+        <p:nvSpPr>
+          <p:cNvPr id="5" name="Title 1">
+            <a:extLst>
+              <a:ext uri="{FF2B5EF4-FFF2-40B4-BE49-F238E27FC236}">
+                <a16:creationId xmlns:a16="http://schemas.microsoft.com/office/drawing/2014/main" id="{32F3D66D-F148-614A-AFF2-6011F7282B4F}"/>
+              </a:ext>
+            </a:extLst>
+          </p:cNvPr>
+          <p:cNvSpPr txBox="1">
+            <a:spLocks/>
+          </p:cNvSpPr>
           <p:nvPr/>
         </p:nvSpPr>
         <p:spPr>
           <a:xfrm>
-            <a:off x="5352361" y="110168"/>
-            <a:ext cx="1487277" cy="369332"/>
+            <a:off x="6492607" y="365125"/>
+            <a:ext cx="5257800" cy="1325563"/>
           </a:xfrm>
           <a:prstGeom prst="rect">
             <a:avLst/>
           </a:prstGeom>
         </p:spPr>
-        <p:style>
-          <a:lnRef idx="2">
-            <a:schemeClr val="dk1"/>
-          </a:lnRef>
-          <a:fillRef idx="1">
-            <a:schemeClr val="lt1"/>
-          </a:fillRef>
-          <a:effectRef idx="0">
-            <a:schemeClr val="dk1"/>
-          </a:effectRef>
-          <a:fontRef idx="minor">
-            <a:schemeClr val="dk1"/>
-          </a:fontRef>
-        </p:style>
-        <p:txBody>
-          <a:bodyPr wrap="square" rtlCol="0">
-            <a:spAutoFit/>
+        <p:txBody>
+          <a:bodyPr vert="horz" lIns="91440" tIns="45720" rIns="91440" bIns="45720" rtlCol="0" anchor="ctr">
+            <a:normAutofit lnSpcReduction="10000"/>
           </a:bodyPr>
-          <a:lstStyle/>
-          <a:p>
-            <a:r>
-              <a:rPr lang="en-US" dirty="0" err="1"/>
-              <a:t>UserInterface</a:t>
-            </a:r>
-            <a:endParaRPr lang="en-US" dirty="0"/>
-          </a:p>
-        </p:txBody>
-      </p:sp>
-      <p:sp>
-        <p:nvSpPr>
-          <p:cNvPr id="5" name="TextBox 4">
-            <a:extLst>
-              <a:ext uri="{FF2B5EF4-FFF2-40B4-BE49-F238E27FC236}">
-                <a16:creationId xmlns:a16="http://schemas.microsoft.com/office/drawing/2014/main" id="{D830C571-6283-864C-A751-80BE78ADA16E}"/>
-              </a:ext>
-            </a:extLst>
-          </p:cNvPr>
-          <p:cNvSpPr txBox="1"/>
+          <a:lstStyle>
+            <a:lvl1pPr algn="l" defTabSz="914400" rtl="0" eaLnBrk="1" latinLnBrk="0" hangingPunct="1">
+              <a:lnSpc>
+                <a:spcPct val="90000"/>
+              </a:lnSpc>
+              <a:spcBef>
+                <a:spcPct val="0"/>
+              </a:spcBef>
+              <a:buNone/>
+              <a:defRPr sz="4400" kern="1200">
+                <a:solidFill>
+                  <a:schemeClr val="tx1"/>
+                </a:solidFill>
+                <a:latin typeface="+mj-lt"/>
+                <a:ea typeface="+mj-ea"/>
+                <a:cs typeface="+mj-cs"/>
+              </a:defRPr>
+            </a:lvl1pPr>
+          </a:lstStyle>
+          <a:p>
+            <a:r>
+              <a:rPr lang="en-US" sz="3000" dirty="0"/>
+              <a:t>Parent: </a:t>
+            </a:r>
+            <a:r>
+              <a:rPr lang="en-US" sz="3000" dirty="0" err="1"/>
+              <a:t>HockeyPlayer</a:t>
+            </a:r>
+            <a:endParaRPr lang="en-US" sz="3000" dirty="0"/>
+          </a:p>
+          <a:p>
+            <a:r>
+              <a:rPr lang="en-US" sz="3000" dirty="0"/>
+              <a:t>Subclasses: None</a:t>
+            </a:r>
+          </a:p>
+          <a:p>
+            <a:r>
+              <a:rPr lang="en-US" sz="3000" dirty="0"/>
+              <a:t>Layer: Entity</a:t>
+            </a:r>
+          </a:p>
+        </p:txBody>
+      </p:sp>
+      <p:sp>
+        <p:nvSpPr>
+          <p:cNvPr id="7" name="Content Placeholder 2">
+            <a:extLst>
+              <a:ext uri="{FF2B5EF4-FFF2-40B4-BE49-F238E27FC236}">
+                <a16:creationId xmlns:a16="http://schemas.microsoft.com/office/drawing/2014/main" id="{BBA97EAA-FAAE-6342-A893-4A0CAE51C8C2}"/>
+              </a:ext>
+            </a:extLst>
+          </p:cNvPr>
+          <p:cNvSpPr txBox="1">
+            <a:spLocks/>
+          </p:cNvSpPr>
           <p:nvPr/>
         </p:nvSpPr>
         <p:spPr>
           <a:xfrm>
-            <a:off x="1792078" y="933546"/>
-            <a:ext cx="1259595" cy="369332"/>
+            <a:off x="6492607" y="1891727"/>
+            <a:ext cx="5257800" cy="4351338"/>
           </a:xfrm>
           <a:prstGeom prst="rect">
             <a:avLst/>
           </a:prstGeom>
         </p:spPr>
-        <p:style>
-          <a:lnRef idx="2">
-            <a:schemeClr val="dk1"/>
-          </a:lnRef>
-          <a:fillRef idx="1">
-            <a:schemeClr val="lt1"/>
-          </a:fillRef>
-          <a:effectRef idx="0">
-            <a:schemeClr val="dk1"/>
-          </a:effectRef>
-          <a:fontRef idx="minor">
-            <a:schemeClr val="dk1"/>
-          </a:fontRef>
-        </p:style>
-        <p:txBody>
-          <a:bodyPr wrap="square" rtlCol="0">
-            <a:spAutoFit/>
+        <p:txBody>
+          <a:bodyPr vert="horz" lIns="91440" tIns="45720" rIns="91440" bIns="45720" rtlCol="0">
+            <a:normAutofit/>
           </a:bodyPr>
-          <a:lstStyle/>
-          <a:p>
-            <a:r>
-              <a:rPr lang="en-US" dirty="0" err="1"/>
-              <a:t>InputParser</a:t>
-            </a:r>
-            <a:endParaRPr lang="en-US" dirty="0"/>
-          </a:p>
-        </p:txBody>
-      </p:sp>
-      <p:sp>
-        <p:nvSpPr>
-          <p:cNvPr id="6" name="TextBox 5">
-            <a:extLst>
-              <a:ext uri="{FF2B5EF4-FFF2-40B4-BE49-F238E27FC236}">
-                <a16:creationId xmlns:a16="http://schemas.microsoft.com/office/drawing/2014/main" id="{963E0F7A-FB21-B24B-9C5A-7D6275B1A9C4}"/>
-              </a:ext>
-            </a:extLst>
-          </p:cNvPr>
-          <p:cNvSpPr txBox="1"/>
-          <p:nvPr/>
-        </p:nvSpPr>
-        <p:spPr>
-          <a:xfrm>
-            <a:off x="9632413" y="891863"/>
-            <a:ext cx="1487277" cy="369332"/>
-          </a:xfrm>
-          <a:prstGeom prst="rect">
-            <a:avLst/>
-          </a:prstGeom>
-        </p:spPr>
-        <p:style>
-          <a:lnRef idx="2">
-            <a:schemeClr val="dk1"/>
-          </a:lnRef>
-          <a:fillRef idx="1">
-            <a:schemeClr val="lt1"/>
-          </a:fillRef>
-          <a:effectRef idx="0">
-            <a:schemeClr val="dk1"/>
-          </a:effectRef>
-          <a:fontRef idx="minor">
-            <a:schemeClr val="dk1"/>
-          </a:fontRef>
-        </p:style>
-        <p:txBody>
-          <a:bodyPr wrap="square" rtlCol="0">
-            <a:spAutoFit/>
-          </a:bodyPr>
-          <a:lstStyle/>
-          <a:p>
-            <a:r>
-              <a:rPr lang="en-US" dirty="0" err="1"/>
-              <a:t>OutputParser</a:t>
-            </a:r>
-            <a:endParaRPr lang="en-US" dirty="0"/>
-          </a:p>
-        </p:txBody>
-      </p:sp>
-      <p:sp>
-        <p:nvSpPr>
-          <p:cNvPr id="7" name="TextBox 6">
-            <a:extLst>
-              <a:ext uri="{FF2B5EF4-FFF2-40B4-BE49-F238E27FC236}">
-                <a16:creationId xmlns:a16="http://schemas.microsoft.com/office/drawing/2014/main" id="{DE5A8A2D-01AD-AF4E-9027-9780080DB718}"/>
-              </a:ext>
-            </a:extLst>
-          </p:cNvPr>
-          <p:cNvSpPr txBox="1"/>
-          <p:nvPr/>
-        </p:nvSpPr>
-        <p:spPr>
-          <a:xfrm>
-            <a:off x="5087954" y="1819651"/>
-            <a:ext cx="1979363" cy="369332"/>
-          </a:xfrm>
-          <a:prstGeom prst="rect">
-            <a:avLst/>
-          </a:prstGeom>
-        </p:spPr>
-        <p:style>
-          <a:lnRef idx="2">
-            <a:schemeClr val="dk1"/>
-          </a:lnRef>
-          <a:fillRef idx="1">
-            <a:schemeClr val="lt1"/>
-          </a:fillRef>
-          <a:effectRef idx="0">
-            <a:schemeClr val="dk1"/>
-          </a:effectRef>
-          <a:fontRef idx="minor">
-            <a:schemeClr val="dk1"/>
-          </a:fontRef>
-        </p:style>
-        <p:txBody>
-          <a:bodyPr wrap="square" rtlCol="0">
-            <a:spAutoFit/>
-          </a:bodyPr>
-          <a:lstStyle/>
-          <a:p>
-            <a:r>
-              <a:rPr lang="en-US" dirty="0" err="1"/>
-              <a:t>CommandManager</a:t>
-            </a:r>
-            <a:endParaRPr lang="en-US" dirty="0"/>
-          </a:p>
-        </p:txBody>
-      </p:sp>
-      <p:sp>
-        <p:nvSpPr>
-          <p:cNvPr id="8" name="TextBox 7">
-            <a:extLst>
-              <a:ext uri="{FF2B5EF4-FFF2-40B4-BE49-F238E27FC236}">
-                <a16:creationId xmlns:a16="http://schemas.microsoft.com/office/drawing/2014/main" id="{AA29B74B-C6F7-7840-820D-68A028E58E48}"/>
-              </a:ext>
-            </a:extLst>
-          </p:cNvPr>
-          <p:cNvSpPr txBox="1"/>
-          <p:nvPr/>
-        </p:nvSpPr>
-        <p:spPr>
-          <a:xfrm>
-            <a:off x="1753520" y="4119523"/>
-            <a:ext cx="1979363" cy="369332"/>
-          </a:xfrm>
-          <a:prstGeom prst="rect">
-            <a:avLst/>
-          </a:prstGeom>
-        </p:spPr>
-        <p:style>
-          <a:lnRef idx="2">
-            <a:schemeClr val="dk1"/>
-          </a:lnRef>
-          <a:fillRef idx="1">
-            <a:schemeClr val="lt1"/>
-          </a:fillRef>
-          <a:effectRef idx="0">
-            <a:schemeClr val="dk1"/>
-          </a:effectRef>
-          <a:fontRef idx="minor">
-            <a:schemeClr val="dk1"/>
-          </a:fontRef>
-        </p:style>
-        <p:txBody>
-          <a:bodyPr wrap="square" rtlCol="0">
-            <a:spAutoFit/>
-          </a:bodyPr>
-          <a:lstStyle/>
-          <a:p>
-            <a:r>
-              <a:rPr lang="en-US" dirty="0" err="1"/>
-              <a:t>PlayerStatManager</a:t>
-            </a:r>
-            <a:endParaRPr lang="en-US" dirty="0"/>
-          </a:p>
-        </p:txBody>
-      </p:sp>
-      <p:sp>
-        <p:nvSpPr>
-          <p:cNvPr id="9" name="TextBox 8">
-            <a:extLst>
-              <a:ext uri="{FF2B5EF4-FFF2-40B4-BE49-F238E27FC236}">
-                <a16:creationId xmlns:a16="http://schemas.microsoft.com/office/drawing/2014/main" id="{46DEE092-B650-7945-9A50-ECC28064AD74}"/>
-              </a:ext>
-            </a:extLst>
-          </p:cNvPr>
-          <p:cNvSpPr txBox="1"/>
-          <p:nvPr/>
-        </p:nvSpPr>
-        <p:spPr>
-          <a:xfrm>
-            <a:off x="270830" y="2967335"/>
-            <a:ext cx="2095043" cy="369332"/>
-          </a:xfrm>
-          <a:prstGeom prst="rect">
-            <a:avLst/>
-          </a:prstGeom>
-        </p:spPr>
-        <p:style>
-          <a:lnRef idx="2">
-            <a:schemeClr val="dk1"/>
-          </a:lnRef>
-          <a:fillRef idx="1">
-            <a:schemeClr val="lt1"/>
-          </a:fillRef>
-          <a:effectRef idx="0">
-            <a:schemeClr val="dk1"/>
-          </a:effectRef>
-          <a:fontRef idx="minor">
-            <a:schemeClr val="dk1"/>
-          </a:fontRef>
-        </p:style>
-        <p:txBody>
-          <a:bodyPr wrap="square" rtlCol="0">
-            <a:spAutoFit/>
-          </a:bodyPr>
-          <a:lstStyle/>
-          <a:p>
-            <a:r>
-              <a:rPr lang="en-US" dirty="0" err="1"/>
-              <a:t>PlayerStatComparer</a:t>
-            </a:r>
-            <a:endParaRPr lang="en-US" dirty="0"/>
-          </a:p>
-        </p:txBody>
-      </p:sp>
-      <p:sp>
-        <p:nvSpPr>
-          <p:cNvPr id="10" name="TextBox 9">
-            <a:extLst>
-              <a:ext uri="{FF2B5EF4-FFF2-40B4-BE49-F238E27FC236}">
-                <a16:creationId xmlns:a16="http://schemas.microsoft.com/office/drawing/2014/main" id="{000FE2A6-CC73-C549-B59E-E683039F7368}"/>
-              </a:ext>
-            </a:extLst>
-          </p:cNvPr>
-          <p:cNvSpPr txBox="1"/>
-          <p:nvPr/>
-        </p:nvSpPr>
-        <p:spPr>
-          <a:xfrm>
-            <a:off x="3126954" y="2963544"/>
-            <a:ext cx="1979363" cy="369332"/>
-          </a:xfrm>
-          <a:prstGeom prst="rect">
-            <a:avLst/>
-          </a:prstGeom>
-        </p:spPr>
-        <p:style>
-          <a:lnRef idx="2">
-            <a:schemeClr val="dk1"/>
-          </a:lnRef>
-          <a:fillRef idx="1">
-            <a:schemeClr val="lt1"/>
-          </a:fillRef>
-          <a:effectRef idx="0">
-            <a:schemeClr val="dk1"/>
-          </a:effectRef>
-          <a:fontRef idx="minor">
-            <a:schemeClr val="dk1"/>
-          </a:fontRef>
-        </p:style>
-        <p:txBody>
-          <a:bodyPr wrap="square" rtlCol="0">
-            <a:spAutoFit/>
-          </a:bodyPr>
-          <a:lstStyle/>
-          <a:p>
-            <a:r>
-              <a:rPr lang="en-US" dirty="0" err="1"/>
-              <a:t>PlayerStatPredictor</a:t>
-            </a:r>
-            <a:endParaRPr lang="en-US" dirty="0"/>
-          </a:p>
-        </p:txBody>
-      </p:sp>
-      <p:sp>
-        <p:nvSpPr>
-          <p:cNvPr id="11" name="TextBox 10">
-            <a:extLst>
-              <a:ext uri="{FF2B5EF4-FFF2-40B4-BE49-F238E27FC236}">
-                <a16:creationId xmlns:a16="http://schemas.microsoft.com/office/drawing/2014/main" id="{415162AC-277A-E94A-BB5E-21F0CA3BC13E}"/>
-              </a:ext>
-            </a:extLst>
-          </p:cNvPr>
-          <p:cNvSpPr txBox="1"/>
-          <p:nvPr/>
-        </p:nvSpPr>
-        <p:spPr>
-          <a:xfrm>
-            <a:off x="6668876" y="2963544"/>
-            <a:ext cx="1979363" cy="369332"/>
-          </a:xfrm>
-          <a:prstGeom prst="rect">
-            <a:avLst/>
-          </a:prstGeom>
-        </p:spPr>
-        <p:style>
-          <a:lnRef idx="2">
-            <a:schemeClr val="dk1"/>
-          </a:lnRef>
-          <a:fillRef idx="1">
-            <a:schemeClr val="lt1"/>
-          </a:fillRef>
-          <a:effectRef idx="0">
-            <a:schemeClr val="dk1"/>
-          </a:effectRef>
-          <a:fontRef idx="minor">
-            <a:schemeClr val="dk1"/>
-          </a:fontRef>
-        </p:style>
-        <p:txBody>
-          <a:bodyPr wrap="square" rtlCol="0">
-            <a:spAutoFit/>
-          </a:bodyPr>
-          <a:lstStyle/>
-          <a:p>
-            <a:r>
-              <a:rPr lang="en-US" dirty="0" err="1"/>
-              <a:t>TeamStatComparer</a:t>
-            </a:r>
-            <a:endParaRPr lang="en-US" dirty="0"/>
-          </a:p>
-        </p:txBody>
-      </p:sp>
-      <p:sp>
-        <p:nvSpPr>
-          <p:cNvPr id="12" name="TextBox 11">
-            <a:extLst>
-              <a:ext uri="{FF2B5EF4-FFF2-40B4-BE49-F238E27FC236}">
-                <a16:creationId xmlns:a16="http://schemas.microsoft.com/office/drawing/2014/main" id="{6083AA40-A151-6C49-A7C7-A182CD36CF97}"/>
-              </a:ext>
-            </a:extLst>
-          </p:cNvPr>
-          <p:cNvSpPr txBox="1"/>
-          <p:nvPr/>
-        </p:nvSpPr>
-        <p:spPr>
-          <a:xfrm>
-            <a:off x="9883966" y="2963544"/>
-            <a:ext cx="1979363" cy="369332"/>
-          </a:xfrm>
-          <a:prstGeom prst="rect">
-            <a:avLst/>
-          </a:prstGeom>
-        </p:spPr>
-        <p:style>
-          <a:lnRef idx="2">
-            <a:schemeClr val="dk1"/>
-          </a:lnRef>
-          <a:fillRef idx="1">
-            <a:schemeClr val="lt1"/>
-          </a:fillRef>
-          <a:effectRef idx="0">
-            <a:schemeClr val="dk1"/>
-          </a:effectRef>
-          <a:fontRef idx="minor">
-            <a:schemeClr val="dk1"/>
-          </a:fontRef>
-        </p:style>
-        <p:txBody>
-          <a:bodyPr wrap="square" rtlCol="0">
-            <a:spAutoFit/>
-          </a:bodyPr>
-          <a:lstStyle/>
-          <a:p>
-            <a:r>
-              <a:rPr lang="en-US" dirty="0" err="1"/>
-              <a:t>TeamStatPredictor</a:t>
-            </a:r>
-            <a:endParaRPr lang="en-US" dirty="0"/>
-          </a:p>
-        </p:txBody>
-      </p:sp>
-      <p:sp>
-        <p:nvSpPr>
-          <p:cNvPr id="13" name="TextBox 12">
-            <a:extLst>
-              <a:ext uri="{FF2B5EF4-FFF2-40B4-BE49-F238E27FC236}">
-                <a16:creationId xmlns:a16="http://schemas.microsoft.com/office/drawing/2014/main" id="{1006AA07-B16A-1E4A-B760-B815790714BA}"/>
-              </a:ext>
-            </a:extLst>
-          </p:cNvPr>
-          <p:cNvSpPr txBox="1"/>
-          <p:nvPr/>
-        </p:nvSpPr>
-        <p:spPr>
-          <a:xfrm>
-            <a:off x="8396689" y="4107437"/>
-            <a:ext cx="1979363" cy="369332"/>
-          </a:xfrm>
-          <a:prstGeom prst="rect">
-            <a:avLst/>
-          </a:prstGeom>
-        </p:spPr>
-        <p:style>
-          <a:lnRef idx="2">
-            <a:schemeClr val="dk1"/>
-          </a:lnRef>
-          <a:fillRef idx="1">
-            <a:schemeClr val="lt1"/>
-          </a:fillRef>
-          <a:effectRef idx="0">
-            <a:schemeClr val="dk1"/>
-          </a:effectRef>
-          <a:fontRef idx="minor">
-            <a:schemeClr val="dk1"/>
-          </a:fontRef>
-        </p:style>
-        <p:txBody>
-          <a:bodyPr wrap="square" rtlCol="0">
-            <a:spAutoFit/>
-          </a:bodyPr>
-          <a:lstStyle/>
-          <a:p>
-            <a:r>
-              <a:rPr lang="en-US" dirty="0" err="1"/>
-              <a:t>TeamStatManager</a:t>
-            </a:r>
-            <a:endParaRPr lang="en-US" dirty="0"/>
-          </a:p>
-        </p:txBody>
-      </p:sp>
-      <p:sp>
-        <p:nvSpPr>
-          <p:cNvPr id="14" name="TextBox 13">
-            <a:extLst>
-              <a:ext uri="{FF2B5EF4-FFF2-40B4-BE49-F238E27FC236}">
-                <a16:creationId xmlns:a16="http://schemas.microsoft.com/office/drawing/2014/main" id="{75CBA68F-7821-DC4F-B0EA-1F5B11784E2E}"/>
-              </a:ext>
-            </a:extLst>
-          </p:cNvPr>
-          <p:cNvSpPr txBox="1"/>
-          <p:nvPr/>
-        </p:nvSpPr>
-        <p:spPr>
-          <a:xfrm>
-            <a:off x="723439" y="5590927"/>
-            <a:ext cx="1642434" cy="369332"/>
-          </a:xfrm>
-          <a:prstGeom prst="rect">
-            <a:avLst/>
-          </a:prstGeom>
-        </p:spPr>
-        <p:style>
-          <a:lnRef idx="2">
-            <a:schemeClr val="dk1"/>
-          </a:lnRef>
-          <a:fillRef idx="1">
-            <a:schemeClr val="lt1"/>
-          </a:fillRef>
-          <a:effectRef idx="0">
-            <a:schemeClr val="dk1"/>
-          </a:effectRef>
-          <a:fontRef idx="minor">
-            <a:schemeClr val="dk1"/>
-          </a:fontRef>
-        </p:style>
-        <p:txBody>
-          <a:bodyPr wrap="square" rtlCol="0">
-            <a:spAutoFit/>
-          </a:bodyPr>
-          <a:lstStyle/>
-          <a:p>
-            <a:r>
-              <a:rPr lang="en-US" dirty="0" err="1"/>
-              <a:t>TeamManager</a:t>
-            </a:r>
-            <a:endParaRPr lang="en-US" dirty="0"/>
-          </a:p>
-        </p:txBody>
-      </p:sp>
-      <p:sp>
-        <p:nvSpPr>
-          <p:cNvPr id="15" name="TextBox 14">
-            <a:extLst>
-              <a:ext uri="{FF2B5EF4-FFF2-40B4-BE49-F238E27FC236}">
-                <a16:creationId xmlns:a16="http://schemas.microsoft.com/office/drawing/2014/main" id="{7DA7A1E2-F9EB-AB41-B992-6E4830D8BC89}"/>
-              </a:ext>
-            </a:extLst>
-          </p:cNvPr>
-          <p:cNvSpPr txBox="1"/>
-          <p:nvPr/>
-        </p:nvSpPr>
-        <p:spPr>
-          <a:xfrm>
-            <a:off x="7197686" y="5435903"/>
-            <a:ext cx="1659876" cy="369332"/>
-          </a:xfrm>
-          <a:prstGeom prst="rect">
-            <a:avLst/>
-          </a:prstGeom>
-        </p:spPr>
-        <p:style>
-          <a:lnRef idx="2">
-            <a:schemeClr val="dk1"/>
-          </a:lnRef>
-          <a:fillRef idx="1">
-            <a:schemeClr val="lt1"/>
-          </a:fillRef>
-          <a:effectRef idx="0">
-            <a:schemeClr val="dk1"/>
-          </a:effectRef>
-          <a:fontRef idx="minor">
-            <a:schemeClr val="dk1"/>
-          </a:fontRef>
-        </p:style>
-        <p:txBody>
-          <a:bodyPr wrap="square" rtlCol="0">
-            <a:spAutoFit/>
-          </a:bodyPr>
-          <a:lstStyle/>
+          <a:lstStyle>
+            <a:lvl1pPr marL="228600" indent="-228600" algn="l" defTabSz="914400" rtl="0" eaLnBrk="1" latinLnBrk="0" hangingPunct="1">
+              <a:lnSpc>
+                <a:spcPct val="90000"/>
+              </a:lnSpc>
+              <a:spcBef>
+                <a:spcPts val="1000"/>
+              </a:spcBef>
+              <a:buFont typeface="Arial" panose="020B0604020202020204" pitchFamily="34" charset="0"/>
+              <a:buChar char="•"/>
+              <a:defRPr sz="2800" kern="1200">
+                <a:solidFill>
+                  <a:schemeClr val="tx1"/>
+                </a:solidFill>
+                <a:latin typeface="+mn-lt"/>
+                <a:ea typeface="+mn-ea"/>
+                <a:cs typeface="+mn-cs"/>
+              </a:defRPr>
+            </a:lvl1pPr>
+            <a:lvl2pPr marL="685800" indent="-228600" algn="l" defTabSz="914400" rtl="0" eaLnBrk="1" latinLnBrk="0" hangingPunct="1">
+              <a:lnSpc>
+                <a:spcPct val="90000"/>
+              </a:lnSpc>
+              <a:spcBef>
+                <a:spcPts val="500"/>
+              </a:spcBef>
+              <a:buFont typeface="Arial" panose="020B0604020202020204" pitchFamily="34" charset="0"/>
+              <a:buChar char="•"/>
+              <a:defRPr sz="2400" kern="1200">
+                <a:solidFill>
+                  <a:schemeClr val="tx1"/>
+                </a:solidFill>
+                <a:latin typeface="+mn-lt"/>
+                <a:ea typeface="+mn-ea"/>
+                <a:cs typeface="+mn-cs"/>
+              </a:defRPr>
+            </a:lvl2pPr>
+            <a:lvl3pPr marL="1143000" indent="-228600" algn="l" defTabSz="914400" rtl="0" eaLnBrk="1" latinLnBrk="0" hangingPunct="1">
+              <a:lnSpc>
+                <a:spcPct val="90000"/>
+              </a:lnSpc>
+              <a:spcBef>
+                <a:spcPts val="500"/>
+              </a:spcBef>
+              <a:buFont typeface="Arial" panose="020B0604020202020204" pitchFamily="34" charset="0"/>
+              <a:buChar char="•"/>
+              <a:defRPr sz="2000" kern="1200">
+                <a:solidFill>
+                  <a:schemeClr val="tx1"/>
+                </a:solidFill>
+                <a:latin typeface="+mn-lt"/>
+                <a:ea typeface="+mn-ea"/>
+                <a:cs typeface="+mn-cs"/>
+              </a:defRPr>
+            </a:lvl3pPr>
+            <a:lvl4pPr marL="1600200" indent="-228600" algn="l" defTabSz="914400" rtl="0" eaLnBrk="1" latinLnBrk="0" hangingPunct="1">
+              <a:lnSpc>
+                <a:spcPct val="90000"/>
+              </a:lnSpc>
+              <a:spcBef>
+                <a:spcPts val="500"/>
+              </a:spcBef>
+              <a:buFont typeface="Arial" panose="020B0604020202020204" pitchFamily="34" charset="0"/>
+              <a:buChar char="•"/>
+              <a:defRPr sz="1800" kern="1200">
+                <a:solidFill>
+                  <a:schemeClr val="tx1"/>
+                </a:solidFill>
+                <a:latin typeface="+mn-lt"/>
+                <a:ea typeface="+mn-ea"/>
+                <a:cs typeface="+mn-cs"/>
+              </a:defRPr>
+            </a:lvl4pPr>
+            <a:lvl5pPr marL="2057400" indent="-228600" algn="l" defTabSz="914400" rtl="0" eaLnBrk="1" latinLnBrk="0" hangingPunct="1">
+              <a:lnSpc>
+                <a:spcPct val="90000"/>
+              </a:lnSpc>
+              <a:spcBef>
+                <a:spcPts val="500"/>
+              </a:spcBef>
+              <a:buFont typeface="Arial" panose="020B0604020202020204" pitchFamily="34" charset="0"/>
+              <a:buChar char="•"/>
+              <a:defRPr sz="1800" kern="1200">
+                <a:solidFill>
+                  <a:schemeClr val="tx1"/>
+                </a:solidFill>
+                <a:latin typeface="+mn-lt"/>
+                <a:ea typeface="+mn-ea"/>
+                <a:cs typeface="+mn-cs"/>
+              </a:defRPr>
+            </a:lvl5pPr>
+            <a:lvl6pPr marL="2514600" indent="-228600" algn="l" defTabSz="914400" rtl="0" eaLnBrk="1" latinLnBrk="0" hangingPunct="1">
+              <a:lnSpc>
+                <a:spcPct val="90000"/>
+              </a:lnSpc>
+              <a:spcBef>
+                <a:spcPts val="500"/>
+              </a:spcBef>
+              <a:buFont typeface="Arial" panose="020B0604020202020204" pitchFamily="34" charset="0"/>
+              <a:buChar char="•"/>
+              <a:defRPr sz="1800" kern="1200">
+                <a:solidFill>
+                  <a:schemeClr val="tx1"/>
+                </a:solidFill>
+                <a:latin typeface="+mn-lt"/>
+                <a:ea typeface="+mn-ea"/>
+                <a:cs typeface="+mn-cs"/>
+              </a:defRPr>
+            </a:lvl6pPr>
+            <a:lvl7pPr marL="2971800" indent="-228600" algn="l" defTabSz="914400" rtl="0" eaLnBrk="1" latinLnBrk="0" hangingPunct="1">
+              <a:lnSpc>
+                <a:spcPct val="90000"/>
+              </a:lnSpc>
+              <a:spcBef>
+                <a:spcPts val="500"/>
+              </a:spcBef>
+              <a:buFont typeface="Arial" panose="020B0604020202020204" pitchFamily="34" charset="0"/>
+              <a:buChar char="•"/>
+              <a:defRPr sz="1800" kern="1200">
+                <a:solidFill>
+                  <a:schemeClr val="tx1"/>
+                </a:solidFill>
+                <a:latin typeface="+mn-lt"/>
+                <a:ea typeface="+mn-ea"/>
+                <a:cs typeface="+mn-cs"/>
+              </a:defRPr>
+            </a:lvl7pPr>
+            <a:lvl8pPr marL="3429000" indent="-228600" algn="l" defTabSz="914400" rtl="0" eaLnBrk="1" latinLnBrk="0" hangingPunct="1">
+              <a:lnSpc>
+                <a:spcPct val="90000"/>
+              </a:lnSpc>
+              <a:spcBef>
+                <a:spcPts val="500"/>
+              </a:spcBef>
+              <a:buFont typeface="Arial" panose="020B0604020202020204" pitchFamily="34" charset="0"/>
+              <a:buChar char="•"/>
+              <a:defRPr sz="1800" kern="1200">
+                <a:solidFill>
+                  <a:schemeClr val="tx1"/>
+                </a:solidFill>
+                <a:latin typeface="+mn-lt"/>
+                <a:ea typeface="+mn-ea"/>
+                <a:cs typeface="+mn-cs"/>
+              </a:defRPr>
+            </a:lvl8pPr>
+            <a:lvl9pPr marL="3886200" indent="-228600" algn="l" defTabSz="914400" rtl="0" eaLnBrk="1" latinLnBrk="0" hangingPunct="1">
+              <a:lnSpc>
+                <a:spcPct val="90000"/>
+              </a:lnSpc>
+              <a:spcBef>
+                <a:spcPts val="500"/>
+              </a:spcBef>
+              <a:buFont typeface="Arial" panose="020B0604020202020204" pitchFamily="34" charset="0"/>
+              <a:buChar char="•"/>
+              <a:defRPr sz="1800" kern="1200">
+                <a:solidFill>
+                  <a:schemeClr val="tx1"/>
+                </a:solidFill>
+                <a:latin typeface="+mn-lt"/>
+                <a:ea typeface="+mn-ea"/>
+                <a:cs typeface="+mn-cs"/>
+              </a:defRPr>
+            </a:lvl9pPr>
+          </a:lstStyle>
           <a:p>
             <a:r>
               <a:rPr lang="en-US" dirty="0" err="1"/>
@@ -7634,219 +7400,10 @@
           </a:p>
         </p:txBody>
       </p:sp>
-      <p:sp>
-        <p:nvSpPr>
-          <p:cNvPr id="16" name="TextBox 15">
-            <a:extLst>
-              <a:ext uri="{FF2B5EF4-FFF2-40B4-BE49-F238E27FC236}">
-                <a16:creationId xmlns:a16="http://schemas.microsoft.com/office/drawing/2014/main" id="{64671FA6-3B29-B647-8878-F5C982B0BE42}"/>
-              </a:ext>
-            </a:extLst>
-          </p:cNvPr>
-          <p:cNvSpPr txBox="1"/>
-          <p:nvPr/>
-        </p:nvSpPr>
-        <p:spPr>
-          <a:xfrm>
-            <a:off x="3051673" y="5589223"/>
-            <a:ext cx="1362420" cy="369332"/>
-          </a:xfrm>
-          <a:prstGeom prst="rect">
-            <a:avLst/>
-          </a:prstGeom>
-        </p:spPr>
-        <p:style>
-          <a:lnRef idx="2">
-            <a:schemeClr val="dk1"/>
-          </a:lnRef>
-          <a:fillRef idx="1">
-            <a:schemeClr val="lt1"/>
-          </a:fillRef>
-          <a:effectRef idx="0">
-            <a:schemeClr val="dk1"/>
-          </a:effectRef>
-          <a:fontRef idx="minor">
-            <a:schemeClr val="dk1"/>
-          </a:fontRef>
-        </p:style>
-        <p:txBody>
-          <a:bodyPr wrap="square" rtlCol="0">
-            <a:spAutoFit/>
-          </a:bodyPr>
-          <a:lstStyle/>
-          <a:p>
-            <a:r>
-              <a:rPr lang="en-US" dirty="0" err="1"/>
-              <a:t>HockeyTeam</a:t>
-            </a:r>
-            <a:endParaRPr lang="en-US" dirty="0"/>
-          </a:p>
-        </p:txBody>
-      </p:sp>
-      <p:sp>
-        <p:nvSpPr>
-          <p:cNvPr id="17" name="TextBox 16">
-            <a:extLst>
-              <a:ext uri="{FF2B5EF4-FFF2-40B4-BE49-F238E27FC236}">
-                <a16:creationId xmlns:a16="http://schemas.microsoft.com/office/drawing/2014/main" id="{397482C5-052C-6242-9539-F21B815F870A}"/>
-              </a:ext>
-            </a:extLst>
-          </p:cNvPr>
-          <p:cNvSpPr txBox="1"/>
-          <p:nvPr/>
-        </p:nvSpPr>
-        <p:spPr>
-          <a:xfrm>
-            <a:off x="9951901" y="5404557"/>
-            <a:ext cx="1432193" cy="369332"/>
-          </a:xfrm>
-          <a:prstGeom prst="rect">
-            <a:avLst/>
-          </a:prstGeom>
-        </p:spPr>
-        <p:style>
-          <a:lnRef idx="2">
-            <a:schemeClr val="dk1"/>
-          </a:lnRef>
-          <a:fillRef idx="1">
-            <a:schemeClr val="lt1"/>
-          </a:fillRef>
-          <a:effectRef idx="0">
-            <a:schemeClr val="dk1"/>
-          </a:effectRef>
-          <a:fontRef idx="minor">
-            <a:schemeClr val="dk1"/>
-          </a:fontRef>
-        </p:style>
-        <p:txBody>
-          <a:bodyPr wrap="square" rtlCol="0">
-            <a:spAutoFit/>
-          </a:bodyPr>
-          <a:lstStyle/>
-          <a:p>
-            <a:r>
-              <a:rPr lang="en-US" dirty="0" err="1"/>
-              <a:t>HockeyPlayer</a:t>
-            </a:r>
-            <a:endParaRPr lang="en-US" dirty="0"/>
-          </a:p>
-        </p:txBody>
-      </p:sp>
-      <p:cxnSp>
-        <p:nvCxnSpPr>
-          <p:cNvPr id="19" name="Straight Connector 18">
-            <a:extLst>
-              <a:ext uri="{FF2B5EF4-FFF2-40B4-BE49-F238E27FC236}">
-                <a16:creationId xmlns:a16="http://schemas.microsoft.com/office/drawing/2014/main" id="{A1DC68B2-5894-6742-B640-7434332DEE7D}"/>
-              </a:ext>
-            </a:extLst>
-          </p:cNvPr>
-          <p:cNvCxnSpPr/>
-          <p:nvPr/>
-        </p:nvCxnSpPr>
-        <p:spPr>
-          <a:xfrm>
-            <a:off x="270830" y="616945"/>
-            <a:ext cx="11682471" cy="0"/>
-          </a:xfrm>
-          <a:prstGeom prst="line">
-            <a:avLst/>
-          </a:prstGeom>
-          <a:ln w="28575"/>
-        </p:spPr>
-        <p:style>
-          <a:lnRef idx="1">
-            <a:schemeClr val="dk1"/>
-          </a:lnRef>
-          <a:fillRef idx="0">
-            <a:schemeClr val="dk1"/>
-          </a:fillRef>
-          <a:effectRef idx="0">
-            <a:schemeClr val="dk1"/>
-          </a:effectRef>
-          <a:fontRef idx="minor">
-            <a:schemeClr val="tx1"/>
-          </a:fontRef>
-        </p:style>
-      </p:cxnSp>
-      <p:cxnSp>
-        <p:nvCxnSpPr>
-          <p:cNvPr id="20" name="Straight Connector 19">
-            <a:extLst>
-              <a:ext uri="{FF2B5EF4-FFF2-40B4-BE49-F238E27FC236}">
-                <a16:creationId xmlns:a16="http://schemas.microsoft.com/office/drawing/2014/main" id="{28B1B928-B9F0-1B45-8123-69C7934B579D}"/>
-              </a:ext>
-            </a:extLst>
-          </p:cNvPr>
-          <p:cNvCxnSpPr/>
-          <p:nvPr/>
-        </p:nvCxnSpPr>
-        <p:spPr>
-          <a:xfrm>
-            <a:off x="272665" y="1628660"/>
-            <a:ext cx="11682471" cy="0"/>
-          </a:xfrm>
-          <a:prstGeom prst="line">
-            <a:avLst/>
-          </a:prstGeom>
-          <a:ln w="28575"/>
-        </p:spPr>
-        <p:style>
-          <a:lnRef idx="1">
-            <a:schemeClr val="dk1"/>
-          </a:lnRef>
-          <a:fillRef idx="0">
-            <a:schemeClr val="dk1"/>
-          </a:fillRef>
-          <a:effectRef idx="0">
-            <a:schemeClr val="dk1"/>
-          </a:effectRef>
-          <a:fontRef idx="minor">
-            <a:schemeClr val="tx1"/>
-          </a:fontRef>
-        </p:style>
-      </p:cxnSp>
-      <p:cxnSp>
-        <p:nvCxnSpPr>
-          <p:cNvPr id="21" name="Straight Connector 20">
-            <a:extLst>
-              <a:ext uri="{FF2B5EF4-FFF2-40B4-BE49-F238E27FC236}">
-                <a16:creationId xmlns:a16="http://schemas.microsoft.com/office/drawing/2014/main" id="{8A61A170-120C-C849-8933-798F87E54180}"/>
-              </a:ext>
-            </a:extLst>
-          </p:cNvPr>
-          <p:cNvCxnSpPr/>
-          <p:nvPr/>
-        </p:nvCxnSpPr>
-        <p:spPr>
-          <a:xfrm>
-            <a:off x="254763" y="3688815"/>
-            <a:ext cx="11682471" cy="0"/>
-          </a:xfrm>
-          <a:prstGeom prst="line">
-            <a:avLst/>
-          </a:prstGeom>
-          <a:ln w="28575"/>
-        </p:spPr>
-        <p:style>
-          <a:lnRef idx="1">
-            <a:schemeClr val="dk1"/>
-          </a:lnRef>
-          <a:fillRef idx="0">
-            <a:schemeClr val="dk1"/>
-          </a:fillRef>
-          <a:effectRef idx="0">
-            <a:schemeClr val="dk1"/>
-          </a:effectRef>
-          <a:fontRef idx="minor">
-            <a:schemeClr val="tx1"/>
-          </a:fontRef>
-        </p:style>
-      </p:cxnSp>
     </p:spTree>
     <p:extLst>
       <p:ext uri="{BB962C8B-B14F-4D97-AF65-F5344CB8AC3E}">
-        <p14:creationId xmlns:p14="http://schemas.microsoft.com/office/powerpoint/2010/main" val="3356510275"/>
+        <p14:creationId xmlns:p14="http://schemas.microsoft.com/office/powerpoint/2010/main" val="678215517"/>
       </p:ext>
     </p:extLst>
   </p:cSld>
@@ -8210,6 +7767,2738 @@
     <p:extLst>
       <p:ext uri="{BB962C8B-B14F-4D97-AF65-F5344CB8AC3E}">
         <p14:creationId xmlns:p14="http://schemas.microsoft.com/office/powerpoint/2010/main" val="2357991332"/>
+      </p:ext>
+    </p:extLst>
+  </p:cSld>
+  <p:clrMapOvr>
+    <a:masterClrMapping/>
+  </p:clrMapOvr>
+</p:sld>
+</file>
+
+<file path=ppt/slides/slide20.xml><?xml version="1.0" encoding="utf-8"?>
+<p:sld xmlns:a="http://schemas.openxmlformats.org/drawingml/2006/main" xmlns:r="http://schemas.openxmlformats.org/officeDocument/2006/relationships" xmlns:p="http://schemas.openxmlformats.org/presentationml/2006/main">
+  <p:cSld>
+    <p:spTree>
+      <p:nvGrpSpPr>
+        <p:cNvPr id="1" name=""/>
+        <p:cNvGrpSpPr/>
+        <p:nvPr/>
+      </p:nvGrpSpPr>
+      <p:grpSpPr>
+        <a:xfrm>
+          <a:off x="0" y="0"/>
+          <a:ext cx="0" cy="0"/>
+          <a:chOff x="0" y="0"/>
+          <a:chExt cx="0" cy="0"/>
+        </a:xfrm>
+      </p:grpSpPr>
+      <p:sp>
+        <p:nvSpPr>
+          <p:cNvPr id="2" name="Title 1">
+            <a:extLst>
+              <a:ext uri="{FF2B5EF4-FFF2-40B4-BE49-F238E27FC236}">
+                <a16:creationId xmlns:a16="http://schemas.microsoft.com/office/drawing/2014/main" id="{2EBAA245-5362-5D4F-90E0-C47F441ED271}"/>
+              </a:ext>
+            </a:extLst>
+          </p:cNvPr>
+          <p:cNvSpPr>
+            <a:spLocks noGrp="1"/>
+          </p:cNvSpPr>
+          <p:nvPr>
+            <p:ph type="title"/>
+          </p:nvPr>
+        </p:nvSpPr>
+        <p:spPr>
+          <a:xfrm>
+            <a:off x="441593" y="365125"/>
+            <a:ext cx="5257800" cy="1325563"/>
+          </a:xfrm>
+        </p:spPr>
+        <p:txBody>
+          <a:bodyPr/>
+          <a:lstStyle/>
+          <a:p>
+            <a:r>
+              <a:rPr lang="en-US" dirty="0" err="1"/>
+              <a:t>PlayerManager</a:t>
+            </a:r>
+            <a:endParaRPr lang="en-US" dirty="0"/>
+          </a:p>
+        </p:txBody>
+      </p:sp>
+      <p:sp>
+        <p:nvSpPr>
+          <p:cNvPr id="3" name="Content Placeholder 2">
+            <a:extLst>
+              <a:ext uri="{FF2B5EF4-FFF2-40B4-BE49-F238E27FC236}">
+                <a16:creationId xmlns:a16="http://schemas.microsoft.com/office/drawing/2014/main" id="{F876DD7D-2457-D840-8CB0-3144388C4EC5}"/>
+              </a:ext>
+            </a:extLst>
+          </p:cNvPr>
+          <p:cNvSpPr>
+            <a:spLocks noGrp="1"/>
+          </p:cNvSpPr>
+          <p:nvPr>
+            <p:ph idx="1"/>
+          </p:nvPr>
+        </p:nvSpPr>
+        <p:spPr>
+          <a:xfrm>
+            <a:off x="441593" y="1891727"/>
+            <a:ext cx="5257800" cy="4351338"/>
+          </a:xfrm>
+        </p:spPr>
+        <p:txBody>
+          <a:bodyPr/>
+          <a:lstStyle/>
+          <a:p>
+            <a:r>
+              <a:rPr lang="en-US" dirty="0"/>
+              <a:t>Store Players, with getter (for use cases to resolve argument name into Player object)</a:t>
+            </a:r>
+          </a:p>
+          <a:p>
+            <a:r>
+              <a:rPr lang="en-US" dirty="0"/>
+              <a:t>Create and record new Players</a:t>
+            </a:r>
+          </a:p>
+        </p:txBody>
+      </p:sp>
+      <p:sp>
+        <p:nvSpPr>
+          <p:cNvPr id="5" name="Title 1">
+            <a:extLst>
+              <a:ext uri="{FF2B5EF4-FFF2-40B4-BE49-F238E27FC236}">
+                <a16:creationId xmlns:a16="http://schemas.microsoft.com/office/drawing/2014/main" id="{32F3D66D-F148-614A-AFF2-6011F7282B4F}"/>
+              </a:ext>
+            </a:extLst>
+          </p:cNvPr>
+          <p:cNvSpPr txBox="1">
+            <a:spLocks/>
+          </p:cNvSpPr>
+          <p:nvPr/>
+        </p:nvSpPr>
+        <p:spPr>
+          <a:xfrm>
+            <a:off x="6492607" y="365125"/>
+            <a:ext cx="5257800" cy="1325563"/>
+          </a:xfrm>
+          <a:prstGeom prst="rect">
+            <a:avLst/>
+          </a:prstGeom>
+        </p:spPr>
+        <p:txBody>
+          <a:bodyPr vert="horz" lIns="91440" tIns="45720" rIns="91440" bIns="45720" rtlCol="0" anchor="ctr">
+            <a:normAutofit lnSpcReduction="10000"/>
+          </a:bodyPr>
+          <a:lstStyle>
+            <a:lvl1pPr algn="l" defTabSz="914400" rtl="0" eaLnBrk="1" latinLnBrk="0" hangingPunct="1">
+              <a:lnSpc>
+                <a:spcPct val="90000"/>
+              </a:lnSpc>
+              <a:spcBef>
+                <a:spcPct val="0"/>
+              </a:spcBef>
+              <a:buNone/>
+              <a:defRPr sz="4400" kern="1200">
+                <a:solidFill>
+                  <a:schemeClr val="tx1"/>
+                </a:solidFill>
+                <a:latin typeface="+mj-lt"/>
+                <a:ea typeface="+mj-ea"/>
+                <a:cs typeface="+mj-cs"/>
+              </a:defRPr>
+            </a:lvl1pPr>
+          </a:lstStyle>
+          <a:p>
+            <a:r>
+              <a:rPr lang="en-US" sz="3000" dirty="0"/>
+              <a:t>Parent: None</a:t>
+            </a:r>
+          </a:p>
+          <a:p>
+            <a:r>
+              <a:rPr lang="en-US" sz="3000" dirty="0"/>
+              <a:t>Subclasses: None</a:t>
+            </a:r>
+          </a:p>
+          <a:p>
+            <a:r>
+              <a:rPr lang="en-US" sz="3000" dirty="0"/>
+              <a:t>Layer: Entity</a:t>
+            </a:r>
+          </a:p>
+        </p:txBody>
+      </p:sp>
+      <p:sp>
+        <p:nvSpPr>
+          <p:cNvPr id="7" name="Content Placeholder 2">
+            <a:extLst>
+              <a:ext uri="{FF2B5EF4-FFF2-40B4-BE49-F238E27FC236}">
+                <a16:creationId xmlns:a16="http://schemas.microsoft.com/office/drawing/2014/main" id="{BBA97EAA-FAAE-6342-A893-4A0CAE51C8C2}"/>
+              </a:ext>
+            </a:extLst>
+          </p:cNvPr>
+          <p:cNvSpPr txBox="1">
+            <a:spLocks/>
+          </p:cNvSpPr>
+          <p:nvPr/>
+        </p:nvSpPr>
+        <p:spPr>
+          <a:xfrm>
+            <a:off x="6492607" y="1891727"/>
+            <a:ext cx="5257800" cy="4351338"/>
+          </a:xfrm>
+          <a:prstGeom prst="rect">
+            <a:avLst/>
+          </a:prstGeom>
+        </p:spPr>
+        <p:txBody>
+          <a:bodyPr vert="horz" lIns="91440" tIns="45720" rIns="91440" bIns="45720" rtlCol="0">
+            <a:normAutofit/>
+          </a:bodyPr>
+          <a:lstStyle>
+            <a:lvl1pPr marL="228600" indent="-228600" algn="l" defTabSz="914400" rtl="0" eaLnBrk="1" latinLnBrk="0" hangingPunct="1">
+              <a:lnSpc>
+                <a:spcPct val="90000"/>
+              </a:lnSpc>
+              <a:spcBef>
+                <a:spcPts val="1000"/>
+              </a:spcBef>
+              <a:buFont typeface="Arial" panose="020B0604020202020204" pitchFamily="34" charset="0"/>
+              <a:buChar char="•"/>
+              <a:defRPr sz="2800" kern="1200">
+                <a:solidFill>
+                  <a:schemeClr val="tx1"/>
+                </a:solidFill>
+                <a:latin typeface="+mn-lt"/>
+                <a:ea typeface="+mn-ea"/>
+                <a:cs typeface="+mn-cs"/>
+              </a:defRPr>
+            </a:lvl1pPr>
+            <a:lvl2pPr marL="685800" indent="-228600" algn="l" defTabSz="914400" rtl="0" eaLnBrk="1" latinLnBrk="0" hangingPunct="1">
+              <a:lnSpc>
+                <a:spcPct val="90000"/>
+              </a:lnSpc>
+              <a:spcBef>
+                <a:spcPts val="500"/>
+              </a:spcBef>
+              <a:buFont typeface="Arial" panose="020B0604020202020204" pitchFamily="34" charset="0"/>
+              <a:buChar char="•"/>
+              <a:defRPr sz="2400" kern="1200">
+                <a:solidFill>
+                  <a:schemeClr val="tx1"/>
+                </a:solidFill>
+                <a:latin typeface="+mn-lt"/>
+                <a:ea typeface="+mn-ea"/>
+                <a:cs typeface="+mn-cs"/>
+              </a:defRPr>
+            </a:lvl2pPr>
+            <a:lvl3pPr marL="1143000" indent="-228600" algn="l" defTabSz="914400" rtl="0" eaLnBrk="1" latinLnBrk="0" hangingPunct="1">
+              <a:lnSpc>
+                <a:spcPct val="90000"/>
+              </a:lnSpc>
+              <a:spcBef>
+                <a:spcPts val="500"/>
+              </a:spcBef>
+              <a:buFont typeface="Arial" panose="020B0604020202020204" pitchFamily="34" charset="0"/>
+              <a:buChar char="•"/>
+              <a:defRPr sz="2000" kern="1200">
+                <a:solidFill>
+                  <a:schemeClr val="tx1"/>
+                </a:solidFill>
+                <a:latin typeface="+mn-lt"/>
+                <a:ea typeface="+mn-ea"/>
+                <a:cs typeface="+mn-cs"/>
+              </a:defRPr>
+            </a:lvl3pPr>
+            <a:lvl4pPr marL="1600200" indent="-228600" algn="l" defTabSz="914400" rtl="0" eaLnBrk="1" latinLnBrk="0" hangingPunct="1">
+              <a:lnSpc>
+                <a:spcPct val="90000"/>
+              </a:lnSpc>
+              <a:spcBef>
+                <a:spcPts val="500"/>
+              </a:spcBef>
+              <a:buFont typeface="Arial" panose="020B0604020202020204" pitchFamily="34" charset="0"/>
+              <a:buChar char="•"/>
+              <a:defRPr sz="1800" kern="1200">
+                <a:solidFill>
+                  <a:schemeClr val="tx1"/>
+                </a:solidFill>
+                <a:latin typeface="+mn-lt"/>
+                <a:ea typeface="+mn-ea"/>
+                <a:cs typeface="+mn-cs"/>
+              </a:defRPr>
+            </a:lvl4pPr>
+            <a:lvl5pPr marL="2057400" indent="-228600" algn="l" defTabSz="914400" rtl="0" eaLnBrk="1" latinLnBrk="0" hangingPunct="1">
+              <a:lnSpc>
+                <a:spcPct val="90000"/>
+              </a:lnSpc>
+              <a:spcBef>
+                <a:spcPts val="500"/>
+              </a:spcBef>
+              <a:buFont typeface="Arial" panose="020B0604020202020204" pitchFamily="34" charset="0"/>
+              <a:buChar char="•"/>
+              <a:defRPr sz="1800" kern="1200">
+                <a:solidFill>
+                  <a:schemeClr val="tx1"/>
+                </a:solidFill>
+                <a:latin typeface="+mn-lt"/>
+                <a:ea typeface="+mn-ea"/>
+                <a:cs typeface="+mn-cs"/>
+              </a:defRPr>
+            </a:lvl5pPr>
+            <a:lvl6pPr marL="2514600" indent="-228600" algn="l" defTabSz="914400" rtl="0" eaLnBrk="1" latinLnBrk="0" hangingPunct="1">
+              <a:lnSpc>
+                <a:spcPct val="90000"/>
+              </a:lnSpc>
+              <a:spcBef>
+                <a:spcPts val="500"/>
+              </a:spcBef>
+              <a:buFont typeface="Arial" panose="020B0604020202020204" pitchFamily="34" charset="0"/>
+              <a:buChar char="•"/>
+              <a:defRPr sz="1800" kern="1200">
+                <a:solidFill>
+                  <a:schemeClr val="tx1"/>
+                </a:solidFill>
+                <a:latin typeface="+mn-lt"/>
+                <a:ea typeface="+mn-ea"/>
+                <a:cs typeface="+mn-cs"/>
+              </a:defRPr>
+            </a:lvl6pPr>
+            <a:lvl7pPr marL="2971800" indent="-228600" algn="l" defTabSz="914400" rtl="0" eaLnBrk="1" latinLnBrk="0" hangingPunct="1">
+              <a:lnSpc>
+                <a:spcPct val="90000"/>
+              </a:lnSpc>
+              <a:spcBef>
+                <a:spcPts val="500"/>
+              </a:spcBef>
+              <a:buFont typeface="Arial" panose="020B0604020202020204" pitchFamily="34" charset="0"/>
+              <a:buChar char="•"/>
+              <a:defRPr sz="1800" kern="1200">
+                <a:solidFill>
+                  <a:schemeClr val="tx1"/>
+                </a:solidFill>
+                <a:latin typeface="+mn-lt"/>
+                <a:ea typeface="+mn-ea"/>
+                <a:cs typeface="+mn-cs"/>
+              </a:defRPr>
+            </a:lvl7pPr>
+            <a:lvl8pPr marL="3429000" indent="-228600" algn="l" defTabSz="914400" rtl="0" eaLnBrk="1" latinLnBrk="0" hangingPunct="1">
+              <a:lnSpc>
+                <a:spcPct val="90000"/>
+              </a:lnSpc>
+              <a:spcBef>
+                <a:spcPts val="500"/>
+              </a:spcBef>
+              <a:buFont typeface="Arial" panose="020B0604020202020204" pitchFamily="34" charset="0"/>
+              <a:buChar char="•"/>
+              <a:defRPr sz="1800" kern="1200">
+                <a:solidFill>
+                  <a:schemeClr val="tx1"/>
+                </a:solidFill>
+                <a:latin typeface="+mn-lt"/>
+                <a:ea typeface="+mn-ea"/>
+                <a:cs typeface="+mn-cs"/>
+              </a:defRPr>
+            </a:lvl8pPr>
+            <a:lvl9pPr marL="3886200" indent="-228600" algn="l" defTabSz="914400" rtl="0" eaLnBrk="1" latinLnBrk="0" hangingPunct="1">
+              <a:lnSpc>
+                <a:spcPct val="90000"/>
+              </a:lnSpc>
+              <a:spcBef>
+                <a:spcPts val="500"/>
+              </a:spcBef>
+              <a:buFont typeface="Arial" panose="020B0604020202020204" pitchFamily="34" charset="0"/>
+              <a:buChar char="•"/>
+              <a:defRPr sz="1800" kern="1200">
+                <a:solidFill>
+                  <a:schemeClr val="tx1"/>
+                </a:solidFill>
+                <a:latin typeface="+mn-lt"/>
+                <a:ea typeface="+mn-ea"/>
+                <a:cs typeface="+mn-cs"/>
+              </a:defRPr>
+            </a:lvl9pPr>
+          </a:lstStyle>
+          <a:p>
+            <a:r>
+              <a:rPr lang="en-US" dirty="0"/>
+              <a:t>Player</a:t>
+            </a:r>
+          </a:p>
+        </p:txBody>
+      </p:sp>
+    </p:spTree>
+    <p:extLst>
+      <p:ext uri="{BB962C8B-B14F-4D97-AF65-F5344CB8AC3E}">
+        <p14:creationId xmlns:p14="http://schemas.microsoft.com/office/powerpoint/2010/main" val="1682596430"/>
+      </p:ext>
+    </p:extLst>
+  </p:cSld>
+  <p:clrMapOvr>
+    <a:masterClrMapping/>
+  </p:clrMapOvr>
+</p:sld>
+</file>
+
+<file path=ppt/slides/slide21.xml><?xml version="1.0" encoding="utf-8"?>
+<p:sld xmlns:a="http://schemas.openxmlformats.org/drawingml/2006/main" xmlns:r="http://schemas.openxmlformats.org/officeDocument/2006/relationships" xmlns:p="http://schemas.openxmlformats.org/presentationml/2006/main">
+  <p:cSld>
+    <p:spTree>
+      <p:nvGrpSpPr>
+        <p:cNvPr id="1" name=""/>
+        <p:cNvGrpSpPr/>
+        <p:nvPr/>
+      </p:nvGrpSpPr>
+      <p:grpSpPr>
+        <a:xfrm>
+          <a:off x="0" y="0"/>
+          <a:ext cx="0" cy="0"/>
+          <a:chOff x="0" y="0"/>
+          <a:chExt cx="0" cy="0"/>
+        </a:xfrm>
+      </p:grpSpPr>
+      <p:sp>
+        <p:nvSpPr>
+          <p:cNvPr id="2" name="Title 1">
+            <a:extLst>
+              <a:ext uri="{FF2B5EF4-FFF2-40B4-BE49-F238E27FC236}">
+                <a16:creationId xmlns:a16="http://schemas.microsoft.com/office/drawing/2014/main" id="{2EBAA245-5362-5D4F-90E0-C47F441ED271}"/>
+              </a:ext>
+            </a:extLst>
+          </p:cNvPr>
+          <p:cNvSpPr>
+            <a:spLocks noGrp="1"/>
+          </p:cNvSpPr>
+          <p:nvPr>
+            <p:ph type="title"/>
+          </p:nvPr>
+        </p:nvSpPr>
+        <p:spPr>
+          <a:xfrm>
+            <a:off x="441593" y="365125"/>
+            <a:ext cx="5257800" cy="1325563"/>
+          </a:xfrm>
+        </p:spPr>
+        <p:txBody>
+          <a:bodyPr/>
+          <a:lstStyle/>
+          <a:p>
+            <a:r>
+              <a:rPr lang="en-US" dirty="0"/>
+              <a:t>User</a:t>
+            </a:r>
+          </a:p>
+        </p:txBody>
+      </p:sp>
+      <p:sp>
+        <p:nvSpPr>
+          <p:cNvPr id="3" name="Content Placeholder 2">
+            <a:extLst>
+              <a:ext uri="{FF2B5EF4-FFF2-40B4-BE49-F238E27FC236}">
+                <a16:creationId xmlns:a16="http://schemas.microsoft.com/office/drawing/2014/main" id="{F876DD7D-2457-D840-8CB0-3144388C4EC5}"/>
+              </a:ext>
+            </a:extLst>
+          </p:cNvPr>
+          <p:cNvSpPr>
+            <a:spLocks noGrp="1"/>
+          </p:cNvSpPr>
+          <p:nvPr>
+            <p:ph idx="1"/>
+          </p:nvPr>
+        </p:nvSpPr>
+        <p:spPr>
+          <a:xfrm>
+            <a:off x="441593" y="1891727"/>
+            <a:ext cx="5257800" cy="4351338"/>
+          </a:xfrm>
+        </p:spPr>
+        <p:txBody>
+          <a:bodyPr/>
+          <a:lstStyle/>
+          <a:p>
+            <a:r>
+              <a:rPr lang="en-US" dirty="0"/>
+              <a:t>Store a user’s name, password, and number of won and lost bets</a:t>
+            </a:r>
+          </a:p>
+        </p:txBody>
+      </p:sp>
+      <p:sp>
+        <p:nvSpPr>
+          <p:cNvPr id="5" name="Title 1">
+            <a:extLst>
+              <a:ext uri="{FF2B5EF4-FFF2-40B4-BE49-F238E27FC236}">
+                <a16:creationId xmlns:a16="http://schemas.microsoft.com/office/drawing/2014/main" id="{32F3D66D-F148-614A-AFF2-6011F7282B4F}"/>
+              </a:ext>
+            </a:extLst>
+          </p:cNvPr>
+          <p:cNvSpPr txBox="1">
+            <a:spLocks/>
+          </p:cNvSpPr>
+          <p:nvPr/>
+        </p:nvSpPr>
+        <p:spPr>
+          <a:xfrm>
+            <a:off x="6492607" y="365125"/>
+            <a:ext cx="5257800" cy="1325563"/>
+          </a:xfrm>
+          <a:prstGeom prst="rect">
+            <a:avLst/>
+          </a:prstGeom>
+        </p:spPr>
+        <p:txBody>
+          <a:bodyPr vert="horz" lIns="91440" tIns="45720" rIns="91440" bIns="45720" rtlCol="0" anchor="ctr">
+            <a:normAutofit lnSpcReduction="10000"/>
+          </a:bodyPr>
+          <a:lstStyle>
+            <a:lvl1pPr algn="l" defTabSz="914400" rtl="0" eaLnBrk="1" latinLnBrk="0" hangingPunct="1">
+              <a:lnSpc>
+                <a:spcPct val="90000"/>
+              </a:lnSpc>
+              <a:spcBef>
+                <a:spcPct val="0"/>
+              </a:spcBef>
+              <a:buNone/>
+              <a:defRPr sz="4400" kern="1200">
+                <a:solidFill>
+                  <a:schemeClr val="tx1"/>
+                </a:solidFill>
+                <a:latin typeface="+mj-lt"/>
+                <a:ea typeface="+mj-ea"/>
+                <a:cs typeface="+mj-cs"/>
+              </a:defRPr>
+            </a:lvl1pPr>
+          </a:lstStyle>
+          <a:p>
+            <a:r>
+              <a:rPr lang="en-US" sz="3000" dirty="0"/>
+              <a:t>Parent: None</a:t>
+            </a:r>
+          </a:p>
+          <a:p>
+            <a:r>
+              <a:rPr lang="en-US" sz="3000" dirty="0"/>
+              <a:t>Subclasses: None</a:t>
+            </a:r>
+          </a:p>
+          <a:p>
+            <a:r>
+              <a:rPr lang="en-US" sz="3000" dirty="0"/>
+              <a:t>Layer: Entity</a:t>
+            </a:r>
+          </a:p>
+        </p:txBody>
+      </p:sp>
+      <p:sp>
+        <p:nvSpPr>
+          <p:cNvPr id="7" name="Content Placeholder 2">
+            <a:extLst>
+              <a:ext uri="{FF2B5EF4-FFF2-40B4-BE49-F238E27FC236}">
+                <a16:creationId xmlns:a16="http://schemas.microsoft.com/office/drawing/2014/main" id="{BBA97EAA-FAAE-6342-A893-4A0CAE51C8C2}"/>
+              </a:ext>
+            </a:extLst>
+          </p:cNvPr>
+          <p:cNvSpPr txBox="1">
+            <a:spLocks/>
+          </p:cNvSpPr>
+          <p:nvPr/>
+        </p:nvSpPr>
+        <p:spPr>
+          <a:xfrm>
+            <a:off x="6492607" y="1891727"/>
+            <a:ext cx="5257800" cy="4351338"/>
+          </a:xfrm>
+          <a:prstGeom prst="rect">
+            <a:avLst/>
+          </a:prstGeom>
+        </p:spPr>
+        <p:txBody>
+          <a:bodyPr vert="horz" lIns="91440" tIns="45720" rIns="91440" bIns="45720" rtlCol="0">
+            <a:normAutofit/>
+          </a:bodyPr>
+          <a:lstStyle>
+            <a:lvl1pPr marL="228600" indent="-228600" algn="l" defTabSz="914400" rtl="0" eaLnBrk="1" latinLnBrk="0" hangingPunct="1">
+              <a:lnSpc>
+                <a:spcPct val="90000"/>
+              </a:lnSpc>
+              <a:spcBef>
+                <a:spcPts val="1000"/>
+              </a:spcBef>
+              <a:buFont typeface="Arial" panose="020B0604020202020204" pitchFamily="34" charset="0"/>
+              <a:buChar char="•"/>
+              <a:defRPr sz="2800" kern="1200">
+                <a:solidFill>
+                  <a:schemeClr val="tx1"/>
+                </a:solidFill>
+                <a:latin typeface="+mn-lt"/>
+                <a:ea typeface="+mn-ea"/>
+                <a:cs typeface="+mn-cs"/>
+              </a:defRPr>
+            </a:lvl1pPr>
+            <a:lvl2pPr marL="685800" indent="-228600" algn="l" defTabSz="914400" rtl="0" eaLnBrk="1" latinLnBrk="0" hangingPunct="1">
+              <a:lnSpc>
+                <a:spcPct val="90000"/>
+              </a:lnSpc>
+              <a:spcBef>
+                <a:spcPts val="500"/>
+              </a:spcBef>
+              <a:buFont typeface="Arial" panose="020B0604020202020204" pitchFamily="34" charset="0"/>
+              <a:buChar char="•"/>
+              <a:defRPr sz="2400" kern="1200">
+                <a:solidFill>
+                  <a:schemeClr val="tx1"/>
+                </a:solidFill>
+                <a:latin typeface="+mn-lt"/>
+                <a:ea typeface="+mn-ea"/>
+                <a:cs typeface="+mn-cs"/>
+              </a:defRPr>
+            </a:lvl2pPr>
+            <a:lvl3pPr marL="1143000" indent="-228600" algn="l" defTabSz="914400" rtl="0" eaLnBrk="1" latinLnBrk="0" hangingPunct="1">
+              <a:lnSpc>
+                <a:spcPct val="90000"/>
+              </a:lnSpc>
+              <a:spcBef>
+                <a:spcPts val="500"/>
+              </a:spcBef>
+              <a:buFont typeface="Arial" panose="020B0604020202020204" pitchFamily="34" charset="0"/>
+              <a:buChar char="•"/>
+              <a:defRPr sz="2000" kern="1200">
+                <a:solidFill>
+                  <a:schemeClr val="tx1"/>
+                </a:solidFill>
+                <a:latin typeface="+mn-lt"/>
+                <a:ea typeface="+mn-ea"/>
+                <a:cs typeface="+mn-cs"/>
+              </a:defRPr>
+            </a:lvl3pPr>
+            <a:lvl4pPr marL="1600200" indent="-228600" algn="l" defTabSz="914400" rtl="0" eaLnBrk="1" latinLnBrk="0" hangingPunct="1">
+              <a:lnSpc>
+                <a:spcPct val="90000"/>
+              </a:lnSpc>
+              <a:spcBef>
+                <a:spcPts val="500"/>
+              </a:spcBef>
+              <a:buFont typeface="Arial" panose="020B0604020202020204" pitchFamily="34" charset="0"/>
+              <a:buChar char="•"/>
+              <a:defRPr sz="1800" kern="1200">
+                <a:solidFill>
+                  <a:schemeClr val="tx1"/>
+                </a:solidFill>
+                <a:latin typeface="+mn-lt"/>
+                <a:ea typeface="+mn-ea"/>
+                <a:cs typeface="+mn-cs"/>
+              </a:defRPr>
+            </a:lvl4pPr>
+            <a:lvl5pPr marL="2057400" indent="-228600" algn="l" defTabSz="914400" rtl="0" eaLnBrk="1" latinLnBrk="0" hangingPunct="1">
+              <a:lnSpc>
+                <a:spcPct val="90000"/>
+              </a:lnSpc>
+              <a:spcBef>
+                <a:spcPts val="500"/>
+              </a:spcBef>
+              <a:buFont typeface="Arial" panose="020B0604020202020204" pitchFamily="34" charset="0"/>
+              <a:buChar char="•"/>
+              <a:defRPr sz="1800" kern="1200">
+                <a:solidFill>
+                  <a:schemeClr val="tx1"/>
+                </a:solidFill>
+                <a:latin typeface="+mn-lt"/>
+                <a:ea typeface="+mn-ea"/>
+                <a:cs typeface="+mn-cs"/>
+              </a:defRPr>
+            </a:lvl5pPr>
+            <a:lvl6pPr marL="2514600" indent="-228600" algn="l" defTabSz="914400" rtl="0" eaLnBrk="1" latinLnBrk="0" hangingPunct="1">
+              <a:lnSpc>
+                <a:spcPct val="90000"/>
+              </a:lnSpc>
+              <a:spcBef>
+                <a:spcPts val="500"/>
+              </a:spcBef>
+              <a:buFont typeface="Arial" panose="020B0604020202020204" pitchFamily="34" charset="0"/>
+              <a:buChar char="•"/>
+              <a:defRPr sz="1800" kern="1200">
+                <a:solidFill>
+                  <a:schemeClr val="tx1"/>
+                </a:solidFill>
+                <a:latin typeface="+mn-lt"/>
+                <a:ea typeface="+mn-ea"/>
+                <a:cs typeface="+mn-cs"/>
+              </a:defRPr>
+            </a:lvl6pPr>
+            <a:lvl7pPr marL="2971800" indent="-228600" algn="l" defTabSz="914400" rtl="0" eaLnBrk="1" latinLnBrk="0" hangingPunct="1">
+              <a:lnSpc>
+                <a:spcPct val="90000"/>
+              </a:lnSpc>
+              <a:spcBef>
+                <a:spcPts val="500"/>
+              </a:spcBef>
+              <a:buFont typeface="Arial" panose="020B0604020202020204" pitchFamily="34" charset="0"/>
+              <a:buChar char="•"/>
+              <a:defRPr sz="1800" kern="1200">
+                <a:solidFill>
+                  <a:schemeClr val="tx1"/>
+                </a:solidFill>
+                <a:latin typeface="+mn-lt"/>
+                <a:ea typeface="+mn-ea"/>
+                <a:cs typeface="+mn-cs"/>
+              </a:defRPr>
+            </a:lvl7pPr>
+            <a:lvl8pPr marL="3429000" indent="-228600" algn="l" defTabSz="914400" rtl="0" eaLnBrk="1" latinLnBrk="0" hangingPunct="1">
+              <a:lnSpc>
+                <a:spcPct val="90000"/>
+              </a:lnSpc>
+              <a:spcBef>
+                <a:spcPts val="500"/>
+              </a:spcBef>
+              <a:buFont typeface="Arial" panose="020B0604020202020204" pitchFamily="34" charset="0"/>
+              <a:buChar char="•"/>
+              <a:defRPr sz="1800" kern="1200">
+                <a:solidFill>
+                  <a:schemeClr val="tx1"/>
+                </a:solidFill>
+                <a:latin typeface="+mn-lt"/>
+                <a:ea typeface="+mn-ea"/>
+                <a:cs typeface="+mn-cs"/>
+              </a:defRPr>
+            </a:lvl8pPr>
+            <a:lvl9pPr marL="3886200" indent="-228600" algn="l" defTabSz="914400" rtl="0" eaLnBrk="1" latinLnBrk="0" hangingPunct="1">
+              <a:lnSpc>
+                <a:spcPct val="90000"/>
+              </a:lnSpc>
+              <a:spcBef>
+                <a:spcPts val="500"/>
+              </a:spcBef>
+              <a:buFont typeface="Arial" panose="020B0604020202020204" pitchFamily="34" charset="0"/>
+              <a:buChar char="•"/>
+              <a:defRPr sz="1800" kern="1200">
+                <a:solidFill>
+                  <a:schemeClr val="tx1"/>
+                </a:solidFill>
+                <a:latin typeface="+mn-lt"/>
+                <a:ea typeface="+mn-ea"/>
+                <a:cs typeface="+mn-cs"/>
+              </a:defRPr>
+            </a:lvl9pPr>
+          </a:lstStyle>
+          <a:p>
+            <a:r>
+              <a:rPr lang="en-US" dirty="0"/>
+              <a:t>None</a:t>
+            </a:r>
+          </a:p>
+        </p:txBody>
+      </p:sp>
+    </p:spTree>
+    <p:extLst>
+      <p:ext uri="{BB962C8B-B14F-4D97-AF65-F5344CB8AC3E}">
+        <p14:creationId xmlns:p14="http://schemas.microsoft.com/office/powerpoint/2010/main" val="2553747706"/>
+      </p:ext>
+    </p:extLst>
+  </p:cSld>
+  <p:clrMapOvr>
+    <a:masterClrMapping/>
+  </p:clrMapOvr>
+</p:sld>
+</file>
+
+<file path=ppt/slides/slide22.xml><?xml version="1.0" encoding="utf-8"?>
+<p:sld xmlns:a="http://schemas.openxmlformats.org/drawingml/2006/main" xmlns:r="http://schemas.openxmlformats.org/officeDocument/2006/relationships" xmlns:p="http://schemas.openxmlformats.org/presentationml/2006/main">
+  <p:cSld>
+    <p:spTree>
+      <p:nvGrpSpPr>
+        <p:cNvPr id="1" name=""/>
+        <p:cNvGrpSpPr/>
+        <p:nvPr/>
+      </p:nvGrpSpPr>
+      <p:grpSpPr>
+        <a:xfrm>
+          <a:off x="0" y="0"/>
+          <a:ext cx="0" cy="0"/>
+          <a:chOff x="0" y="0"/>
+          <a:chExt cx="0" cy="0"/>
+        </a:xfrm>
+      </p:grpSpPr>
+      <p:sp>
+        <p:nvSpPr>
+          <p:cNvPr id="2" name="Title 1">
+            <a:extLst>
+              <a:ext uri="{FF2B5EF4-FFF2-40B4-BE49-F238E27FC236}">
+                <a16:creationId xmlns:a16="http://schemas.microsoft.com/office/drawing/2014/main" id="{2EBAA245-5362-5D4F-90E0-C47F441ED271}"/>
+              </a:ext>
+            </a:extLst>
+          </p:cNvPr>
+          <p:cNvSpPr>
+            <a:spLocks noGrp="1"/>
+          </p:cNvSpPr>
+          <p:nvPr>
+            <p:ph type="title"/>
+          </p:nvPr>
+        </p:nvSpPr>
+        <p:spPr>
+          <a:xfrm>
+            <a:off x="441593" y="365125"/>
+            <a:ext cx="5257800" cy="1325563"/>
+          </a:xfrm>
+        </p:spPr>
+        <p:txBody>
+          <a:bodyPr/>
+          <a:lstStyle/>
+          <a:p>
+            <a:r>
+              <a:rPr lang="en-US" dirty="0" err="1"/>
+              <a:t>UserManager</a:t>
+            </a:r>
+            <a:endParaRPr lang="en-US" dirty="0"/>
+          </a:p>
+        </p:txBody>
+      </p:sp>
+      <p:sp>
+        <p:nvSpPr>
+          <p:cNvPr id="3" name="Content Placeholder 2">
+            <a:extLst>
+              <a:ext uri="{FF2B5EF4-FFF2-40B4-BE49-F238E27FC236}">
+                <a16:creationId xmlns:a16="http://schemas.microsoft.com/office/drawing/2014/main" id="{F876DD7D-2457-D840-8CB0-3144388C4EC5}"/>
+              </a:ext>
+            </a:extLst>
+          </p:cNvPr>
+          <p:cNvSpPr>
+            <a:spLocks noGrp="1"/>
+          </p:cNvSpPr>
+          <p:nvPr>
+            <p:ph idx="1"/>
+          </p:nvPr>
+        </p:nvSpPr>
+        <p:spPr>
+          <a:xfrm>
+            <a:off x="441593" y="1891727"/>
+            <a:ext cx="5257800" cy="4351338"/>
+          </a:xfrm>
+        </p:spPr>
+        <p:txBody>
+          <a:bodyPr/>
+          <a:lstStyle/>
+          <a:p>
+            <a:r>
+              <a:rPr lang="en-US" dirty="0"/>
+              <a:t>Store all users who have used the service</a:t>
+            </a:r>
+          </a:p>
+          <a:p>
+            <a:r>
+              <a:rPr lang="en-US" dirty="0"/>
+              <a:t>Create new users when they register</a:t>
+            </a:r>
+          </a:p>
+        </p:txBody>
+      </p:sp>
+      <p:sp>
+        <p:nvSpPr>
+          <p:cNvPr id="5" name="Title 1">
+            <a:extLst>
+              <a:ext uri="{FF2B5EF4-FFF2-40B4-BE49-F238E27FC236}">
+                <a16:creationId xmlns:a16="http://schemas.microsoft.com/office/drawing/2014/main" id="{32F3D66D-F148-614A-AFF2-6011F7282B4F}"/>
+              </a:ext>
+            </a:extLst>
+          </p:cNvPr>
+          <p:cNvSpPr txBox="1">
+            <a:spLocks/>
+          </p:cNvSpPr>
+          <p:nvPr/>
+        </p:nvSpPr>
+        <p:spPr>
+          <a:xfrm>
+            <a:off x="6492607" y="365125"/>
+            <a:ext cx="5257800" cy="1325563"/>
+          </a:xfrm>
+          <a:prstGeom prst="rect">
+            <a:avLst/>
+          </a:prstGeom>
+        </p:spPr>
+        <p:txBody>
+          <a:bodyPr vert="horz" lIns="91440" tIns="45720" rIns="91440" bIns="45720" rtlCol="0" anchor="ctr">
+            <a:normAutofit lnSpcReduction="10000"/>
+          </a:bodyPr>
+          <a:lstStyle>
+            <a:lvl1pPr algn="l" defTabSz="914400" rtl="0" eaLnBrk="1" latinLnBrk="0" hangingPunct="1">
+              <a:lnSpc>
+                <a:spcPct val="90000"/>
+              </a:lnSpc>
+              <a:spcBef>
+                <a:spcPct val="0"/>
+              </a:spcBef>
+              <a:buNone/>
+              <a:defRPr sz="4400" kern="1200">
+                <a:solidFill>
+                  <a:schemeClr val="tx1"/>
+                </a:solidFill>
+                <a:latin typeface="+mj-lt"/>
+                <a:ea typeface="+mj-ea"/>
+                <a:cs typeface="+mj-cs"/>
+              </a:defRPr>
+            </a:lvl1pPr>
+          </a:lstStyle>
+          <a:p>
+            <a:r>
+              <a:rPr lang="en-US" sz="3000" dirty="0"/>
+              <a:t>Parent: None</a:t>
+            </a:r>
+          </a:p>
+          <a:p>
+            <a:r>
+              <a:rPr lang="en-US" sz="3000" dirty="0"/>
+              <a:t>Subclasses: None</a:t>
+            </a:r>
+          </a:p>
+          <a:p>
+            <a:r>
+              <a:rPr lang="en-US" sz="3000" dirty="0"/>
+              <a:t>Layer: Entity</a:t>
+            </a:r>
+          </a:p>
+        </p:txBody>
+      </p:sp>
+      <p:sp>
+        <p:nvSpPr>
+          <p:cNvPr id="7" name="Content Placeholder 2">
+            <a:extLst>
+              <a:ext uri="{FF2B5EF4-FFF2-40B4-BE49-F238E27FC236}">
+                <a16:creationId xmlns:a16="http://schemas.microsoft.com/office/drawing/2014/main" id="{BBA97EAA-FAAE-6342-A893-4A0CAE51C8C2}"/>
+              </a:ext>
+            </a:extLst>
+          </p:cNvPr>
+          <p:cNvSpPr txBox="1">
+            <a:spLocks/>
+          </p:cNvSpPr>
+          <p:nvPr/>
+        </p:nvSpPr>
+        <p:spPr>
+          <a:xfrm>
+            <a:off x="6492607" y="1891727"/>
+            <a:ext cx="5257800" cy="4351338"/>
+          </a:xfrm>
+          <a:prstGeom prst="rect">
+            <a:avLst/>
+          </a:prstGeom>
+        </p:spPr>
+        <p:txBody>
+          <a:bodyPr vert="horz" lIns="91440" tIns="45720" rIns="91440" bIns="45720" rtlCol="0">
+            <a:normAutofit/>
+          </a:bodyPr>
+          <a:lstStyle>
+            <a:lvl1pPr marL="228600" indent="-228600" algn="l" defTabSz="914400" rtl="0" eaLnBrk="1" latinLnBrk="0" hangingPunct="1">
+              <a:lnSpc>
+                <a:spcPct val="90000"/>
+              </a:lnSpc>
+              <a:spcBef>
+                <a:spcPts val="1000"/>
+              </a:spcBef>
+              <a:buFont typeface="Arial" panose="020B0604020202020204" pitchFamily="34" charset="0"/>
+              <a:buChar char="•"/>
+              <a:defRPr sz="2800" kern="1200">
+                <a:solidFill>
+                  <a:schemeClr val="tx1"/>
+                </a:solidFill>
+                <a:latin typeface="+mn-lt"/>
+                <a:ea typeface="+mn-ea"/>
+                <a:cs typeface="+mn-cs"/>
+              </a:defRPr>
+            </a:lvl1pPr>
+            <a:lvl2pPr marL="685800" indent="-228600" algn="l" defTabSz="914400" rtl="0" eaLnBrk="1" latinLnBrk="0" hangingPunct="1">
+              <a:lnSpc>
+                <a:spcPct val="90000"/>
+              </a:lnSpc>
+              <a:spcBef>
+                <a:spcPts val="500"/>
+              </a:spcBef>
+              <a:buFont typeface="Arial" panose="020B0604020202020204" pitchFamily="34" charset="0"/>
+              <a:buChar char="•"/>
+              <a:defRPr sz="2400" kern="1200">
+                <a:solidFill>
+                  <a:schemeClr val="tx1"/>
+                </a:solidFill>
+                <a:latin typeface="+mn-lt"/>
+                <a:ea typeface="+mn-ea"/>
+                <a:cs typeface="+mn-cs"/>
+              </a:defRPr>
+            </a:lvl2pPr>
+            <a:lvl3pPr marL="1143000" indent="-228600" algn="l" defTabSz="914400" rtl="0" eaLnBrk="1" latinLnBrk="0" hangingPunct="1">
+              <a:lnSpc>
+                <a:spcPct val="90000"/>
+              </a:lnSpc>
+              <a:spcBef>
+                <a:spcPts val="500"/>
+              </a:spcBef>
+              <a:buFont typeface="Arial" panose="020B0604020202020204" pitchFamily="34" charset="0"/>
+              <a:buChar char="•"/>
+              <a:defRPr sz="2000" kern="1200">
+                <a:solidFill>
+                  <a:schemeClr val="tx1"/>
+                </a:solidFill>
+                <a:latin typeface="+mn-lt"/>
+                <a:ea typeface="+mn-ea"/>
+                <a:cs typeface="+mn-cs"/>
+              </a:defRPr>
+            </a:lvl3pPr>
+            <a:lvl4pPr marL="1600200" indent="-228600" algn="l" defTabSz="914400" rtl="0" eaLnBrk="1" latinLnBrk="0" hangingPunct="1">
+              <a:lnSpc>
+                <a:spcPct val="90000"/>
+              </a:lnSpc>
+              <a:spcBef>
+                <a:spcPts val="500"/>
+              </a:spcBef>
+              <a:buFont typeface="Arial" panose="020B0604020202020204" pitchFamily="34" charset="0"/>
+              <a:buChar char="•"/>
+              <a:defRPr sz="1800" kern="1200">
+                <a:solidFill>
+                  <a:schemeClr val="tx1"/>
+                </a:solidFill>
+                <a:latin typeface="+mn-lt"/>
+                <a:ea typeface="+mn-ea"/>
+                <a:cs typeface="+mn-cs"/>
+              </a:defRPr>
+            </a:lvl4pPr>
+            <a:lvl5pPr marL="2057400" indent="-228600" algn="l" defTabSz="914400" rtl="0" eaLnBrk="1" latinLnBrk="0" hangingPunct="1">
+              <a:lnSpc>
+                <a:spcPct val="90000"/>
+              </a:lnSpc>
+              <a:spcBef>
+                <a:spcPts val="500"/>
+              </a:spcBef>
+              <a:buFont typeface="Arial" panose="020B0604020202020204" pitchFamily="34" charset="0"/>
+              <a:buChar char="•"/>
+              <a:defRPr sz="1800" kern="1200">
+                <a:solidFill>
+                  <a:schemeClr val="tx1"/>
+                </a:solidFill>
+                <a:latin typeface="+mn-lt"/>
+                <a:ea typeface="+mn-ea"/>
+                <a:cs typeface="+mn-cs"/>
+              </a:defRPr>
+            </a:lvl5pPr>
+            <a:lvl6pPr marL="2514600" indent="-228600" algn="l" defTabSz="914400" rtl="0" eaLnBrk="1" latinLnBrk="0" hangingPunct="1">
+              <a:lnSpc>
+                <a:spcPct val="90000"/>
+              </a:lnSpc>
+              <a:spcBef>
+                <a:spcPts val="500"/>
+              </a:spcBef>
+              <a:buFont typeface="Arial" panose="020B0604020202020204" pitchFamily="34" charset="0"/>
+              <a:buChar char="•"/>
+              <a:defRPr sz="1800" kern="1200">
+                <a:solidFill>
+                  <a:schemeClr val="tx1"/>
+                </a:solidFill>
+                <a:latin typeface="+mn-lt"/>
+                <a:ea typeface="+mn-ea"/>
+                <a:cs typeface="+mn-cs"/>
+              </a:defRPr>
+            </a:lvl6pPr>
+            <a:lvl7pPr marL="2971800" indent="-228600" algn="l" defTabSz="914400" rtl="0" eaLnBrk="1" latinLnBrk="0" hangingPunct="1">
+              <a:lnSpc>
+                <a:spcPct val="90000"/>
+              </a:lnSpc>
+              <a:spcBef>
+                <a:spcPts val="500"/>
+              </a:spcBef>
+              <a:buFont typeface="Arial" panose="020B0604020202020204" pitchFamily="34" charset="0"/>
+              <a:buChar char="•"/>
+              <a:defRPr sz="1800" kern="1200">
+                <a:solidFill>
+                  <a:schemeClr val="tx1"/>
+                </a:solidFill>
+                <a:latin typeface="+mn-lt"/>
+                <a:ea typeface="+mn-ea"/>
+                <a:cs typeface="+mn-cs"/>
+              </a:defRPr>
+            </a:lvl7pPr>
+            <a:lvl8pPr marL="3429000" indent="-228600" algn="l" defTabSz="914400" rtl="0" eaLnBrk="1" latinLnBrk="0" hangingPunct="1">
+              <a:lnSpc>
+                <a:spcPct val="90000"/>
+              </a:lnSpc>
+              <a:spcBef>
+                <a:spcPts val="500"/>
+              </a:spcBef>
+              <a:buFont typeface="Arial" panose="020B0604020202020204" pitchFamily="34" charset="0"/>
+              <a:buChar char="•"/>
+              <a:defRPr sz="1800" kern="1200">
+                <a:solidFill>
+                  <a:schemeClr val="tx1"/>
+                </a:solidFill>
+                <a:latin typeface="+mn-lt"/>
+                <a:ea typeface="+mn-ea"/>
+                <a:cs typeface="+mn-cs"/>
+              </a:defRPr>
+            </a:lvl8pPr>
+            <a:lvl9pPr marL="3886200" indent="-228600" algn="l" defTabSz="914400" rtl="0" eaLnBrk="1" latinLnBrk="0" hangingPunct="1">
+              <a:lnSpc>
+                <a:spcPct val="90000"/>
+              </a:lnSpc>
+              <a:spcBef>
+                <a:spcPts val="500"/>
+              </a:spcBef>
+              <a:buFont typeface="Arial" panose="020B0604020202020204" pitchFamily="34" charset="0"/>
+              <a:buChar char="•"/>
+              <a:defRPr sz="1800" kern="1200">
+                <a:solidFill>
+                  <a:schemeClr val="tx1"/>
+                </a:solidFill>
+                <a:latin typeface="+mn-lt"/>
+                <a:ea typeface="+mn-ea"/>
+                <a:cs typeface="+mn-cs"/>
+              </a:defRPr>
+            </a:lvl9pPr>
+          </a:lstStyle>
+          <a:p>
+            <a:r>
+              <a:rPr lang="en-US" dirty="0"/>
+              <a:t>User</a:t>
+            </a:r>
+          </a:p>
+        </p:txBody>
+      </p:sp>
+    </p:spTree>
+    <p:extLst>
+      <p:ext uri="{BB962C8B-B14F-4D97-AF65-F5344CB8AC3E}">
+        <p14:creationId xmlns:p14="http://schemas.microsoft.com/office/powerpoint/2010/main" val="1068520986"/>
+      </p:ext>
+    </p:extLst>
+  </p:cSld>
+  <p:clrMapOvr>
+    <a:masterClrMapping/>
+  </p:clrMapOvr>
+</p:sld>
+</file>
+
+<file path=ppt/slides/slide23.xml><?xml version="1.0" encoding="utf-8"?>
+<p:sld xmlns:a="http://schemas.openxmlformats.org/drawingml/2006/main" xmlns:r="http://schemas.openxmlformats.org/officeDocument/2006/relationships" xmlns:p="http://schemas.openxmlformats.org/presentationml/2006/main">
+  <p:cSld>
+    <p:spTree>
+      <p:nvGrpSpPr>
+        <p:cNvPr id="1" name=""/>
+        <p:cNvGrpSpPr/>
+        <p:nvPr/>
+      </p:nvGrpSpPr>
+      <p:grpSpPr>
+        <a:xfrm>
+          <a:off x="0" y="0"/>
+          <a:ext cx="0" cy="0"/>
+          <a:chOff x="0" y="0"/>
+          <a:chExt cx="0" cy="0"/>
+        </a:xfrm>
+      </p:grpSpPr>
+      <p:sp>
+        <p:nvSpPr>
+          <p:cNvPr id="2" name="Title 1">
+            <a:extLst>
+              <a:ext uri="{FF2B5EF4-FFF2-40B4-BE49-F238E27FC236}">
+                <a16:creationId xmlns:a16="http://schemas.microsoft.com/office/drawing/2014/main" id="{2EBAA245-5362-5D4F-90E0-C47F441ED271}"/>
+              </a:ext>
+            </a:extLst>
+          </p:cNvPr>
+          <p:cNvSpPr>
+            <a:spLocks noGrp="1"/>
+          </p:cNvSpPr>
+          <p:nvPr>
+            <p:ph type="title"/>
+          </p:nvPr>
+        </p:nvSpPr>
+        <p:spPr>
+          <a:xfrm>
+            <a:off x="441593" y="365125"/>
+            <a:ext cx="5257800" cy="1325563"/>
+          </a:xfrm>
+        </p:spPr>
+        <p:txBody>
+          <a:bodyPr/>
+          <a:lstStyle/>
+          <a:p>
+            <a:r>
+              <a:rPr lang="en-US" dirty="0"/>
+              <a:t>Class Name</a:t>
+            </a:r>
+          </a:p>
+        </p:txBody>
+      </p:sp>
+      <p:sp>
+        <p:nvSpPr>
+          <p:cNvPr id="3" name="Content Placeholder 2">
+            <a:extLst>
+              <a:ext uri="{FF2B5EF4-FFF2-40B4-BE49-F238E27FC236}">
+                <a16:creationId xmlns:a16="http://schemas.microsoft.com/office/drawing/2014/main" id="{F876DD7D-2457-D840-8CB0-3144388C4EC5}"/>
+              </a:ext>
+            </a:extLst>
+          </p:cNvPr>
+          <p:cNvSpPr>
+            <a:spLocks noGrp="1"/>
+          </p:cNvSpPr>
+          <p:nvPr>
+            <p:ph idx="1"/>
+          </p:nvPr>
+        </p:nvSpPr>
+        <p:spPr>
+          <a:xfrm>
+            <a:off x="441593" y="1891727"/>
+            <a:ext cx="5257800" cy="4351338"/>
+          </a:xfrm>
+        </p:spPr>
+        <p:txBody>
+          <a:bodyPr/>
+          <a:lstStyle/>
+          <a:p>
+            <a:r>
+              <a:rPr lang="en-US" dirty="0"/>
+              <a:t>Responsibilities</a:t>
+            </a:r>
+          </a:p>
+        </p:txBody>
+      </p:sp>
+      <p:sp>
+        <p:nvSpPr>
+          <p:cNvPr id="5" name="Title 1">
+            <a:extLst>
+              <a:ext uri="{FF2B5EF4-FFF2-40B4-BE49-F238E27FC236}">
+                <a16:creationId xmlns:a16="http://schemas.microsoft.com/office/drawing/2014/main" id="{32F3D66D-F148-614A-AFF2-6011F7282B4F}"/>
+              </a:ext>
+            </a:extLst>
+          </p:cNvPr>
+          <p:cNvSpPr txBox="1">
+            <a:spLocks/>
+          </p:cNvSpPr>
+          <p:nvPr/>
+        </p:nvSpPr>
+        <p:spPr>
+          <a:xfrm>
+            <a:off x="6492607" y="365125"/>
+            <a:ext cx="5257800" cy="1325563"/>
+          </a:xfrm>
+          <a:prstGeom prst="rect">
+            <a:avLst/>
+          </a:prstGeom>
+        </p:spPr>
+        <p:txBody>
+          <a:bodyPr vert="horz" lIns="91440" tIns="45720" rIns="91440" bIns="45720" rtlCol="0" anchor="ctr">
+            <a:normAutofit lnSpcReduction="10000"/>
+          </a:bodyPr>
+          <a:lstStyle>
+            <a:lvl1pPr algn="l" defTabSz="914400" rtl="0" eaLnBrk="1" latinLnBrk="0" hangingPunct="1">
+              <a:lnSpc>
+                <a:spcPct val="90000"/>
+              </a:lnSpc>
+              <a:spcBef>
+                <a:spcPct val="0"/>
+              </a:spcBef>
+              <a:buNone/>
+              <a:defRPr sz="4400" kern="1200">
+                <a:solidFill>
+                  <a:schemeClr val="tx1"/>
+                </a:solidFill>
+                <a:latin typeface="+mj-lt"/>
+                <a:ea typeface="+mj-ea"/>
+                <a:cs typeface="+mj-cs"/>
+              </a:defRPr>
+            </a:lvl1pPr>
+          </a:lstStyle>
+          <a:p>
+            <a:r>
+              <a:rPr lang="en-US" sz="3000" dirty="0"/>
+              <a:t>Parent:</a:t>
+            </a:r>
+          </a:p>
+          <a:p>
+            <a:r>
+              <a:rPr lang="en-US" sz="3000" dirty="0"/>
+              <a:t>Subclasses:</a:t>
+            </a:r>
+          </a:p>
+          <a:p>
+            <a:r>
+              <a:rPr lang="en-US" sz="3000" dirty="0"/>
+              <a:t>Layer:</a:t>
+            </a:r>
+          </a:p>
+        </p:txBody>
+      </p:sp>
+      <p:sp>
+        <p:nvSpPr>
+          <p:cNvPr id="7" name="Content Placeholder 2">
+            <a:extLst>
+              <a:ext uri="{FF2B5EF4-FFF2-40B4-BE49-F238E27FC236}">
+                <a16:creationId xmlns:a16="http://schemas.microsoft.com/office/drawing/2014/main" id="{BBA97EAA-FAAE-6342-A893-4A0CAE51C8C2}"/>
+              </a:ext>
+            </a:extLst>
+          </p:cNvPr>
+          <p:cNvSpPr txBox="1">
+            <a:spLocks/>
+          </p:cNvSpPr>
+          <p:nvPr/>
+        </p:nvSpPr>
+        <p:spPr>
+          <a:xfrm>
+            <a:off x="6492607" y="1891727"/>
+            <a:ext cx="5257800" cy="4351338"/>
+          </a:xfrm>
+          <a:prstGeom prst="rect">
+            <a:avLst/>
+          </a:prstGeom>
+        </p:spPr>
+        <p:txBody>
+          <a:bodyPr vert="horz" lIns="91440" tIns="45720" rIns="91440" bIns="45720" rtlCol="0">
+            <a:normAutofit/>
+          </a:bodyPr>
+          <a:lstStyle>
+            <a:lvl1pPr marL="228600" indent="-228600" algn="l" defTabSz="914400" rtl="0" eaLnBrk="1" latinLnBrk="0" hangingPunct="1">
+              <a:lnSpc>
+                <a:spcPct val="90000"/>
+              </a:lnSpc>
+              <a:spcBef>
+                <a:spcPts val="1000"/>
+              </a:spcBef>
+              <a:buFont typeface="Arial" panose="020B0604020202020204" pitchFamily="34" charset="0"/>
+              <a:buChar char="•"/>
+              <a:defRPr sz="2800" kern="1200">
+                <a:solidFill>
+                  <a:schemeClr val="tx1"/>
+                </a:solidFill>
+                <a:latin typeface="+mn-lt"/>
+                <a:ea typeface="+mn-ea"/>
+                <a:cs typeface="+mn-cs"/>
+              </a:defRPr>
+            </a:lvl1pPr>
+            <a:lvl2pPr marL="685800" indent="-228600" algn="l" defTabSz="914400" rtl="0" eaLnBrk="1" latinLnBrk="0" hangingPunct="1">
+              <a:lnSpc>
+                <a:spcPct val="90000"/>
+              </a:lnSpc>
+              <a:spcBef>
+                <a:spcPts val="500"/>
+              </a:spcBef>
+              <a:buFont typeface="Arial" panose="020B0604020202020204" pitchFamily="34" charset="0"/>
+              <a:buChar char="•"/>
+              <a:defRPr sz="2400" kern="1200">
+                <a:solidFill>
+                  <a:schemeClr val="tx1"/>
+                </a:solidFill>
+                <a:latin typeface="+mn-lt"/>
+                <a:ea typeface="+mn-ea"/>
+                <a:cs typeface="+mn-cs"/>
+              </a:defRPr>
+            </a:lvl2pPr>
+            <a:lvl3pPr marL="1143000" indent="-228600" algn="l" defTabSz="914400" rtl="0" eaLnBrk="1" latinLnBrk="0" hangingPunct="1">
+              <a:lnSpc>
+                <a:spcPct val="90000"/>
+              </a:lnSpc>
+              <a:spcBef>
+                <a:spcPts val="500"/>
+              </a:spcBef>
+              <a:buFont typeface="Arial" panose="020B0604020202020204" pitchFamily="34" charset="0"/>
+              <a:buChar char="•"/>
+              <a:defRPr sz="2000" kern="1200">
+                <a:solidFill>
+                  <a:schemeClr val="tx1"/>
+                </a:solidFill>
+                <a:latin typeface="+mn-lt"/>
+                <a:ea typeface="+mn-ea"/>
+                <a:cs typeface="+mn-cs"/>
+              </a:defRPr>
+            </a:lvl3pPr>
+            <a:lvl4pPr marL="1600200" indent="-228600" algn="l" defTabSz="914400" rtl="0" eaLnBrk="1" latinLnBrk="0" hangingPunct="1">
+              <a:lnSpc>
+                <a:spcPct val="90000"/>
+              </a:lnSpc>
+              <a:spcBef>
+                <a:spcPts val="500"/>
+              </a:spcBef>
+              <a:buFont typeface="Arial" panose="020B0604020202020204" pitchFamily="34" charset="0"/>
+              <a:buChar char="•"/>
+              <a:defRPr sz="1800" kern="1200">
+                <a:solidFill>
+                  <a:schemeClr val="tx1"/>
+                </a:solidFill>
+                <a:latin typeface="+mn-lt"/>
+                <a:ea typeface="+mn-ea"/>
+                <a:cs typeface="+mn-cs"/>
+              </a:defRPr>
+            </a:lvl4pPr>
+            <a:lvl5pPr marL="2057400" indent="-228600" algn="l" defTabSz="914400" rtl="0" eaLnBrk="1" latinLnBrk="0" hangingPunct="1">
+              <a:lnSpc>
+                <a:spcPct val="90000"/>
+              </a:lnSpc>
+              <a:spcBef>
+                <a:spcPts val="500"/>
+              </a:spcBef>
+              <a:buFont typeface="Arial" panose="020B0604020202020204" pitchFamily="34" charset="0"/>
+              <a:buChar char="•"/>
+              <a:defRPr sz="1800" kern="1200">
+                <a:solidFill>
+                  <a:schemeClr val="tx1"/>
+                </a:solidFill>
+                <a:latin typeface="+mn-lt"/>
+                <a:ea typeface="+mn-ea"/>
+                <a:cs typeface="+mn-cs"/>
+              </a:defRPr>
+            </a:lvl5pPr>
+            <a:lvl6pPr marL="2514600" indent="-228600" algn="l" defTabSz="914400" rtl="0" eaLnBrk="1" latinLnBrk="0" hangingPunct="1">
+              <a:lnSpc>
+                <a:spcPct val="90000"/>
+              </a:lnSpc>
+              <a:spcBef>
+                <a:spcPts val="500"/>
+              </a:spcBef>
+              <a:buFont typeface="Arial" panose="020B0604020202020204" pitchFamily="34" charset="0"/>
+              <a:buChar char="•"/>
+              <a:defRPr sz="1800" kern="1200">
+                <a:solidFill>
+                  <a:schemeClr val="tx1"/>
+                </a:solidFill>
+                <a:latin typeface="+mn-lt"/>
+                <a:ea typeface="+mn-ea"/>
+                <a:cs typeface="+mn-cs"/>
+              </a:defRPr>
+            </a:lvl6pPr>
+            <a:lvl7pPr marL="2971800" indent="-228600" algn="l" defTabSz="914400" rtl="0" eaLnBrk="1" latinLnBrk="0" hangingPunct="1">
+              <a:lnSpc>
+                <a:spcPct val="90000"/>
+              </a:lnSpc>
+              <a:spcBef>
+                <a:spcPts val="500"/>
+              </a:spcBef>
+              <a:buFont typeface="Arial" panose="020B0604020202020204" pitchFamily="34" charset="0"/>
+              <a:buChar char="•"/>
+              <a:defRPr sz="1800" kern="1200">
+                <a:solidFill>
+                  <a:schemeClr val="tx1"/>
+                </a:solidFill>
+                <a:latin typeface="+mn-lt"/>
+                <a:ea typeface="+mn-ea"/>
+                <a:cs typeface="+mn-cs"/>
+              </a:defRPr>
+            </a:lvl7pPr>
+            <a:lvl8pPr marL="3429000" indent="-228600" algn="l" defTabSz="914400" rtl="0" eaLnBrk="1" latinLnBrk="0" hangingPunct="1">
+              <a:lnSpc>
+                <a:spcPct val="90000"/>
+              </a:lnSpc>
+              <a:spcBef>
+                <a:spcPts val="500"/>
+              </a:spcBef>
+              <a:buFont typeface="Arial" panose="020B0604020202020204" pitchFamily="34" charset="0"/>
+              <a:buChar char="•"/>
+              <a:defRPr sz="1800" kern="1200">
+                <a:solidFill>
+                  <a:schemeClr val="tx1"/>
+                </a:solidFill>
+                <a:latin typeface="+mn-lt"/>
+                <a:ea typeface="+mn-ea"/>
+                <a:cs typeface="+mn-cs"/>
+              </a:defRPr>
+            </a:lvl8pPr>
+            <a:lvl9pPr marL="3886200" indent="-228600" algn="l" defTabSz="914400" rtl="0" eaLnBrk="1" latinLnBrk="0" hangingPunct="1">
+              <a:lnSpc>
+                <a:spcPct val="90000"/>
+              </a:lnSpc>
+              <a:spcBef>
+                <a:spcPts val="500"/>
+              </a:spcBef>
+              <a:buFont typeface="Arial" panose="020B0604020202020204" pitchFamily="34" charset="0"/>
+              <a:buChar char="•"/>
+              <a:defRPr sz="1800" kern="1200">
+                <a:solidFill>
+                  <a:schemeClr val="tx1"/>
+                </a:solidFill>
+                <a:latin typeface="+mn-lt"/>
+                <a:ea typeface="+mn-ea"/>
+                <a:cs typeface="+mn-cs"/>
+              </a:defRPr>
+            </a:lvl9pPr>
+          </a:lstStyle>
+          <a:p>
+            <a:r>
+              <a:rPr lang="en-US" dirty="0"/>
+              <a:t>Collaborators</a:t>
+            </a:r>
+          </a:p>
+        </p:txBody>
+      </p:sp>
+    </p:spTree>
+    <p:extLst>
+      <p:ext uri="{BB962C8B-B14F-4D97-AF65-F5344CB8AC3E}">
+        <p14:creationId xmlns:p14="http://schemas.microsoft.com/office/powerpoint/2010/main" val="397343510"/>
+      </p:ext>
+    </p:extLst>
+  </p:cSld>
+  <p:clrMapOvr>
+    <a:masterClrMapping/>
+  </p:clrMapOvr>
+</p:sld>
+</file>
+
+<file path=ppt/slides/slide24.xml><?xml version="1.0" encoding="utf-8"?>
+<p:sld xmlns:a="http://schemas.openxmlformats.org/drawingml/2006/main" xmlns:r="http://schemas.openxmlformats.org/officeDocument/2006/relationships" xmlns:p="http://schemas.openxmlformats.org/presentationml/2006/main">
+  <p:cSld>
+    <p:spTree>
+      <p:nvGrpSpPr>
+        <p:cNvPr id="1" name=""/>
+        <p:cNvGrpSpPr/>
+        <p:nvPr/>
+      </p:nvGrpSpPr>
+      <p:grpSpPr>
+        <a:xfrm>
+          <a:off x="0" y="0"/>
+          <a:ext cx="0" cy="0"/>
+          <a:chOff x="0" y="0"/>
+          <a:chExt cx="0" cy="0"/>
+        </a:xfrm>
+      </p:grpSpPr>
+      <p:sp>
+        <p:nvSpPr>
+          <p:cNvPr id="4" name="TextBox 3">
+            <a:extLst>
+              <a:ext uri="{FF2B5EF4-FFF2-40B4-BE49-F238E27FC236}">
+                <a16:creationId xmlns:a16="http://schemas.microsoft.com/office/drawing/2014/main" id="{49D23066-0188-1F4D-AB8C-1B2C53DC9783}"/>
+              </a:ext>
+            </a:extLst>
+          </p:cNvPr>
+          <p:cNvSpPr txBox="1"/>
+          <p:nvPr/>
+        </p:nvSpPr>
+        <p:spPr>
+          <a:xfrm>
+            <a:off x="5352361" y="110168"/>
+            <a:ext cx="1487277" cy="369332"/>
+          </a:xfrm>
+          <a:prstGeom prst="rect">
+            <a:avLst/>
+          </a:prstGeom>
+        </p:spPr>
+        <p:style>
+          <a:lnRef idx="2">
+            <a:schemeClr val="dk1"/>
+          </a:lnRef>
+          <a:fillRef idx="1">
+            <a:schemeClr val="lt1"/>
+          </a:fillRef>
+          <a:effectRef idx="0">
+            <a:schemeClr val="dk1"/>
+          </a:effectRef>
+          <a:fontRef idx="minor">
+            <a:schemeClr val="dk1"/>
+          </a:fontRef>
+        </p:style>
+        <p:txBody>
+          <a:bodyPr wrap="square" rtlCol="0">
+            <a:spAutoFit/>
+          </a:bodyPr>
+          <a:lstStyle/>
+          <a:p>
+            <a:r>
+              <a:rPr lang="en-US" dirty="0" err="1"/>
+              <a:t>UserInterface</a:t>
+            </a:r>
+            <a:endParaRPr lang="en-US" dirty="0"/>
+          </a:p>
+        </p:txBody>
+      </p:sp>
+      <p:sp>
+        <p:nvSpPr>
+          <p:cNvPr id="5" name="TextBox 4">
+            <a:extLst>
+              <a:ext uri="{FF2B5EF4-FFF2-40B4-BE49-F238E27FC236}">
+                <a16:creationId xmlns:a16="http://schemas.microsoft.com/office/drawing/2014/main" id="{D830C571-6283-864C-A751-80BE78ADA16E}"/>
+              </a:ext>
+            </a:extLst>
+          </p:cNvPr>
+          <p:cNvSpPr txBox="1"/>
+          <p:nvPr/>
+        </p:nvSpPr>
+        <p:spPr>
+          <a:xfrm>
+            <a:off x="2857040" y="956166"/>
+            <a:ext cx="1259595" cy="369332"/>
+          </a:xfrm>
+          <a:prstGeom prst="rect">
+            <a:avLst/>
+          </a:prstGeom>
+        </p:spPr>
+        <p:style>
+          <a:lnRef idx="2">
+            <a:schemeClr val="dk1"/>
+          </a:lnRef>
+          <a:fillRef idx="1">
+            <a:schemeClr val="lt1"/>
+          </a:fillRef>
+          <a:effectRef idx="0">
+            <a:schemeClr val="dk1"/>
+          </a:effectRef>
+          <a:fontRef idx="minor">
+            <a:schemeClr val="dk1"/>
+          </a:fontRef>
+        </p:style>
+        <p:txBody>
+          <a:bodyPr wrap="square" rtlCol="0">
+            <a:spAutoFit/>
+          </a:bodyPr>
+          <a:lstStyle/>
+          <a:p>
+            <a:r>
+              <a:rPr lang="en-US" dirty="0" err="1"/>
+              <a:t>InputParser</a:t>
+            </a:r>
+            <a:endParaRPr lang="en-US" dirty="0"/>
+          </a:p>
+        </p:txBody>
+      </p:sp>
+      <p:sp>
+        <p:nvSpPr>
+          <p:cNvPr id="6" name="TextBox 5">
+            <a:extLst>
+              <a:ext uri="{FF2B5EF4-FFF2-40B4-BE49-F238E27FC236}">
+                <a16:creationId xmlns:a16="http://schemas.microsoft.com/office/drawing/2014/main" id="{963E0F7A-FB21-B24B-9C5A-7D6275B1A9C4}"/>
+              </a:ext>
+            </a:extLst>
+          </p:cNvPr>
+          <p:cNvSpPr txBox="1"/>
+          <p:nvPr/>
+        </p:nvSpPr>
+        <p:spPr>
+          <a:xfrm>
+            <a:off x="9156177" y="915055"/>
+            <a:ext cx="1487277" cy="369332"/>
+          </a:xfrm>
+          <a:prstGeom prst="rect">
+            <a:avLst/>
+          </a:prstGeom>
+        </p:spPr>
+        <p:style>
+          <a:lnRef idx="2">
+            <a:schemeClr val="dk1"/>
+          </a:lnRef>
+          <a:fillRef idx="1">
+            <a:schemeClr val="lt1"/>
+          </a:fillRef>
+          <a:effectRef idx="0">
+            <a:schemeClr val="dk1"/>
+          </a:effectRef>
+          <a:fontRef idx="minor">
+            <a:schemeClr val="dk1"/>
+          </a:fontRef>
+        </p:style>
+        <p:txBody>
+          <a:bodyPr wrap="square" rtlCol="0">
+            <a:spAutoFit/>
+          </a:bodyPr>
+          <a:lstStyle/>
+          <a:p>
+            <a:r>
+              <a:rPr lang="en-US" dirty="0" err="1"/>
+              <a:t>OutputParser</a:t>
+            </a:r>
+            <a:endParaRPr lang="en-US" dirty="0"/>
+          </a:p>
+        </p:txBody>
+      </p:sp>
+      <p:sp>
+        <p:nvSpPr>
+          <p:cNvPr id="7" name="TextBox 6">
+            <a:extLst>
+              <a:ext uri="{FF2B5EF4-FFF2-40B4-BE49-F238E27FC236}">
+                <a16:creationId xmlns:a16="http://schemas.microsoft.com/office/drawing/2014/main" id="{DE5A8A2D-01AD-AF4E-9027-9780080DB718}"/>
+              </a:ext>
+            </a:extLst>
+          </p:cNvPr>
+          <p:cNvSpPr txBox="1"/>
+          <p:nvPr/>
+        </p:nvSpPr>
+        <p:spPr>
+          <a:xfrm>
+            <a:off x="5087954" y="1819651"/>
+            <a:ext cx="1979363" cy="369332"/>
+          </a:xfrm>
+          <a:prstGeom prst="rect">
+            <a:avLst/>
+          </a:prstGeom>
+        </p:spPr>
+        <p:style>
+          <a:lnRef idx="2">
+            <a:schemeClr val="dk1"/>
+          </a:lnRef>
+          <a:fillRef idx="1">
+            <a:schemeClr val="lt1"/>
+          </a:fillRef>
+          <a:effectRef idx="0">
+            <a:schemeClr val="dk1"/>
+          </a:effectRef>
+          <a:fontRef idx="minor">
+            <a:schemeClr val="dk1"/>
+          </a:fontRef>
+        </p:style>
+        <p:txBody>
+          <a:bodyPr wrap="square" rtlCol="0">
+            <a:spAutoFit/>
+          </a:bodyPr>
+          <a:lstStyle/>
+          <a:p>
+            <a:r>
+              <a:rPr lang="en-US" dirty="0" err="1"/>
+              <a:t>CommandManager</a:t>
+            </a:r>
+            <a:endParaRPr lang="en-US" dirty="0"/>
+          </a:p>
+        </p:txBody>
+      </p:sp>
+      <p:sp>
+        <p:nvSpPr>
+          <p:cNvPr id="8" name="TextBox 7">
+            <a:extLst>
+              <a:ext uri="{FF2B5EF4-FFF2-40B4-BE49-F238E27FC236}">
+                <a16:creationId xmlns:a16="http://schemas.microsoft.com/office/drawing/2014/main" id="{AA29B74B-C6F7-7840-820D-68A028E58E48}"/>
+              </a:ext>
+            </a:extLst>
+          </p:cNvPr>
+          <p:cNvSpPr txBox="1"/>
+          <p:nvPr/>
+        </p:nvSpPr>
+        <p:spPr>
+          <a:xfrm>
+            <a:off x="1507474" y="3055587"/>
+            <a:ext cx="1979363" cy="369332"/>
+          </a:xfrm>
+          <a:prstGeom prst="rect">
+            <a:avLst/>
+          </a:prstGeom>
+        </p:spPr>
+        <p:style>
+          <a:lnRef idx="2">
+            <a:schemeClr val="dk1"/>
+          </a:lnRef>
+          <a:fillRef idx="1">
+            <a:schemeClr val="lt1"/>
+          </a:fillRef>
+          <a:effectRef idx="0">
+            <a:schemeClr val="dk1"/>
+          </a:effectRef>
+          <a:fontRef idx="minor">
+            <a:schemeClr val="dk1"/>
+          </a:fontRef>
+        </p:style>
+        <p:txBody>
+          <a:bodyPr wrap="square" rtlCol="0">
+            <a:spAutoFit/>
+          </a:bodyPr>
+          <a:lstStyle/>
+          <a:p>
+            <a:r>
+              <a:rPr lang="en-US" dirty="0" err="1"/>
+              <a:t>PlayerStatManager</a:t>
+            </a:r>
+            <a:endParaRPr lang="en-US" dirty="0"/>
+          </a:p>
+        </p:txBody>
+      </p:sp>
+      <p:sp>
+        <p:nvSpPr>
+          <p:cNvPr id="9" name="TextBox 8">
+            <a:extLst>
+              <a:ext uri="{FF2B5EF4-FFF2-40B4-BE49-F238E27FC236}">
+                <a16:creationId xmlns:a16="http://schemas.microsoft.com/office/drawing/2014/main" id="{46DEE092-B650-7945-9A50-ECC28064AD74}"/>
+              </a:ext>
+            </a:extLst>
+          </p:cNvPr>
+          <p:cNvSpPr txBox="1"/>
+          <p:nvPr/>
+        </p:nvSpPr>
+        <p:spPr>
+          <a:xfrm>
+            <a:off x="236399" y="2321384"/>
+            <a:ext cx="2095043" cy="369332"/>
+          </a:xfrm>
+          <a:prstGeom prst="rect">
+            <a:avLst/>
+          </a:prstGeom>
+        </p:spPr>
+        <p:style>
+          <a:lnRef idx="2">
+            <a:schemeClr val="dk1"/>
+          </a:lnRef>
+          <a:fillRef idx="1">
+            <a:schemeClr val="lt1"/>
+          </a:fillRef>
+          <a:effectRef idx="0">
+            <a:schemeClr val="dk1"/>
+          </a:effectRef>
+          <a:fontRef idx="minor">
+            <a:schemeClr val="dk1"/>
+          </a:fontRef>
+        </p:style>
+        <p:txBody>
+          <a:bodyPr wrap="square" rtlCol="0">
+            <a:spAutoFit/>
+          </a:bodyPr>
+          <a:lstStyle/>
+          <a:p>
+            <a:r>
+              <a:rPr lang="en-US" dirty="0" err="1"/>
+              <a:t>PlayerStatComparer</a:t>
+            </a:r>
+            <a:endParaRPr lang="en-US" dirty="0"/>
+          </a:p>
+        </p:txBody>
+      </p:sp>
+      <p:sp>
+        <p:nvSpPr>
+          <p:cNvPr id="10" name="TextBox 9">
+            <a:extLst>
+              <a:ext uri="{FF2B5EF4-FFF2-40B4-BE49-F238E27FC236}">
+                <a16:creationId xmlns:a16="http://schemas.microsoft.com/office/drawing/2014/main" id="{000FE2A6-CC73-C549-B59E-E683039F7368}"/>
+              </a:ext>
+            </a:extLst>
+          </p:cNvPr>
+          <p:cNvSpPr txBox="1"/>
+          <p:nvPr/>
+        </p:nvSpPr>
+        <p:spPr>
+          <a:xfrm>
+            <a:off x="2741590" y="2332653"/>
+            <a:ext cx="1979363" cy="369332"/>
+          </a:xfrm>
+          <a:prstGeom prst="rect">
+            <a:avLst/>
+          </a:prstGeom>
+        </p:spPr>
+        <p:style>
+          <a:lnRef idx="2">
+            <a:schemeClr val="dk1"/>
+          </a:lnRef>
+          <a:fillRef idx="1">
+            <a:schemeClr val="lt1"/>
+          </a:fillRef>
+          <a:effectRef idx="0">
+            <a:schemeClr val="dk1"/>
+          </a:effectRef>
+          <a:fontRef idx="minor">
+            <a:schemeClr val="dk1"/>
+          </a:fontRef>
+        </p:style>
+        <p:txBody>
+          <a:bodyPr wrap="square" rtlCol="0">
+            <a:spAutoFit/>
+          </a:bodyPr>
+          <a:lstStyle/>
+          <a:p>
+            <a:r>
+              <a:rPr lang="en-US" dirty="0" err="1"/>
+              <a:t>PlayerStatPredictor</a:t>
+            </a:r>
+            <a:endParaRPr lang="en-US" dirty="0"/>
+          </a:p>
+        </p:txBody>
+      </p:sp>
+      <p:sp>
+        <p:nvSpPr>
+          <p:cNvPr id="11" name="TextBox 10">
+            <a:extLst>
+              <a:ext uri="{FF2B5EF4-FFF2-40B4-BE49-F238E27FC236}">
+                <a16:creationId xmlns:a16="http://schemas.microsoft.com/office/drawing/2014/main" id="{415162AC-277A-E94A-BB5E-21F0CA3BC13E}"/>
+              </a:ext>
+            </a:extLst>
+          </p:cNvPr>
+          <p:cNvSpPr txBox="1"/>
+          <p:nvPr/>
+        </p:nvSpPr>
+        <p:spPr>
+          <a:xfrm>
+            <a:off x="7418143" y="2316382"/>
+            <a:ext cx="1979363" cy="369332"/>
+          </a:xfrm>
+          <a:prstGeom prst="rect">
+            <a:avLst/>
+          </a:prstGeom>
+        </p:spPr>
+        <p:style>
+          <a:lnRef idx="2">
+            <a:schemeClr val="dk1"/>
+          </a:lnRef>
+          <a:fillRef idx="1">
+            <a:schemeClr val="lt1"/>
+          </a:fillRef>
+          <a:effectRef idx="0">
+            <a:schemeClr val="dk1"/>
+          </a:effectRef>
+          <a:fontRef idx="minor">
+            <a:schemeClr val="dk1"/>
+          </a:fontRef>
+        </p:style>
+        <p:txBody>
+          <a:bodyPr wrap="square" rtlCol="0">
+            <a:spAutoFit/>
+          </a:bodyPr>
+          <a:lstStyle/>
+          <a:p>
+            <a:r>
+              <a:rPr lang="en-US" dirty="0" err="1"/>
+              <a:t>TeamStatComparer</a:t>
+            </a:r>
+            <a:endParaRPr lang="en-US" dirty="0"/>
+          </a:p>
+        </p:txBody>
+      </p:sp>
+      <p:sp>
+        <p:nvSpPr>
+          <p:cNvPr id="12" name="TextBox 11">
+            <a:extLst>
+              <a:ext uri="{FF2B5EF4-FFF2-40B4-BE49-F238E27FC236}">
+                <a16:creationId xmlns:a16="http://schemas.microsoft.com/office/drawing/2014/main" id="{6083AA40-A151-6C49-A7C7-A182CD36CF97}"/>
+              </a:ext>
+            </a:extLst>
+          </p:cNvPr>
+          <p:cNvSpPr txBox="1"/>
+          <p:nvPr/>
+        </p:nvSpPr>
+        <p:spPr>
+          <a:xfrm>
+            <a:off x="9939507" y="2290149"/>
+            <a:ext cx="1979363" cy="369332"/>
+          </a:xfrm>
+          <a:prstGeom prst="rect">
+            <a:avLst/>
+          </a:prstGeom>
+        </p:spPr>
+        <p:style>
+          <a:lnRef idx="2">
+            <a:schemeClr val="dk1"/>
+          </a:lnRef>
+          <a:fillRef idx="1">
+            <a:schemeClr val="lt1"/>
+          </a:fillRef>
+          <a:effectRef idx="0">
+            <a:schemeClr val="dk1"/>
+          </a:effectRef>
+          <a:fontRef idx="minor">
+            <a:schemeClr val="dk1"/>
+          </a:fontRef>
+        </p:style>
+        <p:txBody>
+          <a:bodyPr wrap="square" rtlCol="0">
+            <a:spAutoFit/>
+          </a:bodyPr>
+          <a:lstStyle/>
+          <a:p>
+            <a:r>
+              <a:rPr lang="en-US" dirty="0" err="1"/>
+              <a:t>TeamStatPredictor</a:t>
+            </a:r>
+            <a:endParaRPr lang="en-US" dirty="0"/>
+          </a:p>
+        </p:txBody>
+      </p:sp>
+      <p:sp>
+        <p:nvSpPr>
+          <p:cNvPr id="13" name="TextBox 12">
+            <a:extLst>
+              <a:ext uri="{FF2B5EF4-FFF2-40B4-BE49-F238E27FC236}">
+                <a16:creationId xmlns:a16="http://schemas.microsoft.com/office/drawing/2014/main" id="{1006AA07-B16A-1E4A-B760-B815790714BA}"/>
+              </a:ext>
+            </a:extLst>
+          </p:cNvPr>
+          <p:cNvSpPr txBox="1"/>
+          <p:nvPr/>
+        </p:nvSpPr>
+        <p:spPr>
+          <a:xfrm>
+            <a:off x="8705165" y="3086345"/>
+            <a:ext cx="1979363" cy="369332"/>
+          </a:xfrm>
+          <a:prstGeom prst="rect">
+            <a:avLst/>
+          </a:prstGeom>
+        </p:spPr>
+        <p:style>
+          <a:lnRef idx="2">
+            <a:schemeClr val="dk1"/>
+          </a:lnRef>
+          <a:fillRef idx="1">
+            <a:schemeClr val="lt1"/>
+          </a:fillRef>
+          <a:effectRef idx="0">
+            <a:schemeClr val="dk1"/>
+          </a:effectRef>
+          <a:fontRef idx="minor">
+            <a:schemeClr val="dk1"/>
+          </a:fontRef>
+        </p:style>
+        <p:txBody>
+          <a:bodyPr wrap="square" rtlCol="0">
+            <a:spAutoFit/>
+          </a:bodyPr>
+          <a:lstStyle/>
+          <a:p>
+            <a:r>
+              <a:rPr lang="en-US" dirty="0" err="1"/>
+              <a:t>TeamStatManager</a:t>
+            </a:r>
+            <a:endParaRPr lang="en-US" dirty="0"/>
+          </a:p>
+        </p:txBody>
+      </p:sp>
+      <p:sp>
+        <p:nvSpPr>
+          <p:cNvPr id="14" name="TextBox 13">
+            <a:extLst>
+              <a:ext uri="{FF2B5EF4-FFF2-40B4-BE49-F238E27FC236}">
+                <a16:creationId xmlns:a16="http://schemas.microsoft.com/office/drawing/2014/main" id="{75CBA68F-7821-DC4F-B0EA-1F5B11784E2E}"/>
+              </a:ext>
+            </a:extLst>
+          </p:cNvPr>
+          <p:cNvSpPr txBox="1"/>
+          <p:nvPr/>
+        </p:nvSpPr>
+        <p:spPr>
+          <a:xfrm>
+            <a:off x="1795601" y="4900484"/>
+            <a:ext cx="1642434" cy="369332"/>
+          </a:xfrm>
+          <a:prstGeom prst="rect">
+            <a:avLst/>
+          </a:prstGeom>
+        </p:spPr>
+        <p:style>
+          <a:lnRef idx="2">
+            <a:schemeClr val="dk1"/>
+          </a:lnRef>
+          <a:fillRef idx="1">
+            <a:schemeClr val="lt1"/>
+          </a:fillRef>
+          <a:effectRef idx="0">
+            <a:schemeClr val="dk1"/>
+          </a:effectRef>
+          <a:fontRef idx="minor">
+            <a:schemeClr val="dk1"/>
+          </a:fontRef>
+        </p:style>
+        <p:txBody>
+          <a:bodyPr wrap="square" rtlCol="0">
+            <a:spAutoFit/>
+          </a:bodyPr>
+          <a:lstStyle/>
+          <a:p>
+            <a:r>
+              <a:rPr lang="en-US" dirty="0" err="1"/>
+              <a:t>TeamManager</a:t>
+            </a:r>
+            <a:endParaRPr lang="en-US" dirty="0"/>
+          </a:p>
+        </p:txBody>
+      </p:sp>
+      <p:sp>
+        <p:nvSpPr>
+          <p:cNvPr id="15" name="TextBox 14">
+            <a:extLst>
+              <a:ext uri="{FF2B5EF4-FFF2-40B4-BE49-F238E27FC236}">
+                <a16:creationId xmlns:a16="http://schemas.microsoft.com/office/drawing/2014/main" id="{7DA7A1E2-F9EB-AB41-B992-6E4830D8BC89}"/>
+              </a:ext>
+            </a:extLst>
+          </p:cNvPr>
+          <p:cNvSpPr txBox="1"/>
+          <p:nvPr/>
+        </p:nvSpPr>
+        <p:spPr>
+          <a:xfrm>
+            <a:off x="9024652" y="4918620"/>
+            <a:ext cx="1659876" cy="369332"/>
+          </a:xfrm>
+          <a:prstGeom prst="rect">
+            <a:avLst/>
+          </a:prstGeom>
+        </p:spPr>
+        <p:style>
+          <a:lnRef idx="2">
+            <a:schemeClr val="dk1"/>
+          </a:lnRef>
+          <a:fillRef idx="1">
+            <a:schemeClr val="lt1"/>
+          </a:fillRef>
+          <a:effectRef idx="0">
+            <a:schemeClr val="dk1"/>
+          </a:effectRef>
+          <a:fontRef idx="minor">
+            <a:schemeClr val="dk1"/>
+          </a:fontRef>
+        </p:style>
+        <p:txBody>
+          <a:bodyPr wrap="square" rtlCol="0">
+            <a:spAutoFit/>
+          </a:bodyPr>
+          <a:lstStyle/>
+          <a:p>
+            <a:r>
+              <a:rPr lang="en-US" dirty="0" err="1"/>
+              <a:t>PlayerManager</a:t>
+            </a:r>
+            <a:endParaRPr lang="en-US" dirty="0"/>
+          </a:p>
+        </p:txBody>
+      </p:sp>
+      <p:sp>
+        <p:nvSpPr>
+          <p:cNvPr id="16" name="TextBox 15">
+            <a:extLst>
+              <a:ext uri="{FF2B5EF4-FFF2-40B4-BE49-F238E27FC236}">
+                <a16:creationId xmlns:a16="http://schemas.microsoft.com/office/drawing/2014/main" id="{64671FA6-3B29-B647-8878-F5C982B0BE42}"/>
+              </a:ext>
+            </a:extLst>
+          </p:cNvPr>
+          <p:cNvSpPr txBox="1"/>
+          <p:nvPr/>
+        </p:nvSpPr>
+        <p:spPr>
+          <a:xfrm>
+            <a:off x="1831128" y="5689403"/>
+            <a:ext cx="1362420" cy="369332"/>
+          </a:xfrm>
+          <a:prstGeom prst="rect">
+            <a:avLst/>
+          </a:prstGeom>
+        </p:spPr>
+        <p:style>
+          <a:lnRef idx="2">
+            <a:schemeClr val="dk1"/>
+          </a:lnRef>
+          <a:fillRef idx="1">
+            <a:schemeClr val="lt1"/>
+          </a:fillRef>
+          <a:effectRef idx="0">
+            <a:schemeClr val="dk1"/>
+          </a:effectRef>
+          <a:fontRef idx="minor">
+            <a:schemeClr val="dk1"/>
+          </a:fontRef>
+        </p:style>
+        <p:txBody>
+          <a:bodyPr wrap="square" rtlCol="0">
+            <a:spAutoFit/>
+          </a:bodyPr>
+          <a:lstStyle/>
+          <a:p>
+            <a:r>
+              <a:rPr lang="en-US" dirty="0" err="1"/>
+              <a:t>HockeyTeam</a:t>
+            </a:r>
+            <a:endParaRPr lang="en-US" dirty="0"/>
+          </a:p>
+        </p:txBody>
+      </p:sp>
+      <p:sp>
+        <p:nvSpPr>
+          <p:cNvPr id="17" name="TextBox 16">
+            <a:extLst>
+              <a:ext uri="{FF2B5EF4-FFF2-40B4-BE49-F238E27FC236}">
+                <a16:creationId xmlns:a16="http://schemas.microsoft.com/office/drawing/2014/main" id="{397482C5-052C-6242-9539-F21B815F870A}"/>
+              </a:ext>
+            </a:extLst>
+          </p:cNvPr>
+          <p:cNvSpPr txBox="1"/>
+          <p:nvPr/>
+        </p:nvSpPr>
+        <p:spPr>
+          <a:xfrm>
+            <a:off x="9123716" y="5757815"/>
+            <a:ext cx="1432193" cy="369332"/>
+          </a:xfrm>
+          <a:prstGeom prst="rect">
+            <a:avLst/>
+          </a:prstGeom>
+        </p:spPr>
+        <p:style>
+          <a:lnRef idx="2">
+            <a:schemeClr val="dk1"/>
+          </a:lnRef>
+          <a:fillRef idx="1">
+            <a:schemeClr val="lt1"/>
+          </a:fillRef>
+          <a:effectRef idx="0">
+            <a:schemeClr val="dk1"/>
+          </a:effectRef>
+          <a:fontRef idx="minor">
+            <a:schemeClr val="dk1"/>
+          </a:fontRef>
+        </p:style>
+        <p:txBody>
+          <a:bodyPr wrap="square" rtlCol="0">
+            <a:spAutoFit/>
+          </a:bodyPr>
+          <a:lstStyle/>
+          <a:p>
+            <a:r>
+              <a:rPr lang="en-US" dirty="0" err="1"/>
+              <a:t>HockeyPlayer</a:t>
+            </a:r>
+            <a:endParaRPr lang="en-US" dirty="0"/>
+          </a:p>
+        </p:txBody>
+      </p:sp>
+      <p:cxnSp>
+        <p:nvCxnSpPr>
+          <p:cNvPr id="19" name="Straight Connector 18">
+            <a:extLst>
+              <a:ext uri="{FF2B5EF4-FFF2-40B4-BE49-F238E27FC236}">
+                <a16:creationId xmlns:a16="http://schemas.microsoft.com/office/drawing/2014/main" id="{A1DC68B2-5894-6742-B640-7434332DEE7D}"/>
+              </a:ext>
+            </a:extLst>
+          </p:cNvPr>
+          <p:cNvCxnSpPr/>
+          <p:nvPr/>
+        </p:nvCxnSpPr>
+        <p:spPr>
+          <a:xfrm>
+            <a:off x="270830" y="616945"/>
+            <a:ext cx="11682471" cy="0"/>
+          </a:xfrm>
+          <a:prstGeom prst="line">
+            <a:avLst/>
+          </a:prstGeom>
+          <a:ln w="28575"/>
+        </p:spPr>
+        <p:style>
+          <a:lnRef idx="1">
+            <a:schemeClr val="dk1"/>
+          </a:lnRef>
+          <a:fillRef idx="0">
+            <a:schemeClr val="dk1"/>
+          </a:fillRef>
+          <a:effectRef idx="0">
+            <a:schemeClr val="dk1"/>
+          </a:effectRef>
+          <a:fontRef idx="minor">
+            <a:schemeClr val="tx1"/>
+          </a:fontRef>
+        </p:style>
+      </p:cxnSp>
+      <p:cxnSp>
+        <p:nvCxnSpPr>
+          <p:cNvPr id="20" name="Straight Connector 19">
+            <a:extLst>
+              <a:ext uri="{FF2B5EF4-FFF2-40B4-BE49-F238E27FC236}">
+                <a16:creationId xmlns:a16="http://schemas.microsoft.com/office/drawing/2014/main" id="{28B1B928-B9F0-1B45-8123-69C7934B579D}"/>
+              </a:ext>
+            </a:extLst>
+          </p:cNvPr>
+          <p:cNvCxnSpPr/>
+          <p:nvPr/>
+        </p:nvCxnSpPr>
+        <p:spPr>
+          <a:xfrm>
+            <a:off x="272665" y="1628660"/>
+            <a:ext cx="11682471" cy="0"/>
+          </a:xfrm>
+          <a:prstGeom prst="line">
+            <a:avLst/>
+          </a:prstGeom>
+          <a:ln w="28575"/>
+        </p:spPr>
+        <p:style>
+          <a:lnRef idx="1">
+            <a:schemeClr val="dk1"/>
+          </a:lnRef>
+          <a:fillRef idx="0">
+            <a:schemeClr val="dk1"/>
+          </a:fillRef>
+          <a:effectRef idx="0">
+            <a:schemeClr val="dk1"/>
+          </a:effectRef>
+          <a:fontRef idx="minor">
+            <a:schemeClr val="tx1"/>
+          </a:fontRef>
+        </p:style>
+      </p:cxnSp>
+      <p:cxnSp>
+        <p:nvCxnSpPr>
+          <p:cNvPr id="21" name="Straight Connector 20">
+            <a:extLst>
+              <a:ext uri="{FF2B5EF4-FFF2-40B4-BE49-F238E27FC236}">
+                <a16:creationId xmlns:a16="http://schemas.microsoft.com/office/drawing/2014/main" id="{8A61A170-120C-C849-8933-798F87E54180}"/>
+              </a:ext>
+            </a:extLst>
+          </p:cNvPr>
+          <p:cNvCxnSpPr/>
+          <p:nvPr/>
+        </p:nvCxnSpPr>
+        <p:spPr>
+          <a:xfrm>
+            <a:off x="236399" y="4748181"/>
+            <a:ext cx="11682471" cy="0"/>
+          </a:xfrm>
+          <a:prstGeom prst="line">
+            <a:avLst/>
+          </a:prstGeom>
+          <a:ln w="28575"/>
+        </p:spPr>
+        <p:style>
+          <a:lnRef idx="1">
+            <a:schemeClr val="dk1"/>
+          </a:lnRef>
+          <a:fillRef idx="0">
+            <a:schemeClr val="dk1"/>
+          </a:fillRef>
+          <a:effectRef idx="0">
+            <a:schemeClr val="dk1"/>
+          </a:effectRef>
+          <a:fontRef idx="minor">
+            <a:schemeClr val="tx1"/>
+          </a:fontRef>
+        </p:style>
+      </p:cxnSp>
+      <p:sp>
+        <p:nvSpPr>
+          <p:cNvPr id="22" name="TextBox 21">
+            <a:extLst>
+              <a:ext uri="{FF2B5EF4-FFF2-40B4-BE49-F238E27FC236}">
+                <a16:creationId xmlns:a16="http://schemas.microsoft.com/office/drawing/2014/main" id="{95DBC007-B69E-6A4E-B874-D29E1D00CA10}"/>
+              </a:ext>
+            </a:extLst>
+          </p:cNvPr>
+          <p:cNvSpPr txBox="1"/>
+          <p:nvPr/>
+        </p:nvSpPr>
+        <p:spPr>
+          <a:xfrm>
+            <a:off x="124362" y="69644"/>
+            <a:ext cx="2387977" cy="369332"/>
+          </a:xfrm>
+          <a:prstGeom prst="rect">
+            <a:avLst/>
+          </a:prstGeom>
+          <a:ln>
+            <a:noFill/>
+          </a:ln>
+        </p:spPr>
+        <p:style>
+          <a:lnRef idx="2">
+            <a:schemeClr val="dk1"/>
+          </a:lnRef>
+          <a:fillRef idx="1">
+            <a:schemeClr val="lt1"/>
+          </a:fillRef>
+          <a:effectRef idx="0">
+            <a:schemeClr val="dk1"/>
+          </a:effectRef>
+          <a:fontRef idx="minor">
+            <a:schemeClr val="dk1"/>
+          </a:fontRef>
+        </p:style>
+        <p:txBody>
+          <a:bodyPr wrap="square" rtlCol="0">
+            <a:spAutoFit/>
+          </a:bodyPr>
+          <a:lstStyle/>
+          <a:p>
+            <a:r>
+              <a:rPr lang="en-US" dirty="0"/>
+              <a:t>Framework &amp; Drivers</a:t>
+            </a:r>
+          </a:p>
+        </p:txBody>
+      </p:sp>
+      <p:sp>
+        <p:nvSpPr>
+          <p:cNvPr id="23" name="TextBox 22">
+            <a:extLst>
+              <a:ext uri="{FF2B5EF4-FFF2-40B4-BE49-F238E27FC236}">
+                <a16:creationId xmlns:a16="http://schemas.microsoft.com/office/drawing/2014/main" id="{2AF76036-BC88-2D4A-8895-96D7224F5BE7}"/>
+              </a:ext>
+            </a:extLst>
+          </p:cNvPr>
+          <p:cNvSpPr txBox="1"/>
+          <p:nvPr/>
+        </p:nvSpPr>
+        <p:spPr>
+          <a:xfrm>
+            <a:off x="124362" y="735442"/>
+            <a:ext cx="2387977" cy="369332"/>
+          </a:xfrm>
+          <a:prstGeom prst="rect">
+            <a:avLst/>
+          </a:prstGeom>
+          <a:ln>
+            <a:noFill/>
+          </a:ln>
+        </p:spPr>
+        <p:style>
+          <a:lnRef idx="2">
+            <a:schemeClr val="dk1"/>
+          </a:lnRef>
+          <a:fillRef idx="1">
+            <a:schemeClr val="lt1"/>
+          </a:fillRef>
+          <a:effectRef idx="0">
+            <a:schemeClr val="dk1"/>
+          </a:effectRef>
+          <a:fontRef idx="minor">
+            <a:schemeClr val="dk1"/>
+          </a:fontRef>
+        </p:style>
+        <p:txBody>
+          <a:bodyPr wrap="square" rtlCol="0">
+            <a:spAutoFit/>
+          </a:bodyPr>
+          <a:lstStyle/>
+          <a:p>
+            <a:r>
+              <a:rPr lang="en-US" dirty="0"/>
+              <a:t>Interface Adapters</a:t>
+            </a:r>
+          </a:p>
+        </p:txBody>
+      </p:sp>
+      <p:sp>
+        <p:nvSpPr>
+          <p:cNvPr id="24" name="TextBox 23">
+            <a:extLst>
+              <a:ext uri="{FF2B5EF4-FFF2-40B4-BE49-F238E27FC236}">
+                <a16:creationId xmlns:a16="http://schemas.microsoft.com/office/drawing/2014/main" id="{1F1BC576-D3BA-6548-A9AF-99BFBD67CEBC}"/>
+              </a:ext>
+            </a:extLst>
+          </p:cNvPr>
+          <p:cNvSpPr txBox="1"/>
+          <p:nvPr/>
+        </p:nvSpPr>
+        <p:spPr>
+          <a:xfrm>
+            <a:off x="124362" y="1762238"/>
+            <a:ext cx="2387977" cy="369332"/>
+          </a:xfrm>
+          <a:prstGeom prst="rect">
+            <a:avLst/>
+          </a:prstGeom>
+          <a:ln>
+            <a:noFill/>
+          </a:ln>
+        </p:spPr>
+        <p:style>
+          <a:lnRef idx="2">
+            <a:schemeClr val="dk1"/>
+          </a:lnRef>
+          <a:fillRef idx="1">
+            <a:schemeClr val="lt1"/>
+          </a:fillRef>
+          <a:effectRef idx="0">
+            <a:schemeClr val="dk1"/>
+          </a:effectRef>
+          <a:fontRef idx="minor">
+            <a:schemeClr val="dk1"/>
+          </a:fontRef>
+        </p:style>
+        <p:txBody>
+          <a:bodyPr wrap="square" rtlCol="0">
+            <a:spAutoFit/>
+          </a:bodyPr>
+          <a:lstStyle/>
+          <a:p>
+            <a:r>
+              <a:rPr lang="en-US" dirty="0"/>
+              <a:t>Use Cases</a:t>
+            </a:r>
+          </a:p>
+        </p:txBody>
+      </p:sp>
+      <p:sp>
+        <p:nvSpPr>
+          <p:cNvPr id="25" name="TextBox 24">
+            <a:extLst>
+              <a:ext uri="{FF2B5EF4-FFF2-40B4-BE49-F238E27FC236}">
+                <a16:creationId xmlns:a16="http://schemas.microsoft.com/office/drawing/2014/main" id="{F78D16CE-99D1-6343-82AB-9384D86E550D}"/>
+              </a:ext>
+            </a:extLst>
+          </p:cNvPr>
+          <p:cNvSpPr txBox="1"/>
+          <p:nvPr/>
+        </p:nvSpPr>
+        <p:spPr>
+          <a:xfrm>
+            <a:off x="124361" y="4881758"/>
+            <a:ext cx="2387977" cy="369332"/>
+          </a:xfrm>
+          <a:prstGeom prst="rect">
+            <a:avLst/>
+          </a:prstGeom>
+          <a:noFill/>
+          <a:ln>
+            <a:noFill/>
+          </a:ln>
+        </p:spPr>
+        <p:style>
+          <a:lnRef idx="2">
+            <a:schemeClr val="dk1"/>
+          </a:lnRef>
+          <a:fillRef idx="1">
+            <a:schemeClr val="lt1"/>
+          </a:fillRef>
+          <a:effectRef idx="0">
+            <a:schemeClr val="dk1"/>
+          </a:effectRef>
+          <a:fontRef idx="minor">
+            <a:schemeClr val="dk1"/>
+          </a:fontRef>
+        </p:style>
+        <p:txBody>
+          <a:bodyPr wrap="square" rtlCol="0">
+            <a:spAutoFit/>
+          </a:bodyPr>
+          <a:lstStyle/>
+          <a:p>
+            <a:r>
+              <a:rPr lang="en-US" dirty="0"/>
+              <a:t>Entities</a:t>
+            </a:r>
+          </a:p>
+        </p:txBody>
+      </p:sp>
+      <p:sp>
+        <p:nvSpPr>
+          <p:cNvPr id="26" name="TextBox 25">
+            <a:extLst>
+              <a:ext uri="{FF2B5EF4-FFF2-40B4-BE49-F238E27FC236}">
+                <a16:creationId xmlns:a16="http://schemas.microsoft.com/office/drawing/2014/main" id="{18573262-B5F9-664F-8B6B-D90594FC0A40}"/>
+              </a:ext>
+            </a:extLst>
+          </p:cNvPr>
+          <p:cNvSpPr txBox="1"/>
+          <p:nvPr/>
+        </p:nvSpPr>
+        <p:spPr>
+          <a:xfrm>
+            <a:off x="4805986" y="4093017"/>
+            <a:ext cx="2612157" cy="369332"/>
+          </a:xfrm>
+          <a:prstGeom prst="rect">
+            <a:avLst/>
+          </a:prstGeom>
+        </p:spPr>
+        <p:style>
+          <a:lnRef idx="2">
+            <a:schemeClr val="dk1"/>
+          </a:lnRef>
+          <a:fillRef idx="1">
+            <a:schemeClr val="lt1"/>
+          </a:fillRef>
+          <a:effectRef idx="0">
+            <a:schemeClr val="dk1"/>
+          </a:effectRef>
+          <a:fontRef idx="minor">
+            <a:schemeClr val="dk1"/>
+          </a:fontRef>
+        </p:style>
+        <p:txBody>
+          <a:bodyPr wrap="square" rtlCol="0">
+            <a:spAutoFit/>
+          </a:bodyPr>
+          <a:lstStyle/>
+          <a:p>
+            <a:r>
+              <a:rPr lang="en-US" dirty="0" err="1"/>
+              <a:t>PlayerPredictionManager</a:t>
+            </a:r>
+            <a:endParaRPr lang="en-US" dirty="0"/>
+          </a:p>
+        </p:txBody>
+      </p:sp>
+      <p:sp>
+        <p:nvSpPr>
+          <p:cNvPr id="27" name="TextBox 26">
+            <a:extLst>
+              <a:ext uri="{FF2B5EF4-FFF2-40B4-BE49-F238E27FC236}">
+                <a16:creationId xmlns:a16="http://schemas.microsoft.com/office/drawing/2014/main" id="{BB9B4CDF-C41F-A748-83D7-151F4B0B2E42}"/>
+              </a:ext>
+            </a:extLst>
+          </p:cNvPr>
+          <p:cNvSpPr txBox="1"/>
+          <p:nvPr/>
+        </p:nvSpPr>
+        <p:spPr>
+          <a:xfrm>
+            <a:off x="5761928" y="5669382"/>
+            <a:ext cx="631408" cy="369332"/>
+          </a:xfrm>
+          <a:prstGeom prst="rect">
+            <a:avLst/>
+          </a:prstGeom>
+        </p:spPr>
+        <p:style>
+          <a:lnRef idx="2">
+            <a:schemeClr val="dk1"/>
+          </a:lnRef>
+          <a:fillRef idx="1">
+            <a:schemeClr val="lt1"/>
+          </a:fillRef>
+          <a:effectRef idx="0">
+            <a:schemeClr val="dk1"/>
+          </a:effectRef>
+          <a:fontRef idx="minor">
+            <a:schemeClr val="dk1"/>
+          </a:fontRef>
+        </p:style>
+        <p:txBody>
+          <a:bodyPr wrap="square" rtlCol="0">
+            <a:spAutoFit/>
+          </a:bodyPr>
+          <a:lstStyle/>
+          <a:p>
+            <a:r>
+              <a:rPr lang="en-US" dirty="0"/>
+              <a:t>User</a:t>
+            </a:r>
+          </a:p>
+        </p:txBody>
+      </p:sp>
+      <p:sp>
+        <p:nvSpPr>
+          <p:cNvPr id="28" name="TextBox 27">
+            <a:extLst>
+              <a:ext uri="{FF2B5EF4-FFF2-40B4-BE49-F238E27FC236}">
+                <a16:creationId xmlns:a16="http://schemas.microsoft.com/office/drawing/2014/main" id="{5457188E-A46D-EC48-B380-010197F5867A}"/>
+              </a:ext>
+            </a:extLst>
+          </p:cNvPr>
+          <p:cNvSpPr txBox="1"/>
+          <p:nvPr/>
+        </p:nvSpPr>
+        <p:spPr>
+          <a:xfrm>
+            <a:off x="5364780" y="5066424"/>
+            <a:ext cx="1474858" cy="369332"/>
+          </a:xfrm>
+          <a:prstGeom prst="rect">
+            <a:avLst/>
+          </a:prstGeom>
+        </p:spPr>
+        <p:style>
+          <a:lnRef idx="2">
+            <a:schemeClr val="dk1"/>
+          </a:lnRef>
+          <a:fillRef idx="1">
+            <a:schemeClr val="lt1"/>
+          </a:fillRef>
+          <a:effectRef idx="0">
+            <a:schemeClr val="dk1"/>
+          </a:effectRef>
+          <a:fontRef idx="minor">
+            <a:schemeClr val="dk1"/>
+          </a:fontRef>
+        </p:style>
+        <p:txBody>
+          <a:bodyPr wrap="square" rtlCol="0">
+            <a:spAutoFit/>
+          </a:bodyPr>
+          <a:lstStyle/>
+          <a:p>
+            <a:r>
+              <a:rPr lang="en-US" dirty="0" err="1"/>
+              <a:t>UserManager</a:t>
+            </a:r>
+            <a:endParaRPr lang="en-US" dirty="0"/>
+          </a:p>
+        </p:txBody>
+      </p:sp>
+      <p:sp>
+        <p:nvSpPr>
+          <p:cNvPr id="29" name="TextBox 28">
+            <a:extLst>
+              <a:ext uri="{FF2B5EF4-FFF2-40B4-BE49-F238E27FC236}">
+                <a16:creationId xmlns:a16="http://schemas.microsoft.com/office/drawing/2014/main" id="{C68518DD-5FDE-9140-BD4A-8BBC5E3F3E12}"/>
+              </a:ext>
+            </a:extLst>
+          </p:cNvPr>
+          <p:cNvSpPr txBox="1"/>
+          <p:nvPr/>
+        </p:nvSpPr>
+        <p:spPr>
+          <a:xfrm>
+            <a:off x="5316745" y="3432419"/>
+            <a:ext cx="1590637" cy="369332"/>
+          </a:xfrm>
+          <a:prstGeom prst="rect">
+            <a:avLst/>
+          </a:prstGeom>
+        </p:spPr>
+        <p:style>
+          <a:lnRef idx="2">
+            <a:schemeClr val="dk1"/>
+          </a:lnRef>
+          <a:fillRef idx="1">
+            <a:schemeClr val="lt1"/>
+          </a:fillRef>
+          <a:effectRef idx="0">
+            <a:schemeClr val="dk1"/>
+          </a:effectRef>
+          <a:fontRef idx="minor">
+            <a:schemeClr val="dk1"/>
+          </a:fontRef>
+        </p:style>
+        <p:txBody>
+          <a:bodyPr wrap="square" rtlCol="0">
+            <a:spAutoFit/>
+          </a:bodyPr>
+          <a:lstStyle/>
+          <a:p>
+            <a:r>
+              <a:rPr lang="en-US" dirty="0"/>
+              <a:t>Login Manager</a:t>
+            </a:r>
+          </a:p>
+        </p:txBody>
+      </p:sp>
+      <p:sp>
+        <p:nvSpPr>
+          <p:cNvPr id="30" name="TextBox 29">
+            <a:extLst>
+              <a:ext uri="{FF2B5EF4-FFF2-40B4-BE49-F238E27FC236}">
+                <a16:creationId xmlns:a16="http://schemas.microsoft.com/office/drawing/2014/main" id="{C3EAF02E-0011-7644-A0FF-7175AEA29FB4}"/>
+              </a:ext>
+            </a:extLst>
+          </p:cNvPr>
+          <p:cNvSpPr txBox="1"/>
+          <p:nvPr/>
+        </p:nvSpPr>
+        <p:spPr>
+          <a:xfrm>
+            <a:off x="4026731" y="6052501"/>
+            <a:ext cx="779255" cy="369332"/>
+          </a:xfrm>
+          <a:prstGeom prst="rect">
+            <a:avLst/>
+          </a:prstGeom>
+        </p:spPr>
+        <p:style>
+          <a:lnRef idx="2">
+            <a:schemeClr val="dk1"/>
+          </a:lnRef>
+          <a:fillRef idx="1">
+            <a:schemeClr val="lt1"/>
+          </a:fillRef>
+          <a:effectRef idx="0">
+            <a:schemeClr val="dk1"/>
+          </a:effectRef>
+          <a:fontRef idx="minor">
+            <a:schemeClr val="dk1"/>
+          </a:fontRef>
+        </p:style>
+        <p:txBody>
+          <a:bodyPr wrap="square" rtlCol="0">
+            <a:spAutoFit/>
+          </a:bodyPr>
+          <a:lstStyle/>
+          <a:p>
+            <a:r>
+              <a:rPr lang="en-US" dirty="0"/>
+              <a:t>Game</a:t>
+            </a:r>
+          </a:p>
+        </p:txBody>
+      </p:sp>
+    </p:spTree>
+    <p:extLst>
+      <p:ext uri="{BB962C8B-B14F-4D97-AF65-F5344CB8AC3E}">
+        <p14:creationId xmlns:p14="http://schemas.microsoft.com/office/powerpoint/2010/main" val="3356510275"/>
       </p:ext>
     </p:extLst>
   </p:cSld>
@@ -8757,7 +11046,7 @@
         </p:spPr>
         <p:txBody>
           <a:bodyPr vert="horz" lIns="91440" tIns="45720" rIns="91440" bIns="45720" rtlCol="0">
-            <a:normAutofit/>
+            <a:normAutofit fontScale="92500" lnSpcReduction="20000"/>
           </a:bodyPr>
           <a:lstStyle>
             <a:lvl1pPr marL="228600" indent="-228600" algn="l" defTabSz="914400" rtl="0" eaLnBrk="1" latinLnBrk="0" hangingPunct="1">
@@ -8976,6 +11265,20 @@
             <a:r>
               <a:rPr lang="en-US" dirty="0" err="1"/>
               <a:t>TeamStatPredictor</a:t>
+            </a:r>
+            <a:endParaRPr lang="en-US" dirty="0"/>
+          </a:p>
+          <a:p>
+            <a:r>
+              <a:rPr lang="en-US" dirty="0" err="1"/>
+              <a:t>LoginManager</a:t>
+            </a:r>
+            <a:endParaRPr lang="en-US" dirty="0"/>
+          </a:p>
+          <a:p>
+            <a:r>
+              <a:rPr lang="en-US" dirty="0" err="1"/>
+              <a:t>UserPredictionManager</a:t>
             </a:r>
             <a:endParaRPr lang="en-US" dirty="0"/>
           </a:p>
@@ -9749,6 +12052,13 @@
           </a:lstStyle>
           <a:p>
             <a:r>
+              <a:rPr lang="en-US" dirty="0" err="1"/>
+              <a:t>PlayerManager</a:t>
+            </a:r>
+            <a:endParaRPr lang="en-US" dirty="0"/>
+          </a:p>
+          <a:p>
+            <a:r>
               <a:rPr lang="en-US" dirty="0"/>
               <a:t>Player</a:t>
             </a:r>
@@ -10109,6 +12419,13 @@
               </a:defRPr>
             </a:lvl9pPr>
           </a:lstStyle>
+          <a:p>
+            <a:r>
+              <a:rPr lang="en-US" dirty="0" err="1"/>
+              <a:t>TeamManager</a:t>
+            </a:r>
+            <a:endParaRPr lang="en-US" dirty="0"/>
+          </a:p>
           <a:p>
             <a:r>
               <a:rPr lang="en-US" dirty="0"/>

</xml_diff>

<commit_message>
Modify some of the classes in the CRC
</commit_message>
<xml_diff>
--- a/IsaiahCRC.pptx
+++ b/IsaiahCRC.pptx
@@ -7,28 +7,24 @@
   <p:sldIdLst>
     <p:sldId id="258" r:id="rId2"/>
     <p:sldId id="257" r:id="rId3"/>
-    <p:sldId id="272" r:id="rId4"/>
-    <p:sldId id="279" r:id="rId5"/>
-    <p:sldId id="273" r:id="rId6"/>
-    <p:sldId id="263" r:id="rId7"/>
-    <p:sldId id="267" r:id="rId8"/>
+    <p:sldId id="286" r:id="rId4"/>
+    <p:sldId id="263" r:id="rId5"/>
+    <p:sldId id="267" r:id="rId6"/>
+    <p:sldId id="278" r:id="rId7"/>
+    <p:sldId id="285" r:id="rId8"/>
     <p:sldId id="264" r:id="rId9"/>
     <p:sldId id="269" r:id="rId10"/>
     <p:sldId id="270" r:id="rId11"/>
     <p:sldId id="271" r:id="rId12"/>
     <p:sldId id="284" r:id="rId13"/>
     <p:sldId id="282" r:id="rId14"/>
-    <p:sldId id="285" r:id="rId15"/>
-    <p:sldId id="260" r:id="rId16"/>
-    <p:sldId id="265" r:id="rId17"/>
-    <p:sldId id="259" r:id="rId18"/>
-    <p:sldId id="261" r:id="rId19"/>
-    <p:sldId id="266" r:id="rId20"/>
-    <p:sldId id="262" r:id="rId21"/>
-    <p:sldId id="278" r:id="rId22"/>
-    <p:sldId id="281" r:id="rId23"/>
-    <p:sldId id="283" r:id="rId24"/>
-    <p:sldId id="280" r:id="rId25"/>
+    <p:sldId id="260" r:id="rId15"/>
+    <p:sldId id="265" r:id="rId16"/>
+    <p:sldId id="259" r:id="rId17"/>
+    <p:sldId id="261" r:id="rId18"/>
+    <p:sldId id="266" r:id="rId19"/>
+    <p:sldId id="283" r:id="rId20"/>
+    <p:sldId id="280" r:id="rId21"/>
   </p:sldIdLst>
   <p:sldSz cx="12192000" cy="6858000"/>
   <p:notesSz cx="6858000" cy="9144000"/>
@@ -282,7 +278,7 @@
           <a:p>
             <a:fld id="{B9BDA029-145F-C04C-966C-4E60DA5C8DC4}" type="datetimeFigureOut">
               <a:rPr lang="en-US" smtClean="0"/>
-              <a:t>10/8/21</a:t>
+              <a:t>10/11/2021</a:t>
             </a:fld>
             <a:endParaRPr lang="en-US"/>
           </a:p>
@@ -480,7 +476,7 @@
           <a:p>
             <a:fld id="{B9BDA029-145F-C04C-966C-4E60DA5C8DC4}" type="datetimeFigureOut">
               <a:rPr lang="en-US" smtClean="0"/>
-              <a:t>10/8/21</a:t>
+              <a:t>10/11/2021</a:t>
             </a:fld>
             <a:endParaRPr lang="en-US"/>
           </a:p>
@@ -688,7 +684,7 @@
           <a:p>
             <a:fld id="{B9BDA029-145F-C04C-966C-4E60DA5C8DC4}" type="datetimeFigureOut">
               <a:rPr lang="en-US" smtClean="0"/>
-              <a:t>10/8/21</a:t>
+              <a:t>10/11/2021</a:t>
             </a:fld>
             <a:endParaRPr lang="en-US"/>
           </a:p>
@@ -886,7 +882,7 @@
           <a:p>
             <a:fld id="{B9BDA029-145F-C04C-966C-4E60DA5C8DC4}" type="datetimeFigureOut">
               <a:rPr lang="en-US" smtClean="0"/>
-              <a:t>10/8/21</a:t>
+              <a:t>10/11/2021</a:t>
             </a:fld>
             <a:endParaRPr lang="en-US"/>
           </a:p>
@@ -1161,7 +1157,7 @@
           <a:p>
             <a:fld id="{B9BDA029-145F-C04C-966C-4E60DA5C8DC4}" type="datetimeFigureOut">
               <a:rPr lang="en-US" smtClean="0"/>
-              <a:t>10/8/21</a:t>
+              <a:t>10/11/2021</a:t>
             </a:fld>
             <a:endParaRPr lang="en-US"/>
           </a:p>
@@ -1426,7 +1422,7 @@
           <a:p>
             <a:fld id="{B9BDA029-145F-C04C-966C-4E60DA5C8DC4}" type="datetimeFigureOut">
               <a:rPr lang="en-US" smtClean="0"/>
-              <a:t>10/8/21</a:t>
+              <a:t>10/11/2021</a:t>
             </a:fld>
             <a:endParaRPr lang="en-US"/>
           </a:p>
@@ -1838,7 +1834,7 @@
           <a:p>
             <a:fld id="{B9BDA029-145F-C04C-966C-4E60DA5C8DC4}" type="datetimeFigureOut">
               <a:rPr lang="en-US" smtClean="0"/>
-              <a:t>10/8/21</a:t>
+              <a:t>10/11/2021</a:t>
             </a:fld>
             <a:endParaRPr lang="en-US"/>
           </a:p>
@@ -1979,7 +1975,7 @@
           <a:p>
             <a:fld id="{B9BDA029-145F-C04C-966C-4E60DA5C8DC4}" type="datetimeFigureOut">
               <a:rPr lang="en-US" smtClean="0"/>
-              <a:t>10/8/21</a:t>
+              <a:t>10/11/2021</a:t>
             </a:fld>
             <a:endParaRPr lang="en-US"/>
           </a:p>
@@ -2092,7 +2088,7 @@
           <a:p>
             <a:fld id="{B9BDA029-145F-C04C-966C-4E60DA5C8DC4}" type="datetimeFigureOut">
               <a:rPr lang="en-US" smtClean="0"/>
-              <a:t>10/8/21</a:t>
+              <a:t>10/11/2021</a:t>
             </a:fld>
             <a:endParaRPr lang="en-US"/>
           </a:p>
@@ -2403,7 +2399,7 @@
           <a:p>
             <a:fld id="{B9BDA029-145F-C04C-966C-4E60DA5C8DC4}" type="datetimeFigureOut">
               <a:rPr lang="en-US" smtClean="0"/>
-              <a:t>10/8/21</a:t>
+              <a:t>10/11/2021</a:t>
             </a:fld>
             <a:endParaRPr lang="en-US"/>
           </a:p>
@@ -2691,7 +2687,7 @@
           <a:p>
             <a:fld id="{B9BDA029-145F-C04C-966C-4E60DA5C8DC4}" type="datetimeFigureOut">
               <a:rPr lang="en-US" smtClean="0"/>
-              <a:t>10/8/21</a:t>
+              <a:t>10/11/2021</a:t>
             </a:fld>
             <a:endParaRPr lang="en-US"/>
           </a:p>
@@ -2932,7 +2928,7 @@
           <a:p>
             <a:fld id="{B9BDA029-145F-C04C-966C-4E60DA5C8DC4}" type="datetimeFigureOut">
               <a:rPr lang="en-US" smtClean="0"/>
-              <a:t>10/8/21</a:t>
+              <a:t>10/11/2021</a:t>
             </a:fld>
             <a:endParaRPr lang="en-US"/>
           </a:p>
@@ -3377,7 +3373,7 @@
           <a:p>
             <a:r>
               <a:rPr lang="en-US" dirty="0" err="1"/>
-              <a:t>UserInterface</a:t>
+              <a:t>SportsApp</a:t>
             </a:r>
             <a:endParaRPr lang="en-US" dirty="0"/>
           </a:p>
@@ -3411,19 +3407,36 @@
           <a:p>
             <a:r>
               <a:rPr lang="en-US" dirty="0"/>
-              <a:t>Accept input from the user, which it passes to </a:t>
+              <a:t>Starting point of the app</a:t>
+            </a:r>
+          </a:p>
+          <a:p>
+            <a:r>
+              <a:rPr lang="en-US" dirty="0"/>
+              <a:t>Prints instructions for the user to follow</a:t>
+            </a:r>
+          </a:p>
+          <a:p>
+            <a:r>
+              <a:rPr lang="en-US" dirty="0"/>
+              <a:t>Accepts input from the user and passes it to the </a:t>
             </a:r>
             <a:r>
               <a:rPr lang="en-US" dirty="0" err="1"/>
-              <a:t>InputParser</a:t>
+              <a:t>CommandManager</a:t>
             </a:r>
             <a:endParaRPr lang="en-US" dirty="0"/>
           </a:p>
           <a:p>
             <a:r>
               <a:rPr lang="en-US" dirty="0"/>
-              <a:t>Display output to the user</a:t>
-            </a:r>
+              <a:t>Prints out the output received from the </a:t>
+            </a:r>
+            <a:r>
+              <a:rPr lang="en-US" dirty="0" err="1"/>
+              <a:t>CommandManager</a:t>
+            </a:r>
+            <a:endParaRPr lang="en-US" dirty="0"/>
           </a:p>
         </p:txBody>
       </p:sp>
@@ -3685,17 +3698,22 @@
             </a:lvl9pPr>
           </a:lstStyle>
           <a:p>
+            <a:pPr marL="0" indent="0">
+              <a:buNone/>
+            </a:pPr>
+            <a:r>
+              <a:rPr lang="en-US" dirty="0"/>
+              <a:t>Relationships:</a:t>
+            </a:r>
+          </a:p>
+          <a:p>
             <a:r>
               <a:rPr lang="en-US" dirty="0" err="1"/>
-              <a:t>InputParser</a:t>
+              <a:t>CommandManager</a:t>
             </a:r>
             <a:endParaRPr lang="en-US" dirty="0"/>
           </a:p>
           <a:p>
-            <a:r>
-              <a:rPr lang="en-US" dirty="0" err="1"/>
-              <a:t>OutputParser</a:t>
-            </a:r>
             <a:endParaRPr lang="en-US" dirty="0"/>
           </a:p>
         </p:txBody>
@@ -5223,8 +5241,8 @@
         </p:nvSpPr>
         <p:spPr>
           <a:xfrm>
-            <a:off x="441592" y="365125"/>
-            <a:ext cx="5535461" cy="1325563"/>
+            <a:off x="441593" y="365125"/>
+            <a:ext cx="5257800" cy="1325563"/>
           </a:xfrm>
         </p:spPr>
         <p:txBody>
@@ -5233,7 +5251,7 @@
           <a:p>
             <a:r>
               <a:rPr lang="en-US" dirty="0"/>
-              <a:t>Game</a:t>
+              <a:t>Team (Abstract)</a:t>
             </a:r>
           </a:p>
         </p:txBody>
@@ -5266,7 +5284,13 @@
           <a:p>
             <a:r>
               <a:rPr lang="en-US" dirty="0"/>
-              <a:t>Store the game’s location, time, and the two teams competing</a:t>
+              <a:t>Store a team’s name, home city, and players</a:t>
+            </a:r>
+          </a:p>
+          <a:p>
+            <a:r>
+              <a:rPr lang="en-US" dirty="0"/>
+              <a:t>Getters and Setters for above </a:t>
             </a:r>
           </a:p>
         </p:txBody>
@@ -5326,13 +5350,18 @@
           <a:p>
             <a:r>
               <a:rPr lang="en-US" sz="3000" dirty="0"/>
-              <a:t>Subclasses: None</a:t>
-            </a:r>
+              <a:t>Subclasses: </a:t>
+            </a:r>
+            <a:r>
+              <a:rPr lang="en-US" sz="3000" dirty="0" err="1"/>
+              <a:t>HockeyTeam</a:t>
+            </a:r>
+            <a:endParaRPr lang="en-US" sz="3000" dirty="0"/>
           </a:p>
           <a:p>
             <a:r>
               <a:rPr lang="en-US" sz="3000" dirty="0"/>
-              <a:t>Layer: Use Case</a:t>
+              <a:t>Layer: Entity</a:t>
             </a:r>
           </a:p>
         </p:txBody>
@@ -5530,17 +5559,16 @@
           </a:lstStyle>
           <a:p>
             <a:r>
-              <a:rPr lang="en-US" dirty="0" err="1"/>
-              <a:t>UserPredictionManager</a:t>
-            </a:r>
-            <a:endParaRPr lang="en-US" dirty="0"/>
+              <a:rPr lang="en-US" dirty="0"/>
+              <a:t>None</a:t>
+            </a:r>
           </a:p>
         </p:txBody>
       </p:sp>
     </p:spTree>
     <p:extLst>
       <p:ext uri="{BB962C8B-B14F-4D97-AF65-F5344CB8AC3E}">
-        <p14:creationId xmlns:p14="http://schemas.microsoft.com/office/powerpoint/2010/main" val="816090190"/>
+        <p14:creationId xmlns:p14="http://schemas.microsoft.com/office/powerpoint/2010/main" val="307806504"/>
       </p:ext>
     </p:extLst>
   </p:cSld>
@@ -5594,9 +5622,10 @@
           <a:lstStyle/>
           <a:p>
             <a:r>
-              <a:rPr lang="en-US" dirty="0"/>
-              <a:t>Team (Abstract)</a:t>
-            </a:r>
+              <a:rPr lang="en-US" dirty="0" err="1"/>
+              <a:t>HockeyTeam</a:t>
+            </a:r>
+            <a:endParaRPr lang="en-US" dirty="0"/>
           </a:p>
         </p:txBody>
       </p:sp>
@@ -5628,7 +5657,7 @@
           <a:p>
             <a:r>
               <a:rPr lang="en-US" dirty="0"/>
-              <a:t>Store a team’s name, home city, and players</a:t>
+              <a:t>Store a team’s total number of games, wins, losses, and ties</a:t>
             </a:r>
           </a:p>
           <a:p>
@@ -5688,19 +5717,14 @@
           <a:p>
             <a:r>
               <a:rPr lang="en-US" sz="3000" dirty="0"/>
-              <a:t>Parent: None</a:t>
+              <a:t>Parent: Team</a:t>
             </a:r>
           </a:p>
           <a:p>
             <a:r>
               <a:rPr lang="en-US" sz="3000" dirty="0"/>
-              <a:t>Subclasses: </a:t>
-            </a:r>
-            <a:r>
-              <a:rPr lang="en-US" sz="3000" dirty="0" err="1"/>
-              <a:t>HockeyTeam</a:t>
-            </a:r>
-            <a:endParaRPr lang="en-US" sz="3000" dirty="0"/>
+              <a:t>Subclasses: None</a:t>
+            </a:r>
           </a:p>
           <a:p>
             <a:r>
@@ -5903,16 +5927,17 @@
           </a:lstStyle>
           <a:p>
             <a:r>
-              <a:rPr lang="en-US" dirty="0"/>
-              <a:t>None</a:t>
-            </a:r>
+              <a:rPr lang="en-US" dirty="0" err="1"/>
+              <a:t>TeamManager</a:t>
+            </a:r>
+            <a:endParaRPr lang="en-US" dirty="0"/>
           </a:p>
         </p:txBody>
       </p:sp>
     </p:spTree>
     <p:extLst>
       <p:ext uri="{BB962C8B-B14F-4D97-AF65-F5344CB8AC3E}">
-        <p14:creationId xmlns:p14="http://schemas.microsoft.com/office/powerpoint/2010/main" val="307806504"/>
+        <p14:creationId xmlns:p14="http://schemas.microsoft.com/office/powerpoint/2010/main" val="510888793"/>
       </p:ext>
     </p:extLst>
   </p:cSld>
@@ -5967,7 +5992,7 @@
           <a:p>
             <a:r>
               <a:rPr lang="en-US" dirty="0" err="1"/>
-              <a:t>HockeyTeam</a:t>
+              <a:t>TeamManager</a:t>
             </a:r>
             <a:endParaRPr lang="en-US" dirty="0"/>
           </a:p>
@@ -6001,13 +6026,13 @@
           <a:p>
             <a:r>
               <a:rPr lang="en-US" dirty="0"/>
-              <a:t>Store a team’s total number of games, wins, losses, and ties</a:t>
+              <a:t>Store Teams, with getter (for Use Cases to resolve argument name into Team object)</a:t>
             </a:r>
           </a:p>
           <a:p>
             <a:r>
               <a:rPr lang="en-US" dirty="0"/>
-              <a:t>Getters and Setters for above </a:t>
+              <a:t>Create and record new Teams</a:t>
             </a:r>
           </a:p>
         </p:txBody>
@@ -6061,7 +6086,7 @@
           <a:p>
             <a:r>
               <a:rPr lang="en-US" sz="3000" dirty="0"/>
-              <a:t>Parent: Team</a:t>
+              <a:t>Parent: None</a:t>
             </a:r>
           </a:p>
           <a:p>
@@ -6271,17 +6296,16 @@
           </a:lstStyle>
           <a:p>
             <a:r>
-              <a:rPr lang="en-US" dirty="0" err="1"/>
-              <a:t>TeamManager</a:t>
-            </a:r>
-            <a:endParaRPr lang="en-US" dirty="0"/>
+              <a:rPr lang="en-US" dirty="0"/>
+              <a:t>Team</a:t>
+            </a:r>
           </a:p>
         </p:txBody>
       </p:sp>
     </p:spTree>
     <p:extLst>
       <p:ext uri="{BB962C8B-B14F-4D97-AF65-F5344CB8AC3E}">
-        <p14:creationId xmlns:p14="http://schemas.microsoft.com/office/powerpoint/2010/main" val="510888793"/>
+        <p14:creationId xmlns:p14="http://schemas.microsoft.com/office/powerpoint/2010/main" val="4075474463"/>
       </p:ext>
     </p:extLst>
   </p:cSld>
@@ -6335,10 +6359,17 @@
           <a:lstStyle/>
           <a:p>
             <a:r>
+              <a:rPr lang="en-US" dirty="0"/>
+              <a:t>Player (</a:t>
+            </a:r>
+            <a:r>
               <a:rPr lang="en-US" dirty="0" err="1"/>
-              <a:t>TeamManager</a:t>
-            </a:r>
-            <a:endParaRPr lang="en-US" dirty="0"/>
+              <a:t>Abstact</a:t>
+            </a:r>
+            <a:r>
+              <a:rPr lang="en-US" dirty="0"/>
+              <a:t>)</a:t>
+            </a:r>
           </a:p>
         </p:txBody>
       </p:sp>
@@ -6370,13 +6401,13 @@
           <a:p>
             <a:r>
               <a:rPr lang="en-US" dirty="0"/>
-              <a:t>Store Teams, with getter (for Use Cases to resolve argument name into Team object)</a:t>
+              <a:t>Store player name, age, Team, and role on team</a:t>
             </a:r>
           </a:p>
           <a:p>
             <a:r>
               <a:rPr lang="en-US" dirty="0"/>
-              <a:t>Create and record new Teams</a:t>
+              <a:t>Getters and setters for above</a:t>
             </a:r>
           </a:p>
         </p:txBody>
@@ -6436,8 +6467,13 @@
           <a:p>
             <a:r>
               <a:rPr lang="en-US" sz="3000" dirty="0"/>
-              <a:t>Subclasses: None</a:t>
-            </a:r>
+              <a:t>Subclasses: </a:t>
+            </a:r>
+            <a:r>
+              <a:rPr lang="en-US" sz="3000" dirty="0" err="1"/>
+              <a:t>HockeyPlayer</a:t>
+            </a:r>
+            <a:endParaRPr lang="en-US" sz="3000" dirty="0"/>
           </a:p>
           <a:p>
             <a:r>
@@ -6641,7 +6677,7 @@
           <a:p>
             <a:r>
               <a:rPr lang="en-US" dirty="0"/>
-              <a:t>Team</a:t>
+              <a:t>None</a:t>
             </a:r>
           </a:p>
         </p:txBody>
@@ -6649,7 +6685,7 @@
     </p:spTree>
     <p:extLst>
       <p:ext uri="{BB962C8B-B14F-4D97-AF65-F5344CB8AC3E}">
-        <p14:creationId xmlns:p14="http://schemas.microsoft.com/office/powerpoint/2010/main" val="4075474463"/>
+        <p14:creationId xmlns:p14="http://schemas.microsoft.com/office/powerpoint/2010/main" val="1735516745"/>
       </p:ext>
     </p:extLst>
   </p:cSld>
@@ -6703,17 +6739,10 @@
           <a:lstStyle/>
           <a:p>
             <a:r>
-              <a:rPr lang="en-US" dirty="0"/>
-              <a:t>Player (</a:t>
-            </a:r>
-            <a:r>
               <a:rPr lang="en-US" dirty="0" err="1"/>
-              <a:t>Abstact</a:t>
-            </a:r>
-            <a:r>
-              <a:rPr lang="en-US" dirty="0"/>
-              <a:t>)</a:t>
-            </a:r>
+              <a:t>HockeyPlayer</a:t>
+            </a:r>
+            <a:endParaRPr lang="en-US" dirty="0"/>
           </a:p>
         </p:txBody>
       </p:sp>
@@ -6745,7 +6774,7 @@
           <a:p>
             <a:r>
               <a:rPr lang="en-US" dirty="0"/>
-              <a:t>Store player name, age, Team, and role on team</a:t>
+              <a:t>Store player role on Hockey team</a:t>
             </a:r>
           </a:p>
           <a:p>
@@ -6805,19 +6834,19 @@
           <a:p>
             <a:r>
               <a:rPr lang="en-US" sz="3000" dirty="0"/>
-              <a:t>Parent: None</a:t>
-            </a:r>
-          </a:p>
-          <a:p>
-            <a:r>
-              <a:rPr lang="en-US" sz="3000" dirty="0"/>
-              <a:t>Subclasses: </a:t>
+              <a:t>Parent: </a:t>
             </a:r>
             <a:r>
               <a:rPr lang="en-US" sz="3000" dirty="0" err="1"/>
               <a:t>HockeyPlayer</a:t>
             </a:r>
             <a:endParaRPr lang="en-US" sz="3000" dirty="0"/>
+          </a:p>
+          <a:p>
+            <a:r>
+              <a:rPr lang="en-US" sz="3000" dirty="0"/>
+              <a:t>Subclasses: None</a:t>
+            </a:r>
           </a:p>
           <a:p>
             <a:r>
@@ -7020,16 +7049,17 @@
           </a:lstStyle>
           <a:p>
             <a:r>
-              <a:rPr lang="en-US" dirty="0"/>
-              <a:t>None</a:t>
-            </a:r>
+              <a:rPr lang="en-US" dirty="0" err="1"/>
+              <a:t>PlayerManager</a:t>
+            </a:r>
+            <a:endParaRPr lang="en-US" dirty="0"/>
           </a:p>
         </p:txBody>
       </p:sp>
     </p:spTree>
     <p:extLst>
       <p:ext uri="{BB962C8B-B14F-4D97-AF65-F5344CB8AC3E}">
-        <p14:creationId xmlns:p14="http://schemas.microsoft.com/office/powerpoint/2010/main" val="1735516745"/>
+        <p14:creationId xmlns:p14="http://schemas.microsoft.com/office/powerpoint/2010/main" val="678215517"/>
       </p:ext>
     </p:extLst>
   </p:cSld>
@@ -7083,10 +7113,9 @@
           <a:lstStyle/>
           <a:p>
             <a:r>
-              <a:rPr lang="en-US" dirty="0" err="1"/>
-              <a:t>HockeyPlayer</a:t>
-            </a:r>
-            <a:endParaRPr lang="en-US" dirty="0"/>
+              <a:rPr lang="en-US" dirty="0"/>
+              <a:t>Class Name</a:t>
+            </a:r>
           </a:p>
         </p:txBody>
       </p:sp>
@@ -7118,13 +7147,7 @@
           <a:p>
             <a:r>
               <a:rPr lang="en-US" dirty="0"/>
-              <a:t>Store player role on Hockey team</a:t>
-            </a:r>
-          </a:p>
-          <a:p>
-            <a:r>
-              <a:rPr lang="en-US" dirty="0"/>
-              <a:t>Getters and setters for above</a:t>
+              <a:t>Responsibilities</a:t>
             </a:r>
           </a:p>
         </p:txBody>
@@ -7178,24 +7201,19 @@
           <a:p>
             <a:r>
               <a:rPr lang="en-US" sz="3000" dirty="0"/>
-              <a:t>Parent: </a:t>
-            </a:r>
-            <a:r>
-              <a:rPr lang="en-US" sz="3000" dirty="0" err="1"/>
-              <a:t>HockeyPlayer</a:t>
-            </a:r>
-            <a:endParaRPr lang="en-US" sz="3000" dirty="0"/>
+              <a:t>Parent:</a:t>
+            </a:r>
           </a:p>
           <a:p>
             <a:r>
               <a:rPr lang="en-US" sz="3000" dirty="0"/>
-              <a:t>Subclasses: None</a:t>
+              <a:t>Subclasses:</a:t>
             </a:r>
           </a:p>
           <a:p>
             <a:r>
               <a:rPr lang="en-US" sz="3000" dirty="0"/>
-              <a:t>Layer: Entity</a:t>
+              <a:t>Layer:</a:t>
             </a:r>
           </a:p>
         </p:txBody>
@@ -7393,17 +7411,16 @@
           </a:lstStyle>
           <a:p>
             <a:r>
-              <a:rPr lang="en-US" dirty="0" err="1"/>
-              <a:t>PlayerManager</a:t>
-            </a:r>
-            <a:endParaRPr lang="en-US" dirty="0"/>
+              <a:rPr lang="en-US" dirty="0"/>
+              <a:t>Collaborators</a:t>
+            </a:r>
           </a:p>
         </p:txBody>
       </p:sp>
     </p:spTree>
     <p:extLst>
       <p:ext uri="{BB962C8B-B14F-4D97-AF65-F5344CB8AC3E}">
-        <p14:creationId xmlns:p14="http://schemas.microsoft.com/office/powerpoint/2010/main" val="678215517"/>
+        <p14:creationId xmlns:p14="http://schemas.microsoft.com/office/powerpoint/2010/main" val="397343510"/>
       </p:ext>
     </p:extLst>
   </p:cSld>
@@ -7458,7 +7475,7 @@
           <a:p>
             <a:r>
               <a:rPr lang="en-US" dirty="0" err="1"/>
-              <a:t>InputParser</a:t>
+              <a:t>CommandManager</a:t>
             </a:r>
             <a:endParaRPr lang="en-US" dirty="0"/>
           </a:p>
@@ -7492,8 +7509,17 @@
           <a:p>
             <a:r>
               <a:rPr lang="en-US" dirty="0"/>
-              <a:t>Given a user input string, parse it into a more command</a:t>
-            </a:r>
+              <a:t>Identifies the command and pass it to an appropriate object</a:t>
+            </a:r>
+          </a:p>
+          <a:p>
+            <a:r>
+              <a:rPr lang="en-US" dirty="0"/>
+              <a:t>Currently parses the input string in order to identify the command and its arguments</a:t>
+            </a:r>
+          </a:p>
+          <a:p>
+            <a:endParaRPr lang="en-US" dirty="0"/>
           </a:p>
         </p:txBody>
       </p:sp>
@@ -7755,10 +7781,32 @@
             </a:lvl9pPr>
           </a:lstStyle>
           <a:p>
+            <a:pPr marL="0" indent="0">
+              <a:buNone/>
+            </a:pPr>
+            <a:r>
+              <a:rPr lang="en-US" dirty="0"/>
+              <a:t>Relationships:</a:t>
+            </a:r>
+          </a:p>
+          <a:p>
             <a:r>
               <a:rPr lang="en-US" dirty="0" err="1"/>
-              <a:t>UserInterface</a:t>
-            </a:r>
+              <a:t>PlayerStatManager</a:t>
+            </a:r>
+            <a:endParaRPr lang="en-US" dirty="0"/>
+          </a:p>
+          <a:p>
+            <a:r>
+              <a:rPr lang="en-US" dirty="0" err="1"/>
+              <a:t>TeamStatManager</a:t>
+            </a:r>
+            <a:endParaRPr lang="en-US" dirty="0"/>
+          </a:p>
+          <a:p>
+            <a:endParaRPr lang="en-US" dirty="0"/>
+          </a:p>
+          <a:p>
             <a:endParaRPr lang="en-US" dirty="0"/>
           </a:p>
         </p:txBody>
@@ -7795,1464 +7843,6 @@
       </p:grpSpPr>
       <p:sp>
         <p:nvSpPr>
-          <p:cNvPr id="2" name="Title 1">
-            <a:extLst>
-              <a:ext uri="{FF2B5EF4-FFF2-40B4-BE49-F238E27FC236}">
-                <a16:creationId xmlns:a16="http://schemas.microsoft.com/office/drawing/2014/main" id="{2EBAA245-5362-5D4F-90E0-C47F441ED271}"/>
-              </a:ext>
-            </a:extLst>
-          </p:cNvPr>
-          <p:cNvSpPr>
-            <a:spLocks noGrp="1"/>
-          </p:cNvSpPr>
-          <p:nvPr>
-            <p:ph type="title"/>
-          </p:nvPr>
-        </p:nvSpPr>
-        <p:spPr>
-          <a:xfrm>
-            <a:off x="441593" y="365125"/>
-            <a:ext cx="5257800" cy="1325563"/>
-          </a:xfrm>
-        </p:spPr>
-        <p:txBody>
-          <a:bodyPr/>
-          <a:lstStyle/>
-          <a:p>
-            <a:r>
-              <a:rPr lang="en-US" dirty="0" err="1"/>
-              <a:t>PlayerManager</a:t>
-            </a:r>
-            <a:endParaRPr lang="en-US" dirty="0"/>
-          </a:p>
-        </p:txBody>
-      </p:sp>
-      <p:sp>
-        <p:nvSpPr>
-          <p:cNvPr id="3" name="Content Placeholder 2">
-            <a:extLst>
-              <a:ext uri="{FF2B5EF4-FFF2-40B4-BE49-F238E27FC236}">
-                <a16:creationId xmlns:a16="http://schemas.microsoft.com/office/drawing/2014/main" id="{F876DD7D-2457-D840-8CB0-3144388C4EC5}"/>
-              </a:ext>
-            </a:extLst>
-          </p:cNvPr>
-          <p:cNvSpPr>
-            <a:spLocks noGrp="1"/>
-          </p:cNvSpPr>
-          <p:nvPr>
-            <p:ph idx="1"/>
-          </p:nvPr>
-        </p:nvSpPr>
-        <p:spPr>
-          <a:xfrm>
-            <a:off x="441593" y="1891727"/>
-            <a:ext cx="5257800" cy="4351338"/>
-          </a:xfrm>
-        </p:spPr>
-        <p:txBody>
-          <a:bodyPr/>
-          <a:lstStyle/>
-          <a:p>
-            <a:r>
-              <a:rPr lang="en-US" dirty="0"/>
-              <a:t>Store Players, with getter (for use cases to resolve argument name into Player object)</a:t>
-            </a:r>
-          </a:p>
-          <a:p>
-            <a:r>
-              <a:rPr lang="en-US" dirty="0"/>
-              <a:t>Create and record new Players</a:t>
-            </a:r>
-          </a:p>
-        </p:txBody>
-      </p:sp>
-      <p:sp>
-        <p:nvSpPr>
-          <p:cNvPr id="5" name="Title 1">
-            <a:extLst>
-              <a:ext uri="{FF2B5EF4-FFF2-40B4-BE49-F238E27FC236}">
-                <a16:creationId xmlns:a16="http://schemas.microsoft.com/office/drawing/2014/main" id="{32F3D66D-F148-614A-AFF2-6011F7282B4F}"/>
-              </a:ext>
-            </a:extLst>
-          </p:cNvPr>
-          <p:cNvSpPr txBox="1">
-            <a:spLocks/>
-          </p:cNvSpPr>
-          <p:nvPr/>
-        </p:nvSpPr>
-        <p:spPr>
-          <a:xfrm>
-            <a:off x="6492607" y="365125"/>
-            <a:ext cx="5257800" cy="1325563"/>
-          </a:xfrm>
-          <a:prstGeom prst="rect">
-            <a:avLst/>
-          </a:prstGeom>
-        </p:spPr>
-        <p:txBody>
-          <a:bodyPr vert="horz" lIns="91440" tIns="45720" rIns="91440" bIns="45720" rtlCol="0" anchor="ctr">
-            <a:normAutofit lnSpcReduction="10000"/>
-          </a:bodyPr>
-          <a:lstStyle>
-            <a:lvl1pPr algn="l" defTabSz="914400" rtl="0" eaLnBrk="1" latinLnBrk="0" hangingPunct="1">
-              <a:lnSpc>
-                <a:spcPct val="90000"/>
-              </a:lnSpc>
-              <a:spcBef>
-                <a:spcPct val="0"/>
-              </a:spcBef>
-              <a:buNone/>
-              <a:defRPr sz="4400" kern="1200">
-                <a:solidFill>
-                  <a:schemeClr val="tx1"/>
-                </a:solidFill>
-                <a:latin typeface="+mj-lt"/>
-                <a:ea typeface="+mj-ea"/>
-                <a:cs typeface="+mj-cs"/>
-              </a:defRPr>
-            </a:lvl1pPr>
-          </a:lstStyle>
-          <a:p>
-            <a:r>
-              <a:rPr lang="en-US" sz="3000" dirty="0"/>
-              <a:t>Parent: None</a:t>
-            </a:r>
-          </a:p>
-          <a:p>
-            <a:r>
-              <a:rPr lang="en-US" sz="3000" dirty="0"/>
-              <a:t>Subclasses: None</a:t>
-            </a:r>
-          </a:p>
-          <a:p>
-            <a:r>
-              <a:rPr lang="en-US" sz="3000" dirty="0"/>
-              <a:t>Layer: Entity</a:t>
-            </a:r>
-          </a:p>
-        </p:txBody>
-      </p:sp>
-      <p:sp>
-        <p:nvSpPr>
-          <p:cNvPr id="7" name="Content Placeholder 2">
-            <a:extLst>
-              <a:ext uri="{FF2B5EF4-FFF2-40B4-BE49-F238E27FC236}">
-                <a16:creationId xmlns:a16="http://schemas.microsoft.com/office/drawing/2014/main" id="{BBA97EAA-FAAE-6342-A893-4A0CAE51C8C2}"/>
-              </a:ext>
-            </a:extLst>
-          </p:cNvPr>
-          <p:cNvSpPr txBox="1">
-            <a:spLocks/>
-          </p:cNvSpPr>
-          <p:nvPr/>
-        </p:nvSpPr>
-        <p:spPr>
-          <a:xfrm>
-            <a:off x="6492607" y="1891727"/>
-            <a:ext cx="5257800" cy="4351338"/>
-          </a:xfrm>
-          <a:prstGeom prst="rect">
-            <a:avLst/>
-          </a:prstGeom>
-        </p:spPr>
-        <p:txBody>
-          <a:bodyPr vert="horz" lIns="91440" tIns="45720" rIns="91440" bIns="45720" rtlCol="0">
-            <a:normAutofit/>
-          </a:bodyPr>
-          <a:lstStyle>
-            <a:lvl1pPr marL="228600" indent="-228600" algn="l" defTabSz="914400" rtl="0" eaLnBrk="1" latinLnBrk="0" hangingPunct="1">
-              <a:lnSpc>
-                <a:spcPct val="90000"/>
-              </a:lnSpc>
-              <a:spcBef>
-                <a:spcPts val="1000"/>
-              </a:spcBef>
-              <a:buFont typeface="Arial" panose="020B0604020202020204" pitchFamily="34" charset="0"/>
-              <a:buChar char="•"/>
-              <a:defRPr sz="2800" kern="1200">
-                <a:solidFill>
-                  <a:schemeClr val="tx1"/>
-                </a:solidFill>
-                <a:latin typeface="+mn-lt"/>
-                <a:ea typeface="+mn-ea"/>
-                <a:cs typeface="+mn-cs"/>
-              </a:defRPr>
-            </a:lvl1pPr>
-            <a:lvl2pPr marL="685800" indent="-228600" algn="l" defTabSz="914400" rtl="0" eaLnBrk="1" latinLnBrk="0" hangingPunct="1">
-              <a:lnSpc>
-                <a:spcPct val="90000"/>
-              </a:lnSpc>
-              <a:spcBef>
-                <a:spcPts val="500"/>
-              </a:spcBef>
-              <a:buFont typeface="Arial" panose="020B0604020202020204" pitchFamily="34" charset="0"/>
-              <a:buChar char="•"/>
-              <a:defRPr sz="2400" kern="1200">
-                <a:solidFill>
-                  <a:schemeClr val="tx1"/>
-                </a:solidFill>
-                <a:latin typeface="+mn-lt"/>
-                <a:ea typeface="+mn-ea"/>
-                <a:cs typeface="+mn-cs"/>
-              </a:defRPr>
-            </a:lvl2pPr>
-            <a:lvl3pPr marL="1143000" indent="-228600" algn="l" defTabSz="914400" rtl="0" eaLnBrk="1" latinLnBrk="0" hangingPunct="1">
-              <a:lnSpc>
-                <a:spcPct val="90000"/>
-              </a:lnSpc>
-              <a:spcBef>
-                <a:spcPts val="500"/>
-              </a:spcBef>
-              <a:buFont typeface="Arial" panose="020B0604020202020204" pitchFamily="34" charset="0"/>
-              <a:buChar char="•"/>
-              <a:defRPr sz="2000" kern="1200">
-                <a:solidFill>
-                  <a:schemeClr val="tx1"/>
-                </a:solidFill>
-                <a:latin typeface="+mn-lt"/>
-                <a:ea typeface="+mn-ea"/>
-                <a:cs typeface="+mn-cs"/>
-              </a:defRPr>
-            </a:lvl3pPr>
-            <a:lvl4pPr marL="1600200" indent="-228600" algn="l" defTabSz="914400" rtl="0" eaLnBrk="1" latinLnBrk="0" hangingPunct="1">
-              <a:lnSpc>
-                <a:spcPct val="90000"/>
-              </a:lnSpc>
-              <a:spcBef>
-                <a:spcPts val="500"/>
-              </a:spcBef>
-              <a:buFont typeface="Arial" panose="020B0604020202020204" pitchFamily="34" charset="0"/>
-              <a:buChar char="•"/>
-              <a:defRPr sz="1800" kern="1200">
-                <a:solidFill>
-                  <a:schemeClr val="tx1"/>
-                </a:solidFill>
-                <a:latin typeface="+mn-lt"/>
-                <a:ea typeface="+mn-ea"/>
-                <a:cs typeface="+mn-cs"/>
-              </a:defRPr>
-            </a:lvl4pPr>
-            <a:lvl5pPr marL="2057400" indent="-228600" algn="l" defTabSz="914400" rtl="0" eaLnBrk="1" latinLnBrk="0" hangingPunct="1">
-              <a:lnSpc>
-                <a:spcPct val="90000"/>
-              </a:lnSpc>
-              <a:spcBef>
-                <a:spcPts val="500"/>
-              </a:spcBef>
-              <a:buFont typeface="Arial" panose="020B0604020202020204" pitchFamily="34" charset="0"/>
-              <a:buChar char="•"/>
-              <a:defRPr sz="1800" kern="1200">
-                <a:solidFill>
-                  <a:schemeClr val="tx1"/>
-                </a:solidFill>
-                <a:latin typeface="+mn-lt"/>
-                <a:ea typeface="+mn-ea"/>
-                <a:cs typeface="+mn-cs"/>
-              </a:defRPr>
-            </a:lvl5pPr>
-            <a:lvl6pPr marL="2514600" indent="-228600" algn="l" defTabSz="914400" rtl="0" eaLnBrk="1" latinLnBrk="0" hangingPunct="1">
-              <a:lnSpc>
-                <a:spcPct val="90000"/>
-              </a:lnSpc>
-              <a:spcBef>
-                <a:spcPts val="500"/>
-              </a:spcBef>
-              <a:buFont typeface="Arial" panose="020B0604020202020204" pitchFamily="34" charset="0"/>
-              <a:buChar char="•"/>
-              <a:defRPr sz="1800" kern="1200">
-                <a:solidFill>
-                  <a:schemeClr val="tx1"/>
-                </a:solidFill>
-                <a:latin typeface="+mn-lt"/>
-                <a:ea typeface="+mn-ea"/>
-                <a:cs typeface="+mn-cs"/>
-              </a:defRPr>
-            </a:lvl6pPr>
-            <a:lvl7pPr marL="2971800" indent="-228600" algn="l" defTabSz="914400" rtl="0" eaLnBrk="1" latinLnBrk="0" hangingPunct="1">
-              <a:lnSpc>
-                <a:spcPct val="90000"/>
-              </a:lnSpc>
-              <a:spcBef>
-                <a:spcPts val="500"/>
-              </a:spcBef>
-              <a:buFont typeface="Arial" panose="020B0604020202020204" pitchFamily="34" charset="0"/>
-              <a:buChar char="•"/>
-              <a:defRPr sz="1800" kern="1200">
-                <a:solidFill>
-                  <a:schemeClr val="tx1"/>
-                </a:solidFill>
-                <a:latin typeface="+mn-lt"/>
-                <a:ea typeface="+mn-ea"/>
-                <a:cs typeface="+mn-cs"/>
-              </a:defRPr>
-            </a:lvl7pPr>
-            <a:lvl8pPr marL="3429000" indent="-228600" algn="l" defTabSz="914400" rtl="0" eaLnBrk="1" latinLnBrk="0" hangingPunct="1">
-              <a:lnSpc>
-                <a:spcPct val="90000"/>
-              </a:lnSpc>
-              <a:spcBef>
-                <a:spcPts val="500"/>
-              </a:spcBef>
-              <a:buFont typeface="Arial" panose="020B0604020202020204" pitchFamily="34" charset="0"/>
-              <a:buChar char="•"/>
-              <a:defRPr sz="1800" kern="1200">
-                <a:solidFill>
-                  <a:schemeClr val="tx1"/>
-                </a:solidFill>
-                <a:latin typeface="+mn-lt"/>
-                <a:ea typeface="+mn-ea"/>
-                <a:cs typeface="+mn-cs"/>
-              </a:defRPr>
-            </a:lvl8pPr>
-            <a:lvl9pPr marL="3886200" indent="-228600" algn="l" defTabSz="914400" rtl="0" eaLnBrk="1" latinLnBrk="0" hangingPunct="1">
-              <a:lnSpc>
-                <a:spcPct val="90000"/>
-              </a:lnSpc>
-              <a:spcBef>
-                <a:spcPts val="500"/>
-              </a:spcBef>
-              <a:buFont typeface="Arial" panose="020B0604020202020204" pitchFamily="34" charset="0"/>
-              <a:buChar char="•"/>
-              <a:defRPr sz="1800" kern="1200">
-                <a:solidFill>
-                  <a:schemeClr val="tx1"/>
-                </a:solidFill>
-                <a:latin typeface="+mn-lt"/>
-                <a:ea typeface="+mn-ea"/>
-                <a:cs typeface="+mn-cs"/>
-              </a:defRPr>
-            </a:lvl9pPr>
-          </a:lstStyle>
-          <a:p>
-            <a:r>
-              <a:rPr lang="en-US" dirty="0"/>
-              <a:t>Player</a:t>
-            </a:r>
-          </a:p>
-        </p:txBody>
-      </p:sp>
-    </p:spTree>
-    <p:extLst>
-      <p:ext uri="{BB962C8B-B14F-4D97-AF65-F5344CB8AC3E}">
-        <p14:creationId xmlns:p14="http://schemas.microsoft.com/office/powerpoint/2010/main" val="1682596430"/>
-      </p:ext>
-    </p:extLst>
-  </p:cSld>
-  <p:clrMapOvr>
-    <a:masterClrMapping/>
-  </p:clrMapOvr>
-</p:sld>
-</file>
-
-<file path=ppt/slides/slide21.xml><?xml version="1.0" encoding="utf-8"?>
-<p:sld xmlns:a="http://schemas.openxmlformats.org/drawingml/2006/main" xmlns:r="http://schemas.openxmlformats.org/officeDocument/2006/relationships" xmlns:p="http://schemas.openxmlformats.org/presentationml/2006/main">
-  <p:cSld>
-    <p:spTree>
-      <p:nvGrpSpPr>
-        <p:cNvPr id="1" name=""/>
-        <p:cNvGrpSpPr/>
-        <p:nvPr/>
-      </p:nvGrpSpPr>
-      <p:grpSpPr>
-        <a:xfrm>
-          <a:off x="0" y="0"/>
-          <a:ext cx="0" cy="0"/>
-          <a:chOff x="0" y="0"/>
-          <a:chExt cx="0" cy="0"/>
-        </a:xfrm>
-      </p:grpSpPr>
-      <p:sp>
-        <p:nvSpPr>
-          <p:cNvPr id="2" name="Title 1">
-            <a:extLst>
-              <a:ext uri="{FF2B5EF4-FFF2-40B4-BE49-F238E27FC236}">
-                <a16:creationId xmlns:a16="http://schemas.microsoft.com/office/drawing/2014/main" id="{2EBAA245-5362-5D4F-90E0-C47F441ED271}"/>
-              </a:ext>
-            </a:extLst>
-          </p:cNvPr>
-          <p:cNvSpPr>
-            <a:spLocks noGrp="1"/>
-          </p:cNvSpPr>
-          <p:nvPr>
-            <p:ph type="title"/>
-          </p:nvPr>
-        </p:nvSpPr>
-        <p:spPr>
-          <a:xfrm>
-            <a:off x="441593" y="365125"/>
-            <a:ext cx="5257800" cy="1325563"/>
-          </a:xfrm>
-        </p:spPr>
-        <p:txBody>
-          <a:bodyPr/>
-          <a:lstStyle/>
-          <a:p>
-            <a:r>
-              <a:rPr lang="en-US" dirty="0"/>
-              <a:t>User</a:t>
-            </a:r>
-          </a:p>
-        </p:txBody>
-      </p:sp>
-      <p:sp>
-        <p:nvSpPr>
-          <p:cNvPr id="3" name="Content Placeholder 2">
-            <a:extLst>
-              <a:ext uri="{FF2B5EF4-FFF2-40B4-BE49-F238E27FC236}">
-                <a16:creationId xmlns:a16="http://schemas.microsoft.com/office/drawing/2014/main" id="{F876DD7D-2457-D840-8CB0-3144388C4EC5}"/>
-              </a:ext>
-            </a:extLst>
-          </p:cNvPr>
-          <p:cNvSpPr>
-            <a:spLocks noGrp="1"/>
-          </p:cNvSpPr>
-          <p:nvPr>
-            <p:ph idx="1"/>
-          </p:nvPr>
-        </p:nvSpPr>
-        <p:spPr>
-          <a:xfrm>
-            <a:off x="441593" y="1891727"/>
-            <a:ext cx="5257800" cy="4351338"/>
-          </a:xfrm>
-        </p:spPr>
-        <p:txBody>
-          <a:bodyPr/>
-          <a:lstStyle/>
-          <a:p>
-            <a:r>
-              <a:rPr lang="en-US" dirty="0"/>
-              <a:t>Store a user’s name, password, and number of won and lost bets</a:t>
-            </a:r>
-          </a:p>
-        </p:txBody>
-      </p:sp>
-      <p:sp>
-        <p:nvSpPr>
-          <p:cNvPr id="5" name="Title 1">
-            <a:extLst>
-              <a:ext uri="{FF2B5EF4-FFF2-40B4-BE49-F238E27FC236}">
-                <a16:creationId xmlns:a16="http://schemas.microsoft.com/office/drawing/2014/main" id="{32F3D66D-F148-614A-AFF2-6011F7282B4F}"/>
-              </a:ext>
-            </a:extLst>
-          </p:cNvPr>
-          <p:cNvSpPr txBox="1">
-            <a:spLocks/>
-          </p:cNvSpPr>
-          <p:nvPr/>
-        </p:nvSpPr>
-        <p:spPr>
-          <a:xfrm>
-            <a:off x="6492607" y="365125"/>
-            <a:ext cx="5257800" cy="1325563"/>
-          </a:xfrm>
-          <a:prstGeom prst="rect">
-            <a:avLst/>
-          </a:prstGeom>
-        </p:spPr>
-        <p:txBody>
-          <a:bodyPr vert="horz" lIns="91440" tIns="45720" rIns="91440" bIns="45720" rtlCol="0" anchor="ctr">
-            <a:normAutofit lnSpcReduction="10000"/>
-          </a:bodyPr>
-          <a:lstStyle>
-            <a:lvl1pPr algn="l" defTabSz="914400" rtl="0" eaLnBrk="1" latinLnBrk="0" hangingPunct="1">
-              <a:lnSpc>
-                <a:spcPct val="90000"/>
-              </a:lnSpc>
-              <a:spcBef>
-                <a:spcPct val="0"/>
-              </a:spcBef>
-              <a:buNone/>
-              <a:defRPr sz="4400" kern="1200">
-                <a:solidFill>
-                  <a:schemeClr val="tx1"/>
-                </a:solidFill>
-                <a:latin typeface="+mj-lt"/>
-                <a:ea typeface="+mj-ea"/>
-                <a:cs typeface="+mj-cs"/>
-              </a:defRPr>
-            </a:lvl1pPr>
-          </a:lstStyle>
-          <a:p>
-            <a:r>
-              <a:rPr lang="en-US" sz="3000" dirty="0"/>
-              <a:t>Parent: None</a:t>
-            </a:r>
-          </a:p>
-          <a:p>
-            <a:r>
-              <a:rPr lang="en-US" sz="3000" dirty="0"/>
-              <a:t>Subclasses: None</a:t>
-            </a:r>
-          </a:p>
-          <a:p>
-            <a:r>
-              <a:rPr lang="en-US" sz="3000" dirty="0"/>
-              <a:t>Layer: Entity</a:t>
-            </a:r>
-          </a:p>
-        </p:txBody>
-      </p:sp>
-      <p:sp>
-        <p:nvSpPr>
-          <p:cNvPr id="7" name="Content Placeholder 2">
-            <a:extLst>
-              <a:ext uri="{FF2B5EF4-FFF2-40B4-BE49-F238E27FC236}">
-                <a16:creationId xmlns:a16="http://schemas.microsoft.com/office/drawing/2014/main" id="{BBA97EAA-FAAE-6342-A893-4A0CAE51C8C2}"/>
-              </a:ext>
-            </a:extLst>
-          </p:cNvPr>
-          <p:cNvSpPr txBox="1">
-            <a:spLocks/>
-          </p:cNvSpPr>
-          <p:nvPr/>
-        </p:nvSpPr>
-        <p:spPr>
-          <a:xfrm>
-            <a:off x="6492607" y="1891727"/>
-            <a:ext cx="5257800" cy="4351338"/>
-          </a:xfrm>
-          <a:prstGeom prst="rect">
-            <a:avLst/>
-          </a:prstGeom>
-        </p:spPr>
-        <p:txBody>
-          <a:bodyPr vert="horz" lIns="91440" tIns="45720" rIns="91440" bIns="45720" rtlCol="0">
-            <a:normAutofit/>
-          </a:bodyPr>
-          <a:lstStyle>
-            <a:lvl1pPr marL="228600" indent="-228600" algn="l" defTabSz="914400" rtl="0" eaLnBrk="1" latinLnBrk="0" hangingPunct="1">
-              <a:lnSpc>
-                <a:spcPct val="90000"/>
-              </a:lnSpc>
-              <a:spcBef>
-                <a:spcPts val="1000"/>
-              </a:spcBef>
-              <a:buFont typeface="Arial" panose="020B0604020202020204" pitchFamily="34" charset="0"/>
-              <a:buChar char="•"/>
-              <a:defRPr sz="2800" kern="1200">
-                <a:solidFill>
-                  <a:schemeClr val="tx1"/>
-                </a:solidFill>
-                <a:latin typeface="+mn-lt"/>
-                <a:ea typeface="+mn-ea"/>
-                <a:cs typeface="+mn-cs"/>
-              </a:defRPr>
-            </a:lvl1pPr>
-            <a:lvl2pPr marL="685800" indent="-228600" algn="l" defTabSz="914400" rtl="0" eaLnBrk="1" latinLnBrk="0" hangingPunct="1">
-              <a:lnSpc>
-                <a:spcPct val="90000"/>
-              </a:lnSpc>
-              <a:spcBef>
-                <a:spcPts val="500"/>
-              </a:spcBef>
-              <a:buFont typeface="Arial" panose="020B0604020202020204" pitchFamily="34" charset="0"/>
-              <a:buChar char="•"/>
-              <a:defRPr sz="2400" kern="1200">
-                <a:solidFill>
-                  <a:schemeClr val="tx1"/>
-                </a:solidFill>
-                <a:latin typeface="+mn-lt"/>
-                <a:ea typeface="+mn-ea"/>
-                <a:cs typeface="+mn-cs"/>
-              </a:defRPr>
-            </a:lvl2pPr>
-            <a:lvl3pPr marL="1143000" indent="-228600" algn="l" defTabSz="914400" rtl="0" eaLnBrk="1" latinLnBrk="0" hangingPunct="1">
-              <a:lnSpc>
-                <a:spcPct val="90000"/>
-              </a:lnSpc>
-              <a:spcBef>
-                <a:spcPts val="500"/>
-              </a:spcBef>
-              <a:buFont typeface="Arial" panose="020B0604020202020204" pitchFamily="34" charset="0"/>
-              <a:buChar char="•"/>
-              <a:defRPr sz="2000" kern="1200">
-                <a:solidFill>
-                  <a:schemeClr val="tx1"/>
-                </a:solidFill>
-                <a:latin typeface="+mn-lt"/>
-                <a:ea typeface="+mn-ea"/>
-                <a:cs typeface="+mn-cs"/>
-              </a:defRPr>
-            </a:lvl3pPr>
-            <a:lvl4pPr marL="1600200" indent="-228600" algn="l" defTabSz="914400" rtl="0" eaLnBrk="1" latinLnBrk="0" hangingPunct="1">
-              <a:lnSpc>
-                <a:spcPct val="90000"/>
-              </a:lnSpc>
-              <a:spcBef>
-                <a:spcPts val="500"/>
-              </a:spcBef>
-              <a:buFont typeface="Arial" panose="020B0604020202020204" pitchFamily="34" charset="0"/>
-              <a:buChar char="•"/>
-              <a:defRPr sz="1800" kern="1200">
-                <a:solidFill>
-                  <a:schemeClr val="tx1"/>
-                </a:solidFill>
-                <a:latin typeface="+mn-lt"/>
-                <a:ea typeface="+mn-ea"/>
-                <a:cs typeface="+mn-cs"/>
-              </a:defRPr>
-            </a:lvl4pPr>
-            <a:lvl5pPr marL="2057400" indent="-228600" algn="l" defTabSz="914400" rtl="0" eaLnBrk="1" latinLnBrk="0" hangingPunct="1">
-              <a:lnSpc>
-                <a:spcPct val="90000"/>
-              </a:lnSpc>
-              <a:spcBef>
-                <a:spcPts val="500"/>
-              </a:spcBef>
-              <a:buFont typeface="Arial" panose="020B0604020202020204" pitchFamily="34" charset="0"/>
-              <a:buChar char="•"/>
-              <a:defRPr sz="1800" kern="1200">
-                <a:solidFill>
-                  <a:schemeClr val="tx1"/>
-                </a:solidFill>
-                <a:latin typeface="+mn-lt"/>
-                <a:ea typeface="+mn-ea"/>
-                <a:cs typeface="+mn-cs"/>
-              </a:defRPr>
-            </a:lvl5pPr>
-            <a:lvl6pPr marL="2514600" indent="-228600" algn="l" defTabSz="914400" rtl="0" eaLnBrk="1" latinLnBrk="0" hangingPunct="1">
-              <a:lnSpc>
-                <a:spcPct val="90000"/>
-              </a:lnSpc>
-              <a:spcBef>
-                <a:spcPts val="500"/>
-              </a:spcBef>
-              <a:buFont typeface="Arial" panose="020B0604020202020204" pitchFamily="34" charset="0"/>
-              <a:buChar char="•"/>
-              <a:defRPr sz="1800" kern="1200">
-                <a:solidFill>
-                  <a:schemeClr val="tx1"/>
-                </a:solidFill>
-                <a:latin typeface="+mn-lt"/>
-                <a:ea typeface="+mn-ea"/>
-                <a:cs typeface="+mn-cs"/>
-              </a:defRPr>
-            </a:lvl6pPr>
-            <a:lvl7pPr marL="2971800" indent="-228600" algn="l" defTabSz="914400" rtl="0" eaLnBrk="1" latinLnBrk="0" hangingPunct="1">
-              <a:lnSpc>
-                <a:spcPct val="90000"/>
-              </a:lnSpc>
-              <a:spcBef>
-                <a:spcPts val="500"/>
-              </a:spcBef>
-              <a:buFont typeface="Arial" panose="020B0604020202020204" pitchFamily="34" charset="0"/>
-              <a:buChar char="•"/>
-              <a:defRPr sz="1800" kern="1200">
-                <a:solidFill>
-                  <a:schemeClr val="tx1"/>
-                </a:solidFill>
-                <a:latin typeface="+mn-lt"/>
-                <a:ea typeface="+mn-ea"/>
-                <a:cs typeface="+mn-cs"/>
-              </a:defRPr>
-            </a:lvl7pPr>
-            <a:lvl8pPr marL="3429000" indent="-228600" algn="l" defTabSz="914400" rtl="0" eaLnBrk="1" latinLnBrk="0" hangingPunct="1">
-              <a:lnSpc>
-                <a:spcPct val="90000"/>
-              </a:lnSpc>
-              <a:spcBef>
-                <a:spcPts val="500"/>
-              </a:spcBef>
-              <a:buFont typeface="Arial" panose="020B0604020202020204" pitchFamily="34" charset="0"/>
-              <a:buChar char="•"/>
-              <a:defRPr sz="1800" kern="1200">
-                <a:solidFill>
-                  <a:schemeClr val="tx1"/>
-                </a:solidFill>
-                <a:latin typeface="+mn-lt"/>
-                <a:ea typeface="+mn-ea"/>
-                <a:cs typeface="+mn-cs"/>
-              </a:defRPr>
-            </a:lvl8pPr>
-            <a:lvl9pPr marL="3886200" indent="-228600" algn="l" defTabSz="914400" rtl="0" eaLnBrk="1" latinLnBrk="0" hangingPunct="1">
-              <a:lnSpc>
-                <a:spcPct val="90000"/>
-              </a:lnSpc>
-              <a:spcBef>
-                <a:spcPts val="500"/>
-              </a:spcBef>
-              <a:buFont typeface="Arial" panose="020B0604020202020204" pitchFamily="34" charset="0"/>
-              <a:buChar char="•"/>
-              <a:defRPr sz="1800" kern="1200">
-                <a:solidFill>
-                  <a:schemeClr val="tx1"/>
-                </a:solidFill>
-                <a:latin typeface="+mn-lt"/>
-                <a:ea typeface="+mn-ea"/>
-                <a:cs typeface="+mn-cs"/>
-              </a:defRPr>
-            </a:lvl9pPr>
-          </a:lstStyle>
-          <a:p>
-            <a:r>
-              <a:rPr lang="en-US" dirty="0"/>
-              <a:t>None</a:t>
-            </a:r>
-          </a:p>
-        </p:txBody>
-      </p:sp>
-    </p:spTree>
-    <p:extLst>
-      <p:ext uri="{BB962C8B-B14F-4D97-AF65-F5344CB8AC3E}">
-        <p14:creationId xmlns:p14="http://schemas.microsoft.com/office/powerpoint/2010/main" val="2553747706"/>
-      </p:ext>
-    </p:extLst>
-  </p:cSld>
-  <p:clrMapOvr>
-    <a:masterClrMapping/>
-  </p:clrMapOvr>
-</p:sld>
-</file>
-
-<file path=ppt/slides/slide22.xml><?xml version="1.0" encoding="utf-8"?>
-<p:sld xmlns:a="http://schemas.openxmlformats.org/drawingml/2006/main" xmlns:r="http://schemas.openxmlformats.org/officeDocument/2006/relationships" xmlns:p="http://schemas.openxmlformats.org/presentationml/2006/main">
-  <p:cSld>
-    <p:spTree>
-      <p:nvGrpSpPr>
-        <p:cNvPr id="1" name=""/>
-        <p:cNvGrpSpPr/>
-        <p:nvPr/>
-      </p:nvGrpSpPr>
-      <p:grpSpPr>
-        <a:xfrm>
-          <a:off x="0" y="0"/>
-          <a:ext cx="0" cy="0"/>
-          <a:chOff x="0" y="0"/>
-          <a:chExt cx="0" cy="0"/>
-        </a:xfrm>
-      </p:grpSpPr>
-      <p:sp>
-        <p:nvSpPr>
-          <p:cNvPr id="2" name="Title 1">
-            <a:extLst>
-              <a:ext uri="{FF2B5EF4-FFF2-40B4-BE49-F238E27FC236}">
-                <a16:creationId xmlns:a16="http://schemas.microsoft.com/office/drawing/2014/main" id="{2EBAA245-5362-5D4F-90E0-C47F441ED271}"/>
-              </a:ext>
-            </a:extLst>
-          </p:cNvPr>
-          <p:cNvSpPr>
-            <a:spLocks noGrp="1"/>
-          </p:cNvSpPr>
-          <p:nvPr>
-            <p:ph type="title"/>
-          </p:nvPr>
-        </p:nvSpPr>
-        <p:spPr>
-          <a:xfrm>
-            <a:off x="441593" y="365125"/>
-            <a:ext cx="5257800" cy="1325563"/>
-          </a:xfrm>
-        </p:spPr>
-        <p:txBody>
-          <a:bodyPr/>
-          <a:lstStyle/>
-          <a:p>
-            <a:r>
-              <a:rPr lang="en-US" dirty="0" err="1"/>
-              <a:t>UserManager</a:t>
-            </a:r>
-            <a:endParaRPr lang="en-US" dirty="0"/>
-          </a:p>
-        </p:txBody>
-      </p:sp>
-      <p:sp>
-        <p:nvSpPr>
-          <p:cNvPr id="3" name="Content Placeholder 2">
-            <a:extLst>
-              <a:ext uri="{FF2B5EF4-FFF2-40B4-BE49-F238E27FC236}">
-                <a16:creationId xmlns:a16="http://schemas.microsoft.com/office/drawing/2014/main" id="{F876DD7D-2457-D840-8CB0-3144388C4EC5}"/>
-              </a:ext>
-            </a:extLst>
-          </p:cNvPr>
-          <p:cNvSpPr>
-            <a:spLocks noGrp="1"/>
-          </p:cNvSpPr>
-          <p:nvPr>
-            <p:ph idx="1"/>
-          </p:nvPr>
-        </p:nvSpPr>
-        <p:spPr>
-          <a:xfrm>
-            <a:off x="441593" y="1891727"/>
-            <a:ext cx="5257800" cy="4351338"/>
-          </a:xfrm>
-        </p:spPr>
-        <p:txBody>
-          <a:bodyPr/>
-          <a:lstStyle/>
-          <a:p>
-            <a:r>
-              <a:rPr lang="en-US" dirty="0"/>
-              <a:t>Store all users who have used the service</a:t>
-            </a:r>
-          </a:p>
-          <a:p>
-            <a:r>
-              <a:rPr lang="en-US" dirty="0"/>
-              <a:t>Create new users when they register</a:t>
-            </a:r>
-          </a:p>
-        </p:txBody>
-      </p:sp>
-      <p:sp>
-        <p:nvSpPr>
-          <p:cNvPr id="5" name="Title 1">
-            <a:extLst>
-              <a:ext uri="{FF2B5EF4-FFF2-40B4-BE49-F238E27FC236}">
-                <a16:creationId xmlns:a16="http://schemas.microsoft.com/office/drawing/2014/main" id="{32F3D66D-F148-614A-AFF2-6011F7282B4F}"/>
-              </a:ext>
-            </a:extLst>
-          </p:cNvPr>
-          <p:cNvSpPr txBox="1">
-            <a:spLocks/>
-          </p:cNvSpPr>
-          <p:nvPr/>
-        </p:nvSpPr>
-        <p:spPr>
-          <a:xfrm>
-            <a:off x="6492607" y="365125"/>
-            <a:ext cx="5257800" cy="1325563"/>
-          </a:xfrm>
-          <a:prstGeom prst="rect">
-            <a:avLst/>
-          </a:prstGeom>
-        </p:spPr>
-        <p:txBody>
-          <a:bodyPr vert="horz" lIns="91440" tIns="45720" rIns="91440" bIns="45720" rtlCol="0" anchor="ctr">
-            <a:normAutofit lnSpcReduction="10000"/>
-          </a:bodyPr>
-          <a:lstStyle>
-            <a:lvl1pPr algn="l" defTabSz="914400" rtl="0" eaLnBrk="1" latinLnBrk="0" hangingPunct="1">
-              <a:lnSpc>
-                <a:spcPct val="90000"/>
-              </a:lnSpc>
-              <a:spcBef>
-                <a:spcPct val="0"/>
-              </a:spcBef>
-              <a:buNone/>
-              <a:defRPr sz="4400" kern="1200">
-                <a:solidFill>
-                  <a:schemeClr val="tx1"/>
-                </a:solidFill>
-                <a:latin typeface="+mj-lt"/>
-                <a:ea typeface="+mj-ea"/>
-                <a:cs typeface="+mj-cs"/>
-              </a:defRPr>
-            </a:lvl1pPr>
-          </a:lstStyle>
-          <a:p>
-            <a:r>
-              <a:rPr lang="en-US" sz="3000" dirty="0"/>
-              <a:t>Parent: None</a:t>
-            </a:r>
-          </a:p>
-          <a:p>
-            <a:r>
-              <a:rPr lang="en-US" sz="3000" dirty="0"/>
-              <a:t>Subclasses: None</a:t>
-            </a:r>
-          </a:p>
-          <a:p>
-            <a:r>
-              <a:rPr lang="en-US" sz="3000" dirty="0"/>
-              <a:t>Layer: Entity</a:t>
-            </a:r>
-          </a:p>
-        </p:txBody>
-      </p:sp>
-      <p:sp>
-        <p:nvSpPr>
-          <p:cNvPr id="7" name="Content Placeholder 2">
-            <a:extLst>
-              <a:ext uri="{FF2B5EF4-FFF2-40B4-BE49-F238E27FC236}">
-                <a16:creationId xmlns:a16="http://schemas.microsoft.com/office/drawing/2014/main" id="{BBA97EAA-FAAE-6342-A893-4A0CAE51C8C2}"/>
-              </a:ext>
-            </a:extLst>
-          </p:cNvPr>
-          <p:cNvSpPr txBox="1">
-            <a:spLocks/>
-          </p:cNvSpPr>
-          <p:nvPr/>
-        </p:nvSpPr>
-        <p:spPr>
-          <a:xfrm>
-            <a:off x="6492607" y="1891727"/>
-            <a:ext cx="5257800" cy="4351338"/>
-          </a:xfrm>
-          <a:prstGeom prst="rect">
-            <a:avLst/>
-          </a:prstGeom>
-        </p:spPr>
-        <p:txBody>
-          <a:bodyPr vert="horz" lIns="91440" tIns="45720" rIns="91440" bIns="45720" rtlCol="0">
-            <a:normAutofit/>
-          </a:bodyPr>
-          <a:lstStyle>
-            <a:lvl1pPr marL="228600" indent="-228600" algn="l" defTabSz="914400" rtl="0" eaLnBrk="1" latinLnBrk="0" hangingPunct="1">
-              <a:lnSpc>
-                <a:spcPct val="90000"/>
-              </a:lnSpc>
-              <a:spcBef>
-                <a:spcPts val="1000"/>
-              </a:spcBef>
-              <a:buFont typeface="Arial" panose="020B0604020202020204" pitchFamily="34" charset="0"/>
-              <a:buChar char="•"/>
-              <a:defRPr sz="2800" kern="1200">
-                <a:solidFill>
-                  <a:schemeClr val="tx1"/>
-                </a:solidFill>
-                <a:latin typeface="+mn-lt"/>
-                <a:ea typeface="+mn-ea"/>
-                <a:cs typeface="+mn-cs"/>
-              </a:defRPr>
-            </a:lvl1pPr>
-            <a:lvl2pPr marL="685800" indent="-228600" algn="l" defTabSz="914400" rtl="0" eaLnBrk="1" latinLnBrk="0" hangingPunct="1">
-              <a:lnSpc>
-                <a:spcPct val="90000"/>
-              </a:lnSpc>
-              <a:spcBef>
-                <a:spcPts val="500"/>
-              </a:spcBef>
-              <a:buFont typeface="Arial" panose="020B0604020202020204" pitchFamily="34" charset="0"/>
-              <a:buChar char="•"/>
-              <a:defRPr sz="2400" kern="1200">
-                <a:solidFill>
-                  <a:schemeClr val="tx1"/>
-                </a:solidFill>
-                <a:latin typeface="+mn-lt"/>
-                <a:ea typeface="+mn-ea"/>
-                <a:cs typeface="+mn-cs"/>
-              </a:defRPr>
-            </a:lvl2pPr>
-            <a:lvl3pPr marL="1143000" indent="-228600" algn="l" defTabSz="914400" rtl="0" eaLnBrk="1" latinLnBrk="0" hangingPunct="1">
-              <a:lnSpc>
-                <a:spcPct val="90000"/>
-              </a:lnSpc>
-              <a:spcBef>
-                <a:spcPts val="500"/>
-              </a:spcBef>
-              <a:buFont typeface="Arial" panose="020B0604020202020204" pitchFamily="34" charset="0"/>
-              <a:buChar char="•"/>
-              <a:defRPr sz="2000" kern="1200">
-                <a:solidFill>
-                  <a:schemeClr val="tx1"/>
-                </a:solidFill>
-                <a:latin typeface="+mn-lt"/>
-                <a:ea typeface="+mn-ea"/>
-                <a:cs typeface="+mn-cs"/>
-              </a:defRPr>
-            </a:lvl3pPr>
-            <a:lvl4pPr marL="1600200" indent="-228600" algn="l" defTabSz="914400" rtl="0" eaLnBrk="1" latinLnBrk="0" hangingPunct="1">
-              <a:lnSpc>
-                <a:spcPct val="90000"/>
-              </a:lnSpc>
-              <a:spcBef>
-                <a:spcPts val="500"/>
-              </a:spcBef>
-              <a:buFont typeface="Arial" panose="020B0604020202020204" pitchFamily="34" charset="0"/>
-              <a:buChar char="•"/>
-              <a:defRPr sz="1800" kern="1200">
-                <a:solidFill>
-                  <a:schemeClr val="tx1"/>
-                </a:solidFill>
-                <a:latin typeface="+mn-lt"/>
-                <a:ea typeface="+mn-ea"/>
-                <a:cs typeface="+mn-cs"/>
-              </a:defRPr>
-            </a:lvl4pPr>
-            <a:lvl5pPr marL="2057400" indent="-228600" algn="l" defTabSz="914400" rtl="0" eaLnBrk="1" latinLnBrk="0" hangingPunct="1">
-              <a:lnSpc>
-                <a:spcPct val="90000"/>
-              </a:lnSpc>
-              <a:spcBef>
-                <a:spcPts val="500"/>
-              </a:spcBef>
-              <a:buFont typeface="Arial" panose="020B0604020202020204" pitchFamily="34" charset="0"/>
-              <a:buChar char="•"/>
-              <a:defRPr sz="1800" kern="1200">
-                <a:solidFill>
-                  <a:schemeClr val="tx1"/>
-                </a:solidFill>
-                <a:latin typeface="+mn-lt"/>
-                <a:ea typeface="+mn-ea"/>
-                <a:cs typeface="+mn-cs"/>
-              </a:defRPr>
-            </a:lvl5pPr>
-            <a:lvl6pPr marL="2514600" indent="-228600" algn="l" defTabSz="914400" rtl="0" eaLnBrk="1" latinLnBrk="0" hangingPunct="1">
-              <a:lnSpc>
-                <a:spcPct val="90000"/>
-              </a:lnSpc>
-              <a:spcBef>
-                <a:spcPts val="500"/>
-              </a:spcBef>
-              <a:buFont typeface="Arial" panose="020B0604020202020204" pitchFamily="34" charset="0"/>
-              <a:buChar char="•"/>
-              <a:defRPr sz="1800" kern="1200">
-                <a:solidFill>
-                  <a:schemeClr val="tx1"/>
-                </a:solidFill>
-                <a:latin typeface="+mn-lt"/>
-                <a:ea typeface="+mn-ea"/>
-                <a:cs typeface="+mn-cs"/>
-              </a:defRPr>
-            </a:lvl6pPr>
-            <a:lvl7pPr marL="2971800" indent="-228600" algn="l" defTabSz="914400" rtl="0" eaLnBrk="1" latinLnBrk="0" hangingPunct="1">
-              <a:lnSpc>
-                <a:spcPct val="90000"/>
-              </a:lnSpc>
-              <a:spcBef>
-                <a:spcPts val="500"/>
-              </a:spcBef>
-              <a:buFont typeface="Arial" panose="020B0604020202020204" pitchFamily="34" charset="0"/>
-              <a:buChar char="•"/>
-              <a:defRPr sz="1800" kern="1200">
-                <a:solidFill>
-                  <a:schemeClr val="tx1"/>
-                </a:solidFill>
-                <a:latin typeface="+mn-lt"/>
-                <a:ea typeface="+mn-ea"/>
-                <a:cs typeface="+mn-cs"/>
-              </a:defRPr>
-            </a:lvl7pPr>
-            <a:lvl8pPr marL="3429000" indent="-228600" algn="l" defTabSz="914400" rtl="0" eaLnBrk="1" latinLnBrk="0" hangingPunct="1">
-              <a:lnSpc>
-                <a:spcPct val="90000"/>
-              </a:lnSpc>
-              <a:spcBef>
-                <a:spcPts val="500"/>
-              </a:spcBef>
-              <a:buFont typeface="Arial" panose="020B0604020202020204" pitchFamily="34" charset="0"/>
-              <a:buChar char="•"/>
-              <a:defRPr sz="1800" kern="1200">
-                <a:solidFill>
-                  <a:schemeClr val="tx1"/>
-                </a:solidFill>
-                <a:latin typeface="+mn-lt"/>
-                <a:ea typeface="+mn-ea"/>
-                <a:cs typeface="+mn-cs"/>
-              </a:defRPr>
-            </a:lvl8pPr>
-            <a:lvl9pPr marL="3886200" indent="-228600" algn="l" defTabSz="914400" rtl="0" eaLnBrk="1" latinLnBrk="0" hangingPunct="1">
-              <a:lnSpc>
-                <a:spcPct val="90000"/>
-              </a:lnSpc>
-              <a:spcBef>
-                <a:spcPts val="500"/>
-              </a:spcBef>
-              <a:buFont typeface="Arial" panose="020B0604020202020204" pitchFamily="34" charset="0"/>
-              <a:buChar char="•"/>
-              <a:defRPr sz="1800" kern="1200">
-                <a:solidFill>
-                  <a:schemeClr val="tx1"/>
-                </a:solidFill>
-                <a:latin typeface="+mn-lt"/>
-                <a:ea typeface="+mn-ea"/>
-                <a:cs typeface="+mn-cs"/>
-              </a:defRPr>
-            </a:lvl9pPr>
-          </a:lstStyle>
-          <a:p>
-            <a:r>
-              <a:rPr lang="en-US" dirty="0"/>
-              <a:t>User</a:t>
-            </a:r>
-          </a:p>
-        </p:txBody>
-      </p:sp>
-    </p:spTree>
-    <p:extLst>
-      <p:ext uri="{BB962C8B-B14F-4D97-AF65-F5344CB8AC3E}">
-        <p14:creationId xmlns:p14="http://schemas.microsoft.com/office/powerpoint/2010/main" val="1068520986"/>
-      </p:ext>
-    </p:extLst>
-  </p:cSld>
-  <p:clrMapOvr>
-    <a:masterClrMapping/>
-  </p:clrMapOvr>
-</p:sld>
-</file>
-
-<file path=ppt/slides/slide23.xml><?xml version="1.0" encoding="utf-8"?>
-<p:sld xmlns:a="http://schemas.openxmlformats.org/drawingml/2006/main" xmlns:r="http://schemas.openxmlformats.org/officeDocument/2006/relationships" xmlns:p="http://schemas.openxmlformats.org/presentationml/2006/main">
-  <p:cSld>
-    <p:spTree>
-      <p:nvGrpSpPr>
-        <p:cNvPr id="1" name=""/>
-        <p:cNvGrpSpPr/>
-        <p:nvPr/>
-      </p:nvGrpSpPr>
-      <p:grpSpPr>
-        <a:xfrm>
-          <a:off x="0" y="0"/>
-          <a:ext cx="0" cy="0"/>
-          <a:chOff x="0" y="0"/>
-          <a:chExt cx="0" cy="0"/>
-        </a:xfrm>
-      </p:grpSpPr>
-      <p:sp>
-        <p:nvSpPr>
-          <p:cNvPr id="2" name="Title 1">
-            <a:extLst>
-              <a:ext uri="{FF2B5EF4-FFF2-40B4-BE49-F238E27FC236}">
-                <a16:creationId xmlns:a16="http://schemas.microsoft.com/office/drawing/2014/main" id="{2EBAA245-5362-5D4F-90E0-C47F441ED271}"/>
-              </a:ext>
-            </a:extLst>
-          </p:cNvPr>
-          <p:cNvSpPr>
-            <a:spLocks noGrp="1"/>
-          </p:cNvSpPr>
-          <p:nvPr>
-            <p:ph type="title"/>
-          </p:nvPr>
-        </p:nvSpPr>
-        <p:spPr>
-          <a:xfrm>
-            <a:off x="441593" y="365125"/>
-            <a:ext cx="5257800" cy="1325563"/>
-          </a:xfrm>
-        </p:spPr>
-        <p:txBody>
-          <a:bodyPr/>
-          <a:lstStyle/>
-          <a:p>
-            <a:r>
-              <a:rPr lang="en-US" dirty="0"/>
-              <a:t>Class Name</a:t>
-            </a:r>
-          </a:p>
-        </p:txBody>
-      </p:sp>
-      <p:sp>
-        <p:nvSpPr>
-          <p:cNvPr id="3" name="Content Placeholder 2">
-            <a:extLst>
-              <a:ext uri="{FF2B5EF4-FFF2-40B4-BE49-F238E27FC236}">
-                <a16:creationId xmlns:a16="http://schemas.microsoft.com/office/drawing/2014/main" id="{F876DD7D-2457-D840-8CB0-3144388C4EC5}"/>
-              </a:ext>
-            </a:extLst>
-          </p:cNvPr>
-          <p:cNvSpPr>
-            <a:spLocks noGrp="1"/>
-          </p:cNvSpPr>
-          <p:nvPr>
-            <p:ph idx="1"/>
-          </p:nvPr>
-        </p:nvSpPr>
-        <p:spPr>
-          <a:xfrm>
-            <a:off x="441593" y="1891727"/>
-            <a:ext cx="5257800" cy="4351338"/>
-          </a:xfrm>
-        </p:spPr>
-        <p:txBody>
-          <a:bodyPr/>
-          <a:lstStyle/>
-          <a:p>
-            <a:r>
-              <a:rPr lang="en-US" dirty="0"/>
-              <a:t>Responsibilities</a:t>
-            </a:r>
-          </a:p>
-        </p:txBody>
-      </p:sp>
-      <p:sp>
-        <p:nvSpPr>
-          <p:cNvPr id="5" name="Title 1">
-            <a:extLst>
-              <a:ext uri="{FF2B5EF4-FFF2-40B4-BE49-F238E27FC236}">
-                <a16:creationId xmlns:a16="http://schemas.microsoft.com/office/drawing/2014/main" id="{32F3D66D-F148-614A-AFF2-6011F7282B4F}"/>
-              </a:ext>
-            </a:extLst>
-          </p:cNvPr>
-          <p:cNvSpPr txBox="1">
-            <a:spLocks/>
-          </p:cNvSpPr>
-          <p:nvPr/>
-        </p:nvSpPr>
-        <p:spPr>
-          <a:xfrm>
-            <a:off x="6492607" y="365125"/>
-            <a:ext cx="5257800" cy="1325563"/>
-          </a:xfrm>
-          <a:prstGeom prst="rect">
-            <a:avLst/>
-          </a:prstGeom>
-        </p:spPr>
-        <p:txBody>
-          <a:bodyPr vert="horz" lIns="91440" tIns="45720" rIns="91440" bIns="45720" rtlCol="0" anchor="ctr">
-            <a:normAutofit lnSpcReduction="10000"/>
-          </a:bodyPr>
-          <a:lstStyle>
-            <a:lvl1pPr algn="l" defTabSz="914400" rtl="0" eaLnBrk="1" latinLnBrk="0" hangingPunct="1">
-              <a:lnSpc>
-                <a:spcPct val="90000"/>
-              </a:lnSpc>
-              <a:spcBef>
-                <a:spcPct val="0"/>
-              </a:spcBef>
-              <a:buNone/>
-              <a:defRPr sz="4400" kern="1200">
-                <a:solidFill>
-                  <a:schemeClr val="tx1"/>
-                </a:solidFill>
-                <a:latin typeface="+mj-lt"/>
-                <a:ea typeface="+mj-ea"/>
-                <a:cs typeface="+mj-cs"/>
-              </a:defRPr>
-            </a:lvl1pPr>
-          </a:lstStyle>
-          <a:p>
-            <a:r>
-              <a:rPr lang="en-US" sz="3000" dirty="0"/>
-              <a:t>Parent:</a:t>
-            </a:r>
-          </a:p>
-          <a:p>
-            <a:r>
-              <a:rPr lang="en-US" sz="3000" dirty="0"/>
-              <a:t>Subclasses:</a:t>
-            </a:r>
-          </a:p>
-          <a:p>
-            <a:r>
-              <a:rPr lang="en-US" sz="3000" dirty="0"/>
-              <a:t>Layer:</a:t>
-            </a:r>
-          </a:p>
-        </p:txBody>
-      </p:sp>
-      <p:sp>
-        <p:nvSpPr>
-          <p:cNvPr id="7" name="Content Placeholder 2">
-            <a:extLst>
-              <a:ext uri="{FF2B5EF4-FFF2-40B4-BE49-F238E27FC236}">
-                <a16:creationId xmlns:a16="http://schemas.microsoft.com/office/drawing/2014/main" id="{BBA97EAA-FAAE-6342-A893-4A0CAE51C8C2}"/>
-              </a:ext>
-            </a:extLst>
-          </p:cNvPr>
-          <p:cNvSpPr txBox="1">
-            <a:spLocks/>
-          </p:cNvSpPr>
-          <p:nvPr/>
-        </p:nvSpPr>
-        <p:spPr>
-          <a:xfrm>
-            <a:off x="6492607" y="1891727"/>
-            <a:ext cx="5257800" cy="4351338"/>
-          </a:xfrm>
-          <a:prstGeom prst="rect">
-            <a:avLst/>
-          </a:prstGeom>
-        </p:spPr>
-        <p:txBody>
-          <a:bodyPr vert="horz" lIns="91440" tIns="45720" rIns="91440" bIns="45720" rtlCol="0">
-            <a:normAutofit/>
-          </a:bodyPr>
-          <a:lstStyle>
-            <a:lvl1pPr marL="228600" indent="-228600" algn="l" defTabSz="914400" rtl="0" eaLnBrk="1" latinLnBrk="0" hangingPunct="1">
-              <a:lnSpc>
-                <a:spcPct val="90000"/>
-              </a:lnSpc>
-              <a:spcBef>
-                <a:spcPts val="1000"/>
-              </a:spcBef>
-              <a:buFont typeface="Arial" panose="020B0604020202020204" pitchFamily="34" charset="0"/>
-              <a:buChar char="•"/>
-              <a:defRPr sz="2800" kern="1200">
-                <a:solidFill>
-                  <a:schemeClr val="tx1"/>
-                </a:solidFill>
-                <a:latin typeface="+mn-lt"/>
-                <a:ea typeface="+mn-ea"/>
-                <a:cs typeface="+mn-cs"/>
-              </a:defRPr>
-            </a:lvl1pPr>
-            <a:lvl2pPr marL="685800" indent="-228600" algn="l" defTabSz="914400" rtl="0" eaLnBrk="1" latinLnBrk="0" hangingPunct="1">
-              <a:lnSpc>
-                <a:spcPct val="90000"/>
-              </a:lnSpc>
-              <a:spcBef>
-                <a:spcPts val="500"/>
-              </a:spcBef>
-              <a:buFont typeface="Arial" panose="020B0604020202020204" pitchFamily="34" charset="0"/>
-              <a:buChar char="•"/>
-              <a:defRPr sz="2400" kern="1200">
-                <a:solidFill>
-                  <a:schemeClr val="tx1"/>
-                </a:solidFill>
-                <a:latin typeface="+mn-lt"/>
-                <a:ea typeface="+mn-ea"/>
-                <a:cs typeface="+mn-cs"/>
-              </a:defRPr>
-            </a:lvl2pPr>
-            <a:lvl3pPr marL="1143000" indent="-228600" algn="l" defTabSz="914400" rtl="0" eaLnBrk="1" latinLnBrk="0" hangingPunct="1">
-              <a:lnSpc>
-                <a:spcPct val="90000"/>
-              </a:lnSpc>
-              <a:spcBef>
-                <a:spcPts val="500"/>
-              </a:spcBef>
-              <a:buFont typeface="Arial" panose="020B0604020202020204" pitchFamily="34" charset="0"/>
-              <a:buChar char="•"/>
-              <a:defRPr sz="2000" kern="1200">
-                <a:solidFill>
-                  <a:schemeClr val="tx1"/>
-                </a:solidFill>
-                <a:latin typeface="+mn-lt"/>
-                <a:ea typeface="+mn-ea"/>
-                <a:cs typeface="+mn-cs"/>
-              </a:defRPr>
-            </a:lvl3pPr>
-            <a:lvl4pPr marL="1600200" indent="-228600" algn="l" defTabSz="914400" rtl="0" eaLnBrk="1" latinLnBrk="0" hangingPunct="1">
-              <a:lnSpc>
-                <a:spcPct val="90000"/>
-              </a:lnSpc>
-              <a:spcBef>
-                <a:spcPts val="500"/>
-              </a:spcBef>
-              <a:buFont typeface="Arial" panose="020B0604020202020204" pitchFamily="34" charset="0"/>
-              <a:buChar char="•"/>
-              <a:defRPr sz="1800" kern="1200">
-                <a:solidFill>
-                  <a:schemeClr val="tx1"/>
-                </a:solidFill>
-                <a:latin typeface="+mn-lt"/>
-                <a:ea typeface="+mn-ea"/>
-                <a:cs typeface="+mn-cs"/>
-              </a:defRPr>
-            </a:lvl4pPr>
-            <a:lvl5pPr marL="2057400" indent="-228600" algn="l" defTabSz="914400" rtl="0" eaLnBrk="1" latinLnBrk="0" hangingPunct="1">
-              <a:lnSpc>
-                <a:spcPct val="90000"/>
-              </a:lnSpc>
-              <a:spcBef>
-                <a:spcPts val="500"/>
-              </a:spcBef>
-              <a:buFont typeface="Arial" panose="020B0604020202020204" pitchFamily="34" charset="0"/>
-              <a:buChar char="•"/>
-              <a:defRPr sz="1800" kern="1200">
-                <a:solidFill>
-                  <a:schemeClr val="tx1"/>
-                </a:solidFill>
-                <a:latin typeface="+mn-lt"/>
-                <a:ea typeface="+mn-ea"/>
-                <a:cs typeface="+mn-cs"/>
-              </a:defRPr>
-            </a:lvl5pPr>
-            <a:lvl6pPr marL="2514600" indent="-228600" algn="l" defTabSz="914400" rtl="0" eaLnBrk="1" latinLnBrk="0" hangingPunct="1">
-              <a:lnSpc>
-                <a:spcPct val="90000"/>
-              </a:lnSpc>
-              <a:spcBef>
-                <a:spcPts val="500"/>
-              </a:spcBef>
-              <a:buFont typeface="Arial" panose="020B0604020202020204" pitchFamily="34" charset="0"/>
-              <a:buChar char="•"/>
-              <a:defRPr sz="1800" kern="1200">
-                <a:solidFill>
-                  <a:schemeClr val="tx1"/>
-                </a:solidFill>
-                <a:latin typeface="+mn-lt"/>
-                <a:ea typeface="+mn-ea"/>
-                <a:cs typeface="+mn-cs"/>
-              </a:defRPr>
-            </a:lvl6pPr>
-            <a:lvl7pPr marL="2971800" indent="-228600" algn="l" defTabSz="914400" rtl="0" eaLnBrk="1" latinLnBrk="0" hangingPunct="1">
-              <a:lnSpc>
-                <a:spcPct val="90000"/>
-              </a:lnSpc>
-              <a:spcBef>
-                <a:spcPts val="500"/>
-              </a:spcBef>
-              <a:buFont typeface="Arial" panose="020B0604020202020204" pitchFamily="34" charset="0"/>
-              <a:buChar char="•"/>
-              <a:defRPr sz="1800" kern="1200">
-                <a:solidFill>
-                  <a:schemeClr val="tx1"/>
-                </a:solidFill>
-                <a:latin typeface="+mn-lt"/>
-                <a:ea typeface="+mn-ea"/>
-                <a:cs typeface="+mn-cs"/>
-              </a:defRPr>
-            </a:lvl7pPr>
-            <a:lvl8pPr marL="3429000" indent="-228600" algn="l" defTabSz="914400" rtl="0" eaLnBrk="1" latinLnBrk="0" hangingPunct="1">
-              <a:lnSpc>
-                <a:spcPct val="90000"/>
-              </a:lnSpc>
-              <a:spcBef>
-                <a:spcPts val="500"/>
-              </a:spcBef>
-              <a:buFont typeface="Arial" panose="020B0604020202020204" pitchFamily="34" charset="0"/>
-              <a:buChar char="•"/>
-              <a:defRPr sz="1800" kern="1200">
-                <a:solidFill>
-                  <a:schemeClr val="tx1"/>
-                </a:solidFill>
-                <a:latin typeface="+mn-lt"/>
-                <a:ea typeface="+mn-ea"/>
-                <a:cs typeface="+mn-cs"/>
-              </a:defRPr>
-            </a:lvl8pPr>
-            <a:lvl9pPr marL="3886200" indent="-228600" algn="l" defTabSz="914400" rtl="0" eaLnBrk="1" latinLnBrk="0" hangingPunct="1">
-              <a:lnSpc>
-                <a:spcPct val="90000"/>
-              </a:lnSpc>
-              <a:spcBef>
-                <a:spcPts val="500"/>
-              </a:spcBef>
-              <a:buFont typeface="Arial" panose="020B0604020202020204" pitchFamily="34" charset="0"/>
-              <a:buChar char="•"/>
-              <a:defRPr sz="1800" kern="1200">
-                <a:solidFill>
-                  <a:schemeClr val="tx1"/>
-                </a:solidFill>
-                <a:latin typeface="+mn-lt"/>
-                <a:ea typeface="+mn-ea"/>
-                <a:cs typeface="+mn-cs"/>
-              </a:defRPr>
-            </a:lvl9pPr>
-          </a:lstStyle>
-          <a:p>
-            <a:r>
-              <a:rPr lang="en-US" dirty="0"/>
-              <a:t>Collaborators</a:t>
-            </a:r>
-          </a:p>
-        </p:txBody>
-      </p:sp>
-    </p:spTree>
-    <p:extLst>
-      <p:ext uri="{BB962C8B-B14F-4D97-AF65-F5344CB8AC3E}">
-        <p14:creationId xmlns:p14="http://schemas.microsoft.com/office/powerpoint/2010/main" val="397343510"/>
-      </p:ext>
-    </p:extLst>
-  </p:cSld>
-  <p:clrMapOvr>
-    <a:masterClrMapping/>
-  </p:clrMapOvr>
-</p:sld>
-</file>
-
-<file path=ppt/slides/slide24.xml><?xml version="1.0" encoding="utf-8"?>
-<p:sld xmlns:a="http://schemas.openxmlformats.org/drawingml/2006/main" xmlns:r="http://schemas.openxmlformats.org/officeDocument/2006/relationships" xmlns:p="http://schemas.openxmlformats.org/presentationml/2006/main">
-  <p:cSld>
-    <p:spTree>
-      <p:nvGrpSpPr>
-        <p:cNvPr id="1" name=""/>
-        <p:cNvGrpSpPr/>
-        <p:nvPr/>
-      </p:nvGrpSpPr>
-      <p:grpSpPr>
-        <a:xfrm>
-          <a:off x="0" y="0"/>
-          <a:ext cx="0" cy="0"/>
-          <a:chOff x="0" y="0"/>
-          <a:chExt cx="0" cy="0"/>
-        </a:xfrm>
-      </p:grpSpPr>
-      <p:sp>
-        <p:nvSpPr>
           <p:cNvPr id="4" name="TextBox 3">
             <a:extLst>
               <a:ext uri="{FF2B5EF4-FFF2-40B4-BE49-F238E27FC236}">
@@ -9294,7 +7884,7 @@
           <a:p>
             <a:r>
               <a:rPr lang="en-US" dirty="0" err="1"/>
-              <a:t>UserInterface</a:t>
+              <a:t>SportsAp</a:t>
             </a:r>
             <a:endParaRPr lang="en-US" dirty="0"/>
           </a:p>
@@ -10553,7 +9143,7 @@
           <a:p>
             <a:r>
               <a:rPr lang="en-US" dirty="0" err="1"/>
-              <a:t>OutputParser</a:t>
+              <a:t>StatManager</a:t>
             </a:r>
             <a:endParaRPr lang="en-US" dirty="0"/>
           </a:p>
@@ -10587,8 +9177,27 @@
           <a:p>
             <a:r>
               <a:rPr lang="en-US" dirty="0"/>
-              <a:t>Given a user’s input command and the output statistic, format the output</a:t>
-            </a:r>
+              <a:t>An abstract class</a:t>
+            </a:r>
+          </a:p>
+          <a:p>
+            <a:r>
+              <a:rPr lang="en-US" dirty="0"/>
+              <a:t>Serves as a parent class to </a:t>
+            </a:r>
+            <a:r>
+              <a:rPr lang="en-US" dirty="0" err="1"/>
+              <a:t>PlayerStatManager</a:t>
+            </a:r>
+            <a:r>
+              <a:rPr lang="en-US" dirty="0"/>
+              <a:t> and </a:t>
+            </a:r>
+            <a:r>
+              <a:rPr lang="en-US" dirty="0" err="1"/>
+              <a:t>TeamStatManager</a:t>
+            </a:r>
+            <a:endParaRPr lang="en-US" dirty="0"/>
           </a:p>
         </p:txBody>
       </p:sp>
@@ -10617,7 +9226,7 @@
         </p:spPr>
         <p:txBody>
           <a:bodyPr vert="horz" lIns="91440" tIns="45720" rIns="91440" bIns="45720" rtlCol="0" anchor="ctr">
-            <a:normAutofit lnSpcReduction="10000"/>
+            <a:normAutofit fontScale="92500" lnSpcReduction="20000"/>
           </a:bodyPr>
           <a:lstStyle>
             <a:lvl1pPr algn="l" defTabSz="914400" rtl="0" eaLnBrk="1" latinLnBrk="0" hangingPunct="1">
@@ -10640,20 +9249,34 @@
           </a:lstStyle>
           <a:p>
             <a:r>
+              <a:rPr lang="en-US" sz="3000" dirty="0" err="1"/>
+              <a:t>Parent:None</a:t>
+            </a:r>
+            <a:endParaRPr lang="en-US" sz="3000" dirty="0"/>
+          </a:p>
+          <a:p>
+            <a:r>
               <a:rPr lang="en-US" sz="3000" dirty="0"/>
-              <a:t>Parent: None</a:t>
-            </a:r>
-          </a:p>
-          <a:p>
+              <a:t>Subclasses: </a:t>
+            </a:r>
+            <a:r>
+              <a:rPr lang="en-US" sz="3000" dirty="0" err="1"/>
+              <a:t>PlayerStatManager</a:t>
+            </a:r>
             <a:r>
               <a:rPr lang="en-US" sz="3000" dirty="0"/>
-              <a:t>Subclasses: None</a:t>
-            </a:r>
+              <a:t>, </a:t>
+            </a:r>
+            <a:r>
+              <a:rPr lang="en-US" sz="3000" dirty="0" err="1"/>
+              <a:t>TeamStatManager</a:t>
+            </a:r>
+            <a:endParaRPr lang="en-US" sz="3000" dirty="0"/>
           </a:p>
           <a:p>
             <a:r>
               <a:rPr lang="en-US" sz="3000" dirty="0"/>
-              <a:t>Layer: Interface Adapter</a:t>
+              <a:t>Layer: Use Case</a:t>
             </a:r>
           </a:p>
         </p:txBody>
@@ -10850,9 +9473,25 @@
             </a:lvl9pPr>
           </a:lstStyle>
           <a:p>
+            <a:pPr marL="0" indent="0">
+              <a:buNone/>
+            </a:pPr>
+            <a:r>
+              <a:rPr lang="en-US" dirty="0"/>
+              <a:t>Relationships:</a:t>
+            </a:r>
+          </a:p>
+          <a:p>
             <a:r>
               <a:rPr lang="en-US" dirty="0" err="1"/>
-              <a:t>UserInterface</a:t>
+              <a:t>PlayerStatManager</a:t>
+            </a:r>
+            <a:endParaRPr lang="en-US" dirty="0"/>
+          </a:p>
+          <a:p>
+            <a:r>
+              <a:rPr lang="en-US" dirty="0" err="1"/>
+              <a:t>TeamStatManager</a:t>
             </a:r>
             <a:endParaRPr lang="en-US" dirty="0"/>
           </a:p>
@@ -10861,7 +9500,7 @@
     </p:spTree>
     <p:extLst>
       <p:ext uri="{BB962C8B-B14F-4D97-AF65-F5344CB8AC3E}">
-        <p14:creationId xmlns:p14="http://schemas.microsoft.com/office/powerpoint/2010/main" val="1988172580"/>
+        <p14:creationId xmlns:p14="http://schemas.microsoft.com/office/powerpoint/2010/main" val="617035555"/>
       </p:ext>
     </p:extLst>
   </p:cSld>
@@ -10916,7 +9555,7 @@
           <a:p>
             <a:r>
               <a:rPr lang="en-US" dirty="0" err="1"/>
-              <a:t>CommandRunner</a:t>
+              <a:t>PlayerStatManager</a:t>
             </a:r>
             <a:endParaRPr lang="en-US" dirty="0"/>
           </a:p>
@@ -10950,7 +9589,13 @@
           <a:p>
             <a:r>
               <a:rPr lang="en-US" dirty="0"/>
-              <a:t>Given a command, direct the relevant List manager or statistics manager to complete the command</a:t>
+              <a:t>Find or compute statistics about a given player</a:t>
+            </a:r>
+          </a:p>
+          <a:p>
+            <a:r>
+              <a:rPr lang="en-US" dirty="0"/>
+              <a:t>Store the list with all of the player’s available</a:t>
             </a:r>
           </a:p>
         </p:txBody>
@@ -11004,8 +9649,13 @@
           <a:p>
             <a:r>
               <a:rPr lang="en-US" sz="3000" dirty="0"/>
-              <a:t>Parent: None</a:t>
-            </a:r>
+              <a:t>Parent: </a:t>
+            </a:r>
+            <a:r>
+              <a:rPr lang="en-US" sz="3000" dirty="0" err="1"/>
+              <a:t>StatManager</a:t>
+            </a:r>
+            <a:endParaRPr lang="en-US" sz="3000" dirty="0"/>
           </a:p>
           <a:p>
             <a:r>
@@ -11046,7 +9696,7 @@
         </p:spPr>
         <p:txBody>
           <a:bodyPr vert="horz" lIns="91440" tIns="45720" rIns="91440" bIns="45720" rtlCol="0">
-            <a:normAutofit fontScale="92500" lnSpcReduction="20000"/>
+            <a:normAutofit/>
           </a:bodyPr>
           <a:lstStyle>
             <a:lvl1pPr marL="228600" indent="-228600" algn="l" defTabSz="914400" rtl="0" eaLnBrk="1" latinLnBrk="0" hangingPunct="1">
@@ -11214,80 +9864,16 @@
           </a:lstStyle>
           <a:p>
             <a:r>
-              <a:rPr lang="en-US" dirty="0" err="1"/>
-              <a:t>PlayerManager</a:t>
-            </a:r>
-            <a:endParaRPr lang="en-US" dirty="0"/>
-          </a:p>
-          <a:p>
-            <a:r>
-              <a:rPr lang="en-US" dirty="0" err="1"/>
-              <a:t>TeamManager</a:t>
-            </a:r>
-            <a:endParaRPr lang="en-US" dirty="0"/>
-          </a:p>
-          <a:p>
-            <a:r>
-              <a:rPr lang="en-US" dirty="0" err="1"/>
-              <a:t>PlayerStatManager</a:t>
-            </a:r>
-            <a:endParaRPr lang="en-US" dirty="0"/>
-          </a:p>
-          <a:p>
-            <a:r>
-              <a:rPr lang="en-US" dirty="0" err="1"/>
-              <a:t>TeamStatManager</a:t>
-            </a:r>
-            <a:endParaRPr lang="en-US" dirty="0"/>
-          </a:p>
-          <a:p>
-            <a:r>
-              <a:rPr lang="en-US" dirty="0" err="1"/>
-              <a:t>PlayerStatComparer</a:t>
-            </a:r>
-            <a:endParaRPr lang="en-US" dirty="0"/>
-          </a:p>
-          <a:p>
-            <a:r>
-              <a:rPr lang="en-US" dirty="0" err="1"/>
-              <a:t>TeamStatComparer</a:t>
-            </a:r>
-            <a:endParaRPr lang="en-US" dirty="0"/>
-          </a:p>
-          <a:p>
-            <a:r>
-              <a:rPr lang="en-US" dirty="0" err="1"/>
-              <a:t>PlayerStatPredictor</a:t>
-            </a:r>
-            <a:endParaRPr lang="en-US" dirty="0"/>
-          </a:p>
-          <a:p>
-            <a:r>
-              <a:rPr lang="en-US" dirty="0" err="1"/>
-              <a:t>TeamStatPredictor</a:t>
-            </a:r>
-            <a:endParaRPr lang="en-US" dirty="0"/>
-          </a:p>
-          <a:p>
-            <a:r>
-              <a:rPr lang="en-US" dirty="0" err="1"/>
-              <a:t>LoginManager</a:t>
-            </a:r>
-            <a:endParaRPr lang="en-US" dirty="0"/>
-          </a:p>
-          <a:p>
-            <a:r>
-              <a:rPr lang="en-US" dirty="0" err="1"/>
-              <a:t>UserPredictionManager</a:t>
-            </a:r>
-            <a:endParaRPr lang="en-US" dirty="0"/>
+              <a:rPr lang="en-US" dirty="0"/>
+              <a:t>Player</a:t>
+            </a:r>
           </a:p>
         </p:txBody>
       </p:sp>
     </p:spTree>
     <p:extLst>
       <p:ext uri="{BB962C8B-B14F-4D97-AF65-F5344CB8AC3E}">
-        <p14:creationId xmlns:p14="http://schemas.microsoft.com/office/powerpoint/2010/main" val="3587279608"/>
+        <p14:creationId xmlns:p14="http://schemas.microsoft.com/office/powerpoint/2010/main" val="2914288967"/>
       </p:ext>
     </p:extLst>
   </p:cSld>
@@ -11341,9 +9927,10 @@
           <a:lstStyle/>
           <a:p>
             <a:r>
-              <a:rPr lang="en-US" dirty="0"/>
-              <a:t>Main</a:t>
-            </a:r>
+              <a:rPr lang="en-US" dirty="0" err="1"/>
+              <a:t>TeamStatManager</a:t>
+            </a:r>
+            <a:endParaRPr lang="en-US" dirty="0"/>
           </a:p>
         </p:txBody>
       </p:sp>
@@ -11375,44 +9962,17 @@
           <a:p>
             <a:r>
               <a:rPr lang="en-US" dirty="0"/>
-              <a:t>The program’s starting point</a:t>
+              <a:t>Find or compute statistics about a given Team</a:t>
             </a:r>
           </a:p>
           <a:p>
             <a:r>
               <a:rPr lang="en-US" dirty="0"/>
-              <a:t>Store the current user logged in (if any)</a:t>
-            </a:r>
-          </a:p>
-          <a:p>
-            <a:r>
-              <a:rPr lang="en-US" dirty="0"/>
-              <a:t>While running: Send input from </a:t>
-            </a:r>
-            <a:r>
-              <a:rPr lang="en-US" dirty="0" err="1"/>
-              <a:t>InputParser</a:t>
-            </a:r>
-            <a:r>
-              <a:rPr lang="en-US" dirty="0"/>
-              <a:t> to the </a:t>
-            </a:r>
-            <a:r>
-              <a:rPr lang="en-US" dirty="0" err="1"/>
-              <a:t>CommandRunner</a:t>
-            </a:r>
-            <a:r>
-              <a:rPr lang="en-US" dirty="0"/>
-              <a:t> then send the output to </a:t>
-            </a:r>
-            <a:r>
-              <a:rPr lang="en-US" dirty="0" err="1"/>
-              <a:t>OutputParser</a:t>
-            </a:r>
-            <a:r>
-              <a:rPr lang="en-US" dirty="0"/>
-              <a:t> for display</a:t>
-            </a:r>
+              <a:t>Stores the list with all of the team’s available</a:t>
+            </a:r>
+          </a:p>
+          <a:p>
+            <a:endParaRPr lang="en-US" dirty="0"/>
           </a:p>
         </p:txBody>
       </p:sp>
@@ -11676,30 +10236,22 @@
           <a:p>
             <a:r>
               <a:rPr lang="en-US" dirty="0" err="1"/>
-              <a:t>InputParser</a:t>
+              <a:t>TeamManager</a:t>
             </a:r>
             <a:endParaRPr lang="en-US" dirty="0"/>
           </a:p>
           <a:p>
             <a:r>
-              <a:rPr lang="en-US" dirty="0" err="1"/>
-              <a:t>OutputParser</a:t>
-            </a:r>
-            <a:endParaRPr lang="en-US" dirty="0"/>
-          </a:p>
-          <a:p>
-            <a:r>
-              <a:rPr lang="en-US" dirty="0" err="1"/>
-              <a:t>CommandRunner</a:t>
-            </a:r>
-            <a:endParaRPr lang="en-US" dirty="0"/>
+              <a:rPr lang="en-US" dirty="0"/>
+              <a:t>Team</a:t>
+            </a:r>
           </a:p>
         </p:txBody>
       </p:sp>
     </p:spTree>
     <p:extLst>
       <p:ext uri="{BB962C8B-B14F-4D97-AF65-F5344CB8AC3E}">
-        <p14:creationId xmlns:p14="http://schemas.microsoft.com/office/powerpoint/2010/main" val="1732978827"/>
+        <p14:creationId xmlns:p14="http://schemas.microsoft.com/office/powerpoint/2010/main" val="957551239"/>
       </p:ext>
     </p:extLst>
   </p:cSld>
@@ -11753,10 +10305,9 @@
           <a:lstStyle/>
           <a:p>
             <a:r>
-              <a:rPr lang="en-US" dirty="0" err="1"/>
-              <a:t>PlayerStatManager</a:t>
-            </a:r>
-            <a:endParaRPr lang="en-US" dirty="0"/>
+              <a:rPr lang="en-US" dirty="0"/>
+              <a:t>Member</a:t>
+            </a:r>
           </a:p>
         </p:txBody>
       </p:sp>
@@ -11788,7 +10339,13 @@
           <a:p>
             <a:r>
               <a:rPr lang="en-US" dirty="0"/>
-              <a:t>Find or compute statistics about a given player</a:t>
+              <a:t>Stores a user’s name</a:t>
+            </a:r>
+          </a:p>
+          <a:p>
+            <a:r>
+              <a:rPr lang="en-US" dirty="0"/>
+              <a:t>Tracks the amount of games they have predicted correctly</a:t>
             </a:r>
           </a:p>
         </p:txBody>
@@ -11854,7 +10411,7 @@
           <a:p>
             <a:r>
               <a:rPr lang="en-US" sz="3000" dirty="0"/>
-              <a:t>Layer: Use Case</a:t>
+              <a:t>Layer: Entity</a:t>
             </a:r>
           </a:p>
         </p:txBody>
@@ -12052,15 +10609,8 @@
           </a:lstStyle>
           <a:p>
             <a:r>
-              <a:rPr lang="en-US" dirty="0" err="1"/>
-              <a:t>PlayerManager</a:t>
-            </a:r>
-            <a:endParaRPr lang="en-US" dirty="0"/>
-          </a:p>
-          <a:p>
-            <a:r>
               <a:rPr lang="en-US" dirty="0"/>
-              <a:t>Player</a:t>
+              <a:t>None</a:t>
             </a:r>
           </a:p>
         </p:txBody>
@@ -12068,7 +10618,7 @@
     </p:spTree>
     <p:extLst>
       <p:ext uri="{BB962C8B-B14F-4D97-AF65-F5344CB8AC3E}">
-        <p14:creationId xmlns:p14="http://schemas.microsoft.com/office/powerpoint/2010/main" val="2914288967"/>
+        <p14:creationId xmlns:p14="http://schemas.microsoft.com/office/powerpoint/2010/main" val="2553747706"/>
       </p:ext>
     </p:extLst>
   </p:cSld>
@@ -12113,8 +10663,8 @@
         </p:nvSpPr>
         <p:spPr>
           <a:xfrm>
-            <a:off x="441593" y="365125"/>
-            <a:ext cx="5257800" cy="1325563"/>
+            <a:off x="441592" y="365125"/>
+            <a:ext cx="5535461" cy="1325563"/>
           </a:xfrm>
         </p:spPr>
         <p:txBody>
@@ -12122,10 +10672,9 @@
           <a:lstStyle/>
           <a:p>
             <a:r>
-              <a:rPr lang="en-US" dirty="0" err="1"/>
-              <a:t>TeamStatManager</a:t>
-            </a:r>
-            <a:endParaRPr lang="en-US" dirty="0"/>
+              <a:rPr lang="en-US" dirty="0"/>
+              <a:t>Game</a:t>
+            </a:r>
           </a:p>
         </p:txBody>
       </p:sp>
@@ -12157,7 +10706,19 @@
           <a:p>
             <a:r>
               <a:rPr lang="en-US" dirty="0"/>
-              <a:t>Find or compute statistics about a given Team</a:t>
+              <a:t>Store the game’s location, time, and the two teams competing</a:t>
+            </a:r>
+          </a:p>
+          <a:p>
+            <a:r>
+              <a:rPr lang="en-US" dirty="0"/>
+              <a:t>Also stores all of the existing bets on the game</a:t>
+            </a:r>
+          </a:p>
+          <a:p>
+            <a:r>
+              <a:rPr lang="en-US" dirty="0"/>
+              <a:t>After the game has ended, it should compute how many players got the bet right</a:t>
             </a:r>
           </a:p>
         </p:txBody>
@@ -12422,22 +10983,16 @@
           <a:p>
             <a:r>
               <a:rPr lang="en-US" dirty="0" err="1"/>
-              <a:t>TeamManager</a:t>
+              <a:t>UserPredictionManager</a:t>
             </a:r>
             <a:endParaRPr lang="en-US" dirty="0"/>
-          </a:p>
-          <a:p>
-            <a:r>
-              <a:rPr lang="en-US" dirty="0"/>
-              <a:t>Team</a:t>
-            </a:r>
           </a:p>
         </p:txBody>
       </p:sp>
     </p:spTree>
     <p:extLst>
       <p:ext uri="{BB962C8B-B14F-4D97-AF65-F5344CB8AC3E}">
-        <p14:creationId xmlns:p14="http://schemas.microsoft.com/office/powerpoint/2010/main" val="957551239"/>
+        <p14:creationId xmlns:p14="http://schemas.microsoft.com/office/powerpoint/2010/main" val="816090190"/>
       </p:ext>
     </p:extLst>
   </p:cSld>

</xml_diff>